<commit_message>
Add link domain pic
</commit_message>
<xml_diff>
--- a/ppt/tmp_ppt.pptx
+++ b/ppt/tmp_ppt.pptx
@@ -6,6 +6,7 @@
   </p:sldMasterIdLst>
   <p:sldIdLst>
     <p:sldId id="256" r:id="rId2"/>
+    <p:sldId id="257" r:id="rId3"/>
   </p:sldIdLst>
   <p:sldSz cx="12192000" cy="6858000"/>
   <p:notesSz cx="6858000" cy="9144000"/>
@@ -104,6 +105,11 @@
       </a:defRPr>
     </a:lvl9pPr>
   </p:defaultTextStyle>
+  <p:extLst>
+    <p:ext uri="{EFAFB233-063F-42B5-8137-9DF3F51BA10A}">
+      <p15:sldGuideLst xmlns:p15="http://schemas.microsoft.com/office/powerpoint/2012/main"/>
+    </p:ext>
+  </p:extLst>
 </p:presentation>
 </file>
 
@@ -4647,6 +4653,1416 @@
 </p:sld>
 </file>
 
+<file path=ppt/slides/slide2.xml><?xml version="1.0" encoding="utf-8"?>
+<p:sld xmlns:a="http://schemas.openxmlformats.org/drawingml/2006/main" xmlns:r="http://schemas.openxmlformats.org/officeDocument/2006/relationships" xmlns:p="http://schemas.openxmlformats.org/presentationml/2006/main">
+  <p:cSld>
+    <p:spTree>
+      <p:nvGrpSpPr>
+        <p:cNvPr id="1" name=""/>
+        <p:cNvGrpSpPr/>
+        <p:nvPr/>
+      </p:nvGrpSpPr>
+      <p:grpSpPr>
+        <a:xfrm>
+          <a:off x="0" y="0"/>
+          <a:ext cx="0" cy="0"/>
+          <a:chOff x="0" y="0"/>
+          <a:chExt cx="0" cy="0"/>
+        </a:xfrm>
+      </p:grpSpPr>
+      <p:sp>
+        <p:nvSpPr>
+          <p:cNvPr id="31" name="矩形 30">
+            <a:extLst>
+              <a:ext uri="{FF2B5EF4-FFF2-40B4-BE49-F238E27FC236}">
+                <a16:creationId xmlns:a16="http://schemas.microsoft.com/office/drawing/2014/main" id="{54C4985F-30A7-4C60-8CCC-ED97F89588AE}"/>
+              </a:ext>
+            </a:extLst>
+          </p:cNvPr>
+          <p:cNvSpPr/>
+          <p:nvPr/>
+        </p:nvSpPr>
+        <p:spPr>
+          <a:xfrm>
+            <a:off x="5867401" y="2727057"/>
+            <a:ext cx="4426069" cy="1517321"/>
+          </a:xfrm>
+          <a:prstGeom prst="rect">
+            <a:avLst/>
+          </a:prstGeom>
+        </p:spPr>
+        <p:style>
+          <a:lnRef idx="2">
+            <a:schemeClr val="accent6"/>
+          </a:lnRef>
+          <a:fillRef idx="1">
+            <a:schemeClr val="lt1"/>
+          </a:fillRef>
+          <a:effectRef idx="0">
+            <a:schemeClr val="accent6"/>
+          </a:effectRef>
+          <a:fontRef idx="minor">
+            <a:schemeClr val="dk1"/>
+          </a:fontRef>
+        </p:style>
+        <p:txBody>
+          <a:bodyPr rtlCol="0" anchor="ctr"/>
+          <a:lstStyle/>
+          <a:p>
+            <a:pPr algn="ctr"/>
+            <a:endParaRPr lang="zh-CN" altLang="en-US"/>
+          </a:p>
+        </p:txBody>
+      </p:sp>
+      <p:sp>
+        <p:nvSpPr>
+          <p:cNvPr id="2" name="矩形 1">
+            <a:extLst>
+              <a:ext uri="{FF2B5EF4-FFF2-40B4-BE49-F238E27FC236}">
+                <a16:creationId xmlns:a16="http://schemas.microsoft.com/office/drawing/2014/main" id="{79B301BB-2FDA-4AC4-8D42-3C6EE47A97FA}"/>
+              </a:ext>
+            </a:extLst>
+          </p:cNvPr>
+          <p:cNvSpPr/>
+          <p:nvPr/>
+        </p:nvSpPr>
+        <p:spPr>
+          <a:xfrm>
+            <a:off x="1385977" y="2719363"/>
+            <a:ext cx="4324710" cy="1525015"/>
+          </a:xfrm>
+          <a:prstGeom prst="rect">
+            <a:avLst/>
+          </a:prstGeom>
+        </p:spPr>
+        <p:style>
+          <a:lnRef idx="2">
+            <a:schemeClr val="accent6"/>
+          </a:lnRef>
+          <a:fillRef idx="1">
+            <a:schemeClr val="lt1"/>
+          </a:fillRef>
+          <a:effectRef idx="0">
+            <a:schemeClr val="accent6"/>
+          </a:effectRef>
+          <a:fontRef idx="minor">
+            <a:schemeClr val="dk1"/>
+          </a:fontRef>
+        </p:style>
+        <p:txBody>
+          <a:bodyPr rtlCol="0" anchor="ctr"/>
+          <a:lstStyle/>
+          <a:p>
+            <a:pPr algn="ctr"/>
+            <a:endParaRPr lang="zh-CN" altLang="en-US"/>
+          </a:p>
+        </p:txBody>
+      </p:sp>
+      <p:sp>
+        <p:nvSpPr>
+          <p:cNvPr id="4" name="矩形: 圆角 3">
+            <a:extLst>
+              <a:ext uri="{FF2B5EF4-FFF2-40B4-BE49-F238E27FC236}">
+                <a16:creationId xmlns:a16="http://schemas.microsoft.com/office/drawing/2014/main" id="{5666A3AF-0220-4D23-96B1-913D946F297A}"/>
+              </a:ext>
+            </a:extLst>
+          </p:cNvPr>
+          <p:cNvSpPr/>
+          <p:nvPr/>
+        </p:nvSpPr>
+        <p:spPr>
+          <a:xfrm>
+            <a:off x="4114800" y="516194"/>
+            <a:ext cx="2533289" cy="277436"/>
+          </a:xfrm>
+          <a:prstGeom prst="roundRect">
+            <a:avLst/>
+          </a:prstGeom>
+        </p:spPr>
+        <p:style>
+          <a:lnRef idx="2">
+            <a:schemeClr val="accent6"/>
+          </a:lnRef>
+          <a:fillRef idx="1">
+            <a:schemeClr val="lt1"/>
+          </a:fillRef>
+          <a:effectRef idx="0">
+            <a:schemeClr val="accent6"/>
+          </a:effectRef>
+          <a:fontRef idx="minor">
+            <a:schemeClr val="dk1"/>
+          </a:fontRef>
+        </p:style>
+        <p:txBody>
+          <a:bodyPr rtlCol="0" anchor="ctr"/>
+          <a:lstStyle/>
+          <a:p>
+            <a:pPr algn="ctr"/>
+            <a:r>
+              <a:rPr lang="zh-CN" altLang="en-US" sz="1200" dirty="0"/>
+              <a:t>业务请求</a:t>
+            </a:r>
+            <a:r>
+              <a:rPr lang="en-US" altLang="zh-CN" sz="1200" dirty="0"/>
+              <a:t>: www.aaa.com</a:t>
+            </a:r>
+            <a:endParaRPr lang="zh-CN" altLang="en-US" sz="1200" dirty="0"/>
+          </a:p>
+        </p:txBody>
+      </p:sp>
+      <p:sp>
+        <p:nvSpPr>
+          <p:cNvPr id="5" name="矩形: 圆角 4">
+            <a:extLst>
+              <a:ext uri="{FF2B5EF4-FFF2-40B4-BE49-F238E27FC236}">
+                <a16:creationId xmlns:a16="http://schemas.microsoft.com/office/drawing/2014/main" id="{8FE3051E-E1CB-41F9-9198-D12B3138E9D1}"/>
+              </a:ext>
+            </a:extLst>
+          </p:cNvPr>
+          <p:cNvSpPr/>
+          <p:nvPr/>
+        </p:nvSpPr>
+        <p:spPr>
+          <a:xfrm>
+            <a:off x="4114801" y="1168926"/>
+            <a:ext cx="2533290" cy="277436"/>
+          </a:xfrm>
+          <a:prstGeom prst="roundRect">
+            <a:avLst/>
+          </a:prstGeom>
+        </p:spPr>
+        <p:style>
+          <a:lnRef idx="2">
+            <a:schemeClr val="accent6"/>
+          </a:lnRef>
+          <a:fillRef idx="1">
+            <a:schemeClr val="lt1"/>
+          </a:fillRef>
+          <a:effectRef idx="0">
+            <a:schemeClr val="accent6"/>
+          </a:effectRef>
+          <a:fontRef idx="minor">
+            <a:schemeClr val="dk1"/>
+          </a:fontRef>
+        </p:style>
+        <p:txBody>
+          <a:bodyPr rtlCol="0" anchor="ctr"/>
+          <a:lstStyle/>
+          <a:p>
+            <a:pPr algn="ctr"/>
+            <a:r>
+              <a:rPr lang="en-US" altLang="zh-CN" sz="1200" dirty="0"/>
+              <a:t>Base</a:t>
+            </a:r>
+            <a:r>
+              <a:rPr lang="zh-CN" altLang="en-US" sz="1200" dirty="0"/>
+              <a:t>域名</a:t>
+            </a:r>
+            <a:r>
+              <a:rPr lang="en-US" altLang="zh-CN" sz="1200" dirty="0"/>
+              <a:t>:  www.aaadns.com</a:t>
+            </a:r>
+            <a:endParaRPr lang="zh-CN" altLang="en-US" sz="1200" dirty="0"/>
+          </a:p>
+        </p:txBody>
+      </p:sp>
+      <p:sp>
+        <p:nvSpPr>
+          <p:cNvPr id="6" name="矩形: 圆角 5">
+            <a:extLst>
+              <a:ext uri="{FF2B5EF4-FFF2-40B4-BE49-F238E27FC236}">
+                <a16:creationId xmlns:a16="http://schemas.microsoft.com/office/drawing/2014/main" id="{D3A5600D-C0DD-454E-8C46-B7DB12F102FE}"/>
+              </a:ext>
+            </a:extLst>
+          </p:cNvPr>
+          <p:cNvSpPr/>
+          <p:nvPr/>
+        </p:nvSpPr>
+        <p:spPr>
+          <a:xfrm>
+            <a:off x="2714446" y="2126457"/>
+            <a:ext cx="2533290" cy="277436"/>
+          </a:xfrm>
+          <a:prstGeom prst="roundRect">
+            <a:avLst/>
+          </a:prstGeom>
+        </p:spPr>
+        <p:style>
+          <a:lnRef idx="2">
+            <a:schemeClr val="accent6"/>
+          </a:lnRef>
+          <a:fillRef idx="1">
+            <a:schemeClr val="lt1"/>
+          </a:fillRef>
+          <a:effectRef idx="0">
+            <a:schemeClr val="accent6"/>
+          </a:effectRef>
+          <a:fontRef idx="minor">
+            <a:schemeClr val="dk1"/>
+          </a:fontRef>
+        </p:style>
+        <p:txBody>
+          <a:bodyPr rtlCol="0" anchor="ctr"/>
+          <a:lstStyle/>
+          <a:p>
+            <a:pPr algn="ctr"/>
+            <a:r>
+              <a:rPr lang="zh-CN" altLang="en-US" sz="1200" dirty="0"/>
+              <a:t>链路域名</a:t>
+            </a:r>
+            <a:r>
+              <a:rPr lang="en-US" altLang="zh-CN" sz="1200" dirty="0"/>
+              <a:t>:  www.os30-aaa.com</a:t>
+            </a:r>
+            <a:endParaRPr lang="zh-CN" altLang="en-US" sz="1200" dirty="0"/>
+          </a:p>
+        </p:txBody>
+      </p:sp>
+      <p:sp>
+        <p:nvSpPr>
+          <p:cNvPr id="7" name="矩形: 圆角 6">
+            <a:extLst>
+              <a:ext uri="{FF2B5EF4-FFF2-40B4-BE49-F238E27FC236}">
+                <a16:creationId xmlns:a16="http://schemas.microsoft.com/office/drawing/2014/main" id="{20DB759E-E4A1-4933-9656-BFCB418EB5A0}"/>
+              </a:ext>
+            </a:extLst>
+          </p:cNvPr>
+          <p:cNvSpPr/>
+          <p:nvPr/>
+        </p:nvSpPr>
+        <p:spPr>
+          <a:xfrm>
+            <a:off x="6096000" y="2126457"/>
+            <a:ext cx="2533290" cy="277436"/>
+          </a:xfrm>
+          <a:prstGeom prst="roundRect">
+            <a:avLst/>
+          </a:prstGeom>
+        </p:spPr>
+        <p:style>
+          <a:lnRef idx="2">
+            <a:schemeClr val="accent6"/>
+          </a:lnRef>
+          <a:fillRef idx="1">
+            <a:schemeClr val="lt1"/>
+          </a:fillRef>
+          <a:effectRef idx="0">
+            <a:schemeClr val="accent6"/>
+          </a:effectRef>
+          <a:fontRef idx="minor">
+            <a:schemeClr val="dk1"/>
+          </a:fontRef>
+        </p:style>
+        <p:txBody>
+          <a:bodyPr rtlCol="0" anchor="ctr"/>
+          <a:lstStyle/>
+          <a:p>
+            <a:pPr algn="ctr"/>
+            <a:r>
+              <a:rPr lang="zh-CN" altLang="en-US" sz="1200" dirty="0"/>
+              <a:t>链路域名</a:t>
+            </a:r>
+            <a:r>
+              <a:rPr lang="en-US" altLang="zh-CN" sz="1200" dirty="0"/>
+              <a:t>:  www.sg52-aaa.com</a:t>
+            </a:r>
+            <a:endParaRPr lang="zh-CN" altLang="en-US" sz="1200" dirty="0"/>
+          </a:p>
+        </p:txBody>
+      </p:sp>
+      <p:sp>
+        <p:nvSpPr>
+          <p:cNvPr id="8" name="文本框 7">
+            <a:extLst>
+              <a:ext uri="{FF2B5EF4-FFF2-40B4-BE49-F238E27FC236}">
+                <a16:creationId xmlns:a16="http://schemas.microsoft.com/office/drawing/2014/main" id="{5C7E80A1-1FA4-4753-8DF1-742DEEBDAD06}"/>
+              </a:ext>
+            </a:extLst>
+          </p:cNvPr>
+          <p:cNvSpPr txBox="1"/>
+          <p:nvPr/>
+        </p:nvSpPr>
+        <p:spPr>
+          <a:xfrm>
+            <a:off x="6993146" y="977660"/>
+            <a:ext cx="4111925" cy="646331"/>
+          </a:xfrm>
+          <a:prstGeom prst="rect">
+            <a:avLst/>
+          </a:prstGeom>
+          <a:noFill/>
+        </p:spPr>
+        <p:txBody>
+          <a:bodyPr wrap="square" rtlCol="0">
+            <a:spAutoFit/>
+          </a:bodyPr>
+          <a:lstStyle/>
+          <a:p>
+            <a:r>
+              <a:rPr lang="en-US" altLang="zh-CN" sz="1200" dirty="0"/>
+              <a:t>DNS: </a:t>
+            </a:r>
+            <a:r>
+              <a:rPr lang="en-US" altLang="zh-CN" sz="1200" dirty="0">
+                <a:hlinkClick r:id="rId2"/>
+              </a:rPr>
+              <a:t>www.aaadns.com</a:t>
+            </a:r>
+            <a:endParaRPr lang="en-US" altLang="zh-CN" sz="1200" dirty="0"/>
+          </a:p>
+          <a:p>
+            <a:r>
+              <a:rPr lang="en-US" altLang="zh-CN" sz="1200" dirty="0"/>
+              <a:t>cname: </a:t>
+            </a:r>
+            <a:r>
+              <a:rPr lang="en-US" altLang="zh-CN" sz="1200" dirty="0">
+                <a:hlinkClick r:id="rId3"/>
+              </a:rPr>
+              <a:t>www.os30-aaa.com</a:t>
+            </a:r>
+            <a:r>
+              <a:rPr lang="en-US" altLang="zh-CN" sz="1200" dirty="0"/>
+              <a:t> TTL 300 weight 50</a:t>
+            </a:r>
+          </a:p>
+          <a:p>
+            <a:r>
+              <a:rPr lang="en-US" altLang="zh-CN" sz="1200" dirty="0"/>
+              <a:t>cname: </a:t>
+            </a:r>
+            <a:r>
+              <a:rPr lang="en-US" altLang="zh-CN" sz="1200" dirty="0">
+                <a:hlinkClick r:id="rId4"/>
+              </a:rPr>
+              <a:t>www.sg52-aaa.com</a:t>
+            </a:r>
+            <a:r>
+              <a:rPr lang="en-US" altLang="zh-CN" sz="1200" dirty="0"/>
+              <a:t> TTL 300 weight 50</a:t>
+            </a:r>
+            <a:endParaRPr lang="zh-CN" altLang="en-US" sz="1200" dirty="0"/>
+          </a:p>
+        </p:txBody>
+      </p:sp>
+      <p:cxnSp>
+        <p:nvCxnSpPr>
+          <p:cNvPr id="10" name="直接箭头连接符 9">
+            <a:extLst>
+              <a:ext uri="{FF2B5EF4-FFF2-40B4-BE49-F238E27FC236}">
+                <a16:creationId xmlns:a16="http://schemas.microsoft.com/office/drawing/2014/main" id="{6FA3EF47-0B9C-45BB-A67E-6B88E305CD33}"/>
+              </a:ext>
+            </a:extLst>
+          </p:cNvPr>
+          <p:cNvCxnSpPr>
+            <a:cxnSpLocks/>
+          </p:cNvCxnSpPr>
+          <p:nvPr/>
+        </p:nvCxnSpPr>
+        <p:spPr>
+          <a:xfrm>
+            <a:off x="4915619" y="786668"/>
+            <a:ext cx="1" cy="375296"/>
+          </a:xfrm>
+          <a:prstGeom prst="straightConnector1">
+            <a:avLst/>
+          </a:prstGeom>
+          <a:ln>
+            <a:tailEnd type="triangle"/>
+          </a:ln>
+        </p:spPr>
+        <p:style>
+          <a:lnRef idx="1">
+            <a:schemeClr val="dk1"/>
+          </a:lnRef>
+          <a:fillRef idx="0">
+            <a:schemeClr val="dk1"/>
+          </a:fillRef>
+          <a:effectRef idx="0">
+            <a:schemeClr val="dk1"/>
+          </a:effectRef>
+          <a:fontRef idx="minor">
+            <a:schemeClr val="tx1"/>
+          </a:fontRef>
+        </p:style>
+      </p:cxnSp>
+      <p:cxnSp>
+        <p:nvCxnSpPr>
+          <p:cNvPr id="12" name="直接箭头连接符 11">
+            <a:extLst>
+              <a:ext uri="{FF2B5EF4-FFF2-40B4-BE49-F238E27FC236}">
+                <a16:creationId xmlns:a16="http://schemas.microsoft.com/office/drawing/2014/main" id="{EB108899-53A4-4209-B148-02D21BDB139E}"/>
+              </a:ext>
+            </a:extLst>
+          </p:cNvPr>
+          <p:cNvCxnSpPr>
+            <a:cxnSpLocks/>
+            <a:endCxn id="6" idx="0"/>
+          </p:cNvCxnSpPr>
+          <p:nvPr/>
+        </p:nvCxnSpPr>
+        <p:spPr>
+          <a:xfrm flipH="1">
+            <a:off x="3981091" y="1439400"/>
+            <a:ext cx="934528" cy="687057"/>
+          </a:xfrm>
+          <a:prstGeom prst="straightConnector1">
+            <a:avLst/>
+          </a:prstGeom>
+          <a:ln>
+            <a:tailEnd type="triangle"/>
+          </a:ln>
+        </p:spPr>
+        <p:style>
+          <a:lnRef idx="1">
+            <a:schemeClr val="dk1"/>
+          </a:lnRef>
+          <a:fillRef idx="0">
+            <a:schemeClr val="dk1"/>
+          </a:fillRef>
+          <a:effectRef idx="0">
+            <a:schemeClr val="dk1"/>
+          </a:effectRef>
+          <a:fontRef idx="minor">
+            <a:schemeClr val="tx1"/>
+          </a:fontRef>
+        </p:style>
+      </p:cxnSp>
+      <p:sp>
+        <p:nvSpPr>
+          <p:cNvPr id="13" name="文本框 12">
+            <a:extLst>
+              <a:ext uri="{FF2B5EF4-FFF2-40B4-BE49-F238E27FC236}">
+                <a16:creationId xmlns:a16="http://schemas.microsoft.com/office/drawing/2014/main" id="{0306614E-54DD-499D-A88E-55EDE7695D22}"/>
+              </a:ext>
+            </a:extLst>
+          </p:cNvPr>
+          <p:cNvSpPr txBox="1"/>
+          <p:nvPr/>
+        </p:nvSpPr>
+        <p:spPr>
+          <a:xfrm>
+            <a:off x="212785" y="2024332"/>
+            <a:ext cx="2311879" cy="646331"/>
+          </a:xfrm>
+          <a:prstGeom prst="rect">
+            <a:avLst/>
+          </a:prstGeom>
+          <a:noFill/>
+        </p:spPr>
+        <p:txBody>
+          <a:bodyPr wrap="square" rtlCol="0">
+            <a:spAutoFit/>
+          </a:bodyPr>
+          <a:lstStyle/>
+          <a:p>
+            <a:r>
+              <a:rPr lang="en-US" altLang="zh-CN" sz="1200" dirty="0"/>
+              <a:t>DNS: </a:t>
+            </a:r>
+            <a:r>
+              <a:rPr lang="en-US" altLang="zh-CN" sz="1200" dirty="0">
+                <a:hlinkClick r:id="rId5"/>
+              </a:rPr>
+              <a:t>www.os30-aaa.com</a:t>
+            </a:r>
+            <a:endParaRPr lang="en-US" altLang="zh-CN" sz="1200" dirty="0"/>
+          </a:p>
+          <a:p>
+            <a:r>
+              <a:rPr lang="en-US" altLang="zh-CN" sz="1200" dirty="0"/>
+              <a:t>A: 123.123.123.123 weight 50</a:t>
+            </a:r>
+          </a:p>
+          <a:p>
+            <a:r>
+              <a:rPr lang="en-US" altLang="zh-CN" sz="1200" dirty="0"/>
+              <a:t>A: 124.124.124.124 weight 50</a:t>
+            </a:r>
+            <a:endParaRPr lang="zh-CN" altLang="en-US" sz="1200" dirty="0"/>
+          </a:p>
+        </p:txBody>
+      </p:sp>
+      <p:sp>
+        <p:nvSpPr>
+          <p:cNvPr id="14" name="文本框 13">
+            <a:extLst>
+              <a:ext uri="{FF2B5EF4-FFF2-40B4-BE49-F238E27FC236}">
+                <a16:creationId xmlns:a16="http://schemas.microsoft.com/office/drawing/2014/main" id="{50EE2B3C-742C-4E70-8C3F-674D5D48A31E}"/>
+              </a:ext>
+            </a:extLst>
+          </p:cNvPr>
+          <p:cNvSpPr txBox="1"/>
+          <p:nvPr/>
+        </p:nvSpPr>
+        <p:spPr>
+          <a:xfrm>
+            <a:off x="9137530" y="2062086"/>
+            <a:ext cx="2311879" cy="646331"/>
+          </a:xfrm>
+          <a:prstGeom prst="rect">
+            <a:avLst/>
+          </a:prstGeom>
+          <a:noFill/>
+        </p:spPr>
+        <p:txBody>
+          <a:bodyPr wrap="square" rtlCol="0">
+            <a:spAutoFit/>
+          </a:bodyPr>
+          <a:lstStyle/>
+          <a:p>
+            <a:r>
+              <a:rPr lang="en-US" altLang="zh-CN" sz="1200" dirty="0"/>
+              <a:t>DNS: </a:t>
+            </a:r>
+            <a:r>
+              <a:rPr lang="en-US" altLang="zh-CN" sz="1200" dirty="0">
+                <a:hlinkClick r:id="rId4"/>
+              </a:rPr>
+              <a:t>www.sg52-aaa.com</a:t>
+            </a:r>
+            <a:endParaRPr lang="en-US" altLang="zh-CN" sz="1200" dirty="0"/>
+          </a:p>
+          <a:p>
+            <a:r>
+              <a:rPr lang="en-US" altLang="zh-CN" sz="1200" dirty="0"/>
+              <a:t>A: 234.234.234.234 weight 50</a:t>
+            </a:r>
+          </a:p>
+          <a:p>
+            <a:r>
+              <a:rPr lang="en-US" altLang="zh-CN" sz="1200" dirty="0"/>
+              <a:t>A: 235.235.235.235 weight 50</a:t>
+            </a:r>
+            <a:endParaRPr lang="zh-CN" altLang="en-US" sz="1200" dirty="0"/>
+          </a:p>
+        </p:txBody>
+      </p:sp>
+      <p:sp>
+        <p:nvSpPr>
+          <p:cNvPr id="15" name="矩形: 圆角 14">
+            <a:extLst>
+              <a:ext uri="{FF2B5EF4-FFF2-40B4-BE49-F238E27FC236}">
+                <a16:creationId xmlns:a16="http://schemas.microsoft.com/office/drawing/2014/main" id="{2E9B3640-9E6D-4945-BEC4-09BD31B9DCB3}"/>
+              </a:ext>
+            </a:extLst>
+          </p:cNvPr>
+          <p:cNvSpPr/>
+          <p:nvPr/>
+        </p:nvSpPr>
+        <p:spPr>
+          <a:xfrm>
+            <a:off x="1666336" y="3087697"/>
+            <a:ext cx="1807234" cy="277436"/>
+          </a:xfrm>
+          <a:prstGeom prst="roundRect">
+            <a:avLst/>
+          </a:prstGeom>
+        </p:spPr>
+        <p:style>
+          <a:lnRef idx="2">
+            <a:schemeClr val="accent6"/>
+          </a:lnRef>
+          <a:fillRef idx="1">
+            <a:schemeClr val="lt1"/>
+          </a:fillRef>
+          <a:effectRef idx="0">
+            <a:schemeClr val="accent6"/>
+          </a:effectRef>
+          <a:fontRef idx="minor">
+            <a:schemeClr val="dk1"/>
+          </a:fontRef>
+        </p:style>
+        <p:txBody>
+          <a:bodyPr rtlCol="0" anchor="ctr"/>
+          <a:lstStyle/>
+          <a:p>
+            <a:pPr algn="ctr"/>
+            <a:r>
+              <a:rPr lang="en-US" altLang="zh-CN" sz="1200" dirty="0"/>
+              <a:t>VIP</a:t>
+            </a:r>
+            <a:r>
+              <a:rPr lang="zh-CN" altLang="en-US" sz="1200" dirty="0"/>
+              <a:t>层</a:t>
+            </a:r>
+            <a:r>
+              <a:rPr lang="en-US" altLang="zh-CN" sz="1200" dirty="0"/>
+              <a:t>:  123.123.123.123</a:t>
+            </a:r>
+            <a:endParaRPr lang="zh-CN" altLang="en-US" sz="1200" dirty="0"/>
+          </a:p>
+        </p:txBody>
+      </p:sp>
+      <p:sp>
+        <p:nvSpPr>
+          <p:cNvPr id="16" name="矩形: 圆角 15">
+            <a:extLst>
+              <a:ext uri="{FF2B5EF4-FFF2-40B4-BE49-F238E27FC236}">
+                <a16:creationId xmlns:a16="http://schemas.microsoft.com/office/drawing/2014/main" id="{138D6183-A9B6-427B-B7F8-D83037ED2556}"/>
+              </a:ext>
+            </a:extLst>
+          </p:cNvPr>
+          <p:cNvSpPr/>
+          <p:nvPr/>
+        </p:nvSpPr>
+        <p:spPr>
+          <a:xfrm>
+            <a:off x="3777651" y="3087697"/>
+            <a:ext cx="1807234" cy="277436"/>
+          </a:xfrm>
+          <a:prstGeom prst="roundRect">
+            <a:avLst/>
+          </a:prstGeom>
+        </p:spPr>
+        <p:style>
+          <a:lnRef idx="2">
+            <a:schemeClr val="accent6"/>
+          </a:lnRef>
+          <a:fillRef idx="1">
+            <a:schemeClr val="lt1"/>
+          </a:fillRef>
+          <a:effectRef idx="0">
+            <a:schemeClr val="accent6"/>
+          </a:effectRef>
+          <a:fontRef idx="minor">
+            <a:schemeClr val="dk1"/>
+          </a:fontRef>
+        </p:style>
+        <p:txBody>
+          <a:bodyPr rtlCol="0" anchor="ctr"/>
+          <a:lstStyle/>
+          <a:p>
+            <a:pPr algn="ctr"/>
+            <a:r>
+              <a:rPr lang="en-US" altLang="zh-CN" sz="1200" dirty="0"/>
+              <a:t>VIP</a:t>
+            </a:r>
+            <a:r>
+              <a:rPr lang="zh-CN" altLang="en-US" sz="1200" dirty="0"/>
+              <a:t>层</a:t>
+            </a:r>
+            <a:r>
+              <a:rPr lang="en-US" altLang="zh-CN" sz="1200" dirty="0"/>
+              <a:t>:  124.124.124.124</a:t>
+            </a:r>
+            <a:endParaRPr lang="zh-CN" altLang="en-US" sz="1200" dirty="0"/>
+          </a:p>
+        </p:txBody>
+      </p:sp>
+      <p:sp>
+        <p:nvSpPr>
+          <p:cNvPr id="17" name="矩形: 圆角 16">
+            <a:extLst>
+              <a:ext uri="{FF2B5EF4-FFF2-40B4-BE49-F238E27FC236}">
+                <a16:creationId xmlns:a16="http://schemas.microsoft.com/office/drawing/2014/main" id="{7F9AE9FA-1736-45F1-B66B-5AE213CBE2C7}"/>
+              </a:ext>
+            </a:extLst>
+          </p:cNvPr>
+          <p:cNvSpPr/>
+          <p:nvPr/>
+        </p:nvSpPr>
+        <p:spPr>
+          <a:xfrm>
+            <a:off x="5993921" y="3087697"/>
+            <a:ext cx="1807234" cy="277436"/>
+          </a:xfrm>
+          <a:prstGeom prst="roundRect">
+            <a:avLst/>
+          </a:prstGeom>
+        </p:spPr>
+        <p:style>
+          <a:lnRef idx="2">
+            <a:schemeClr val="accent6"/>
+          </a:lnRef>
+          <a:fillRef idx="1">
+            <a:schemeClr val="lt1"/>
+          </a:fillRef>
+          <a:effectRef idx="0">
+            <a:schemeClr val="accent6"/>
+          </a:effectRef>
+          <a:fontRef idx="minor">
+            <a:schemeClr val="dk1"/>
+          </a:fontRef>
+        </p:style>
+        <p:txBody>
+          <a:bodyPr rtlCol="0" anchor="ctr"/>
+          <a:lstStyle/>
+          <a:p>
+            <a:pPr algn="ctr"/>
+            <a:r>
+              <a:rPr lang="en-US" altLang="zh-CN" sz="1200" dirty="0"/>
+              <a:t>VIP</a:t>
+            </a:r>
+            <a:r>
+              <a:rPr lang="zh-CN" altLang="en-US" sz="1200" dirty="0"/>
+              <a:t>层</a:t>
+            </a:r>
+            <a:r>
+              <a:rPr lang="en-US" altLang="zh-CN" sz="1200" dirty="0"/>
+              <a:t>:  234.234.234.234</a:t>
+            </a:r>
+            <a:endParaRPr lang="zh-CN" altLang="en-US" sz="1200" dirty="0"/>
+          </a:p>
+        </p:txBody>
+      </p:sp>
+      <p:sp>
+        <p:nvSpPr>
+          <p:cNvPr id="18" name="矩形: 圆角 17">
+            <a:extLst>
+              <a:ext uri="{FF2B5EF4-FFF2-40B4-BE49-F238E27FC236}">
+                <a16:creationId xmlns:a16="http://schemas.microsoft.com/office/drawing/2014/main" id="{1BF2CCF6-DFA9-4ECF-B5EA-B262D133E8E8}"/>
+              </a:ext>
+            </a:extLst>
+          </p:cNvPr>
+          <p:cNvSpPr/>
+          <p:nvPr/>
+        </p:nvSpPr>
+        <p:spPr>
+          <a:xfrm>
+            <a:off x="8038381" y="3087697"/>
+            <a:ext cx="1807234" cy="277436"/>
+          </a:xfrm>
+          <a:prstGeom prst="roundRect">
+            <a:avLst/>
+          </a:prstGeom>
+        </p:spPr>
+        <p:style>
+          <a:lnRef idx="2">
+            <a:schemeClr val="accent6"/>
+          </a:lnRef>
+          <a:fillRef idx="1">
+            <a:schemeClr val="lt1"/>
+          </a:fillRef>
+          <a:effectRef idx="0">
+            <a:schemeClr val="accent6"/>
+          </a:effectRef>
+          <a:fontRef idx="minor">
+            <a:schemeClr val="dk1"/>
+          </a:fontRef>
+        </p:style>
+        <p:txBody>
+          <a:bodyPr rtlCol="0" anchor="ctr"/>
+          <a:lstStyle/>
+          <a:p>
+            <a:pPr algn="ctr"/>
+            <a:r>
+              <a:rPr lang="en-US" altLang="zh-CN" sz="1200" dirty="0"/>
+              <a:t>VIP</a:t>
+            </a:r>
+            <a:r>
+              <a:rPr lang="zh-CN" altLang="en-US" sz="1200" dirty="0"/>
+              <a:t>层</a:t>
+            </a:r>
+            <a:r>
+              <a:rPr lang="en-US" altLang="zh-CN" sz="1200" dirty="0"/>
+              <a:t>:  235.235.235.235</a:t>
+            </a:r>
+            <a:endParaRPr lang="zh-CN" altLang="en-US" sz="1200" dirty="0"/>
+          </a:p>
+        </p:txBody>
+      </p:sp>
+      <p:cxnSp>
+        <p:nvCxnSpPr>
+          <p:cNvPr id="20" name="直接箭头连接符 19">
+            <a:extLst>
+              <a:ext uri="{FF2B5EF4-FFF2-40B4-BE49-F238E27FC236}">
+                <a16:creationId xmlns:a16="http://schemas.microsoft.com/office/drawing/2014/main" id="{D9B11D23-DB58-4364-AB62-2194062D1DDC}"/>
+              </a:ext>
+            </a:extLst>
+          </p:cNvPr>
+          <p:cNvCxnSpPr>
+            <a:stCxn id="6" idx="2"/>
+            <a:endCxn id="16" idx="0"/>
+          </p:cNvCxnSpPr>
+          <p:nvPr/>
+        </p:nvCxnSpPr>
+        <p:spPr>
+          <a:xfrm>
+            <a:off x="3981091" y="2403893"/>
+            <a:ext cx="700177" cy="683804"/>
+          </a:xfrm>
+          <a:prstGeom prst="straightConnector1">
+            <a:avLst/>
+          </a:prstGeom>
+          <a:ln>
+            <a:tailEnd type="triangle"/>
+          </a:ln>
+        </p:spPr>
+        <p:style>
+          <a:lnRef idx="1">
+            <a:schemeClr val="dk1"/>
+          </a:lnRef>
+          <a:fillRef idx="0">
+            <a:schemeClr val="dk1"/>
+          </a:fillRef>
+          <a:effectRef idx="0">
+            <a:schemeClr val="dk1"/>
+          </a:effectRef>
+          <a:fontRef idx="minor">
+            <a:schemeClr val="tx1"/>
+          </a:fontRef>
+        </p:style>
+      </p:cxnSp>
+      <p:sp>
+        <p:nvSpPr>
+          <p:cNvPr id="21" name="矩形: 圆角 20">
+            <a:extLst>
+              <a:ext uri="{FF2B5EF4-FFF2-40B4-BE49-F238E27FC236}">
+                <a16:creationId xmlns:a16="http://schemas.microsoft.com/office/drawing/2014/main" id="{A601AAC6-0C07-4A7E-8F85-B54D68AC0AC0}"/>
+              </a:ext>
+            </a:extLst>
+          </p:cNvPr>
+          <p:cNvSpPr/>
+          <p:nvPr/>
+        </p:nvSpPr>
+        <p:spPr>
+          <a:xfrm>
+            <a:off x="3777651" y="3700173"/>
+            <a:ext cx="1807234" cy="277436"/>
+          </a:xfrm>
+          <a:prstGeom prst="roundRect">
+            <a:avLst/>
+          </a:prstGeom>
+        </p:spPr>
+        <p:style>
+          <a:lnRef idx="2">
+            <a:schemeClr val="accent6"/>
+          </a:lnRef>
+          <a:fillRef idx="1">
+            <a:schemeClr val="lt1"/>
+          </a:fillRef>
+          <a:effectRef idx="0">
+            <a:schemeClr val="accent6"/>
+          </a:effectRef>
+          <a:fontRef idx="minor">
+            <a:schemeClr val="dk1"/>
+          </a:fontRef>
+        </p:style>
+        <p:txBody>
+          <a:bodyPr rtlCol="0" anchor="ctr"/>
+          <a:lstStyle/>
+          <a:p>
+            <a:pPr algn="ctr"/>
+            <a:r>
+              <a:rPr lang="zh-CN" altLang="en-US" sz="1200" dirty="0"/>
+              <a:t>七层</a:t>
+            </a:r>
+            <a:r>
+              <a:rPr lang="en-US" altLang="zh-CN" sz="1200" dirty="0"/>
+              <a:t>:  10.123.123.122</a:t>
+            </a:r>
+            <a:endParaRPr lang="zh-CN" altLang="en-US" sz="1200" dirty="0"/>
+          </a:p>
+        </p:txBody>
+      </p:sp>
+      <p:sp>
+        <p:nvSpPr>
+          <p:cNvPr id="22" name="矩形: 圆角 21">
+            <a:extLst>
+              <a:ext uri="{FF2B5EF4-FFF2-40B4-BE49-F238E27FC236}">
+                <a16:creationId xmlns:a16="http://schemas.microsoft.com/office/drawing/2014/main" id="{ABE8ABFF-10A2-4BF7-937B-9A0D4F90F92E}"/>
+              </a:ext>
+            </a:extLst>
+          </p:cNvPr>
+          <p:cNvSpPr/>
+          <p:nvPr/>
+        </p:nvSpPr>
+        <p:spPr>
+          <a:xfrm>
+            <a:off x="1687901" y="3700173"/>
+            <a:ext cx="1807234" cy="277436"/>
+          </a:xfrm>
+          <a:prstGeom prst="roundRect">
+            <a:avLst/>
+          </a:prstGeom>
+        </p:spPr>
+        <p:style>
+          <a:lnRef idx="2">
+            <a:schemeClr val="accent6"/>
+          </a:lnRef>
+          <a:fillRef idx="1">
+            <a:schemeClr val="lt1"/>
+          </a:fillRef>
+          <a:effectRef idx="0">
+            <a:schemeClr val="accent6"/>
+          </a:effectRef>
+          <a:fontRef idx="minor">
+            <a:schemeClr val="dk1"/>
+          </a:fontRef>
+        </p:style>
+        <p:txBody>
+          <a:bodyPr rtlCol="0" anchor="ctr"/>
+          <a:lstStyle/>
+          <a:p>
+            <a:pPr algn="ctr"/>
+            <a:r>
+              <a:rPr lang="zh-CN" altLang="en-US" sz="1200" dirty="0"/>
+              <a:t>七层</a:t>
+            </a:r>
+            <a:r>
+              <a:rPr lang="en-US" altLang="zh-CN" sz="1200" dirty="0"/>
+              <a:t>:  10.123.123.121</a:t>
+            </a:r>
+            <a:endParaRPr lang="zh-CN" altLang="en-US" sz="1200" dirty="0"/>
+          </a:p>
+        </p:txBody>
+      </p:sp>
+      <p:sp>
+        <p:nvSpPr>
+          <p:cNvPr id="23" name="矩形: 圆角 22">
+            <a:extLst>
+              <a:ext uri="{FF2B5EF4-FFF2-40B4-BE49-F238E27FC236}">
+                <a16:creationId xmlns:a16="http://schemas.microsoft.com/office/drawing/2014/main" id="{E29229EA-8045-4B65-BBB6-7C6339EF8F02}"/>
+              </a:ext>
+            </a:extLst>
+          </p:cNvPr>
+          <p:cNvSpPr/>
+          <p:nvPr/>
+        </p:nvSpPr>
+        <p:spPr>
+          <a:xfrm>
+            <a:off x="5993921" y="3700173"/>
+            <a:ext cx="1807234" cy="277436"/>
+          </a:xfrm>
+          <a:prstGeom prst="roundRect">
+            <a:avLst/>
+          </a:prstGeom>
+        </p:spPr>
+        <p:style>
+          <a:lnRef idx="2">
+            <a:schemeClr val="accent6"/>
+          </a:lnRef>
+          <a:fillRef idx="1">
+            <a:schemeClr val="lt1"/>
+          </a:fillRef>
+          <a:effectRef idx="0">
+            <a:schemeClr val="accent6"/>
+          </a:effectRef>
+          <a:fontRef idx="minor">
+            <a:schemeClr val="dk1"/>
+          </a:fontRef>
+        </p:style>
+        <p:txBody>
+          <a:bodyPr rtlCol="0" anchor="ctr"/>
+          <a:lstStyle/>
+          <a:p>
+            <a:pPr algn="ctr"/>
+            <a:r>
+              <a:rPr lang="zh-CN" altLang="en-US" sz="1200" dirty="0"/>
+              <a:t>七层</a:t>
+            </a:r>
+            <a:r>
+              <a:rPr lang="en-US" altLang="zh-CN" sz="1200" dirty="0"/>
+              <a:t>:  10.123.123.123</a:t>
+            </a:r>
+            <a:endParaRPr lang="zh-CN" altLang="en-US" sz="1200" dirty="0"/>
+          </a:p>
+        </p:txBody>
+      </p:sp>
+      <p:sp>
+        <p:nvSpPr>
+          <p:cNvPr id="24" name="矩形: 圆角 23">
+            <a:extLst>
+              <a:ext uri="{FF2B5EF4-FFF2-40B4-BE49-F238E27FC236}">
+                <a16:creationId xmlns:a16="http://schemas.microsoft.com/office/drawing/2014/main" id="{556A20B0-24F8-46C2-B5CC-54F59219DF02}"/>
+              </a:ext>
+            </a:extLst>
+          </p:cNvPr>
+          <p:cNvSpPr/>
+          <p:nvPr/>
+        </p:nvSpPr>
+        <p:spPr>
+          <a:xfrm>
+            <a:off x="8038381" y="3700173"/>
+            <a:ext cx="1807234" cy="277436"/>
+          </a:xfrm>
+          <a:prstGeom prst="roundRect">
+            <a:avLst/>
+          </a:prstGeom>
+        </p:spPr>
+        <p:style>
+          <a:lnRef idx="2">
+            <a:schemeClr val="accent6"/>
+          </a:lnRef>
+          <a:fillRef idx="1">
+            <a:schemeClr val="lt1"/>
+          </a:fillRef>
+          <a:effectRef idx="0">
+            <a:schemeClr val="accent6"/>
+          </a:effectRef>
+          <a:fontRef idx="minor">
+            <a:schemeClr val="dk1"/>
+          </a:fontRef>
+        </p:style>
+        <p:txBody>
+          <a:bodyPr rtlCol="0" anchor="ctr"/>
+          <a:lstStyle/>
+          <a:p>
+            <a:pPr algn="ctr"/>
+            <a:r>
+              <a:rPr lang="zh-CN" altLang="en-US" sz="1200" dirty="0"/>
+              <a:t>七层</a:t>
+            </a:r>
+            <a:r>
+              <a:rPr lang="en-US" altLang="zh-CN" sz="1200" dirty="0"/>
+              <a:t>:  10.123.123.124</a:t>
+            </a:r>
+            <a:endParaRPr lang="zh-CN" altLang="en-US" sz="1200" dirty="0"/>
+          </a:p>
+        </p:txBody>
+      </p:sp>
+      <p:cxnSp>
+        <p:nvCxnSpPr>
+          <p:cNvPr id="26" name="直接箭头连接符 25">
+            <a:extLst>
+              <a:ext uri="{FF2B5EF4-FFF2-40B4-BE49-F238E27FC236}">
+                <a16:creationId xmlns:a16="http://schemas.microsoft.com/office/drawing/2014/main" id="{2EA583CF-1906-4DF8-BDE8-DA1FCA8041C3}"/>
+              </a:ext>
+            </a:extLst>
+          </p:cNvPr>
+          <p:cNvCxnSpPr>
+            <a:stCxn id="16" idx="2"/>
+            <a:endCxn id="21" idx="0"/>
+          </p:cNvCxnSpPr>
+          <p:nvPr/>
+        </p:nvCxnSpPr>
+        <p:spPr>
+          <a:xfrm>
+            <a:off x="4681268" y="3365133"/>
+            <a:ext cx="0" cy="335040"/>
+          </a:xfrm>
+          <a:prstGeom prst="straightConnector1">
+            <a:avLst/>
+          </a:prstGeom>
+          <a:ln>
+            <a:tailEnd type="triangle"/>
+          </a:ln>
+        </p:spPr>
+        <p:style>
+          <a:lnRef idx="1">
+            <a:schemeClr val="dk1"/>
+          </a:lnRef>
+          <a:fillRef idx="0">
+            <a:schemeClr val="dk1"/>
+          </a:fillRef>
+          <a:effectRef idx="0">
+            <a:schemeClr val="dk1"/>
+          </a:effectRef>
+          <a:fontRef idx="minor">
+            <a:schemeClr val="tx1"/>
+          </a:fontRef>
+        </p:style>
+      </p:cxnSp>
+      <p:sp>
+        <p:nvSpPr>
+          <p:cNvPr id="27" name="文本框 26">
+            <a:extLst>
+              <a:ext uri="{FF2B5EF4-FFF2-40B4-BE49-F238E27FC236}">
+                <a16:creationId xmlns:a16="http://schemas.microsoft.com/office/drawing/2014/main" id="{22E69F96-F645-43AE-81D2-F672FA890128}"/>
+              </a:ext>
+            </a:extLst>
+          </p:cNvPr>
+          <p:cNvSpPr txBox="1"/>
+          <p:nvPr/>
+        </p:nvSpPr>
+        <p:spPr>
+          <a:xfrm>
+            <a:off x="10293470" y="3562110"/>
+            <a:ext cx="1650521" cy="830997"/>
+          </a:xfrm>
+          <a:prstGeom prst="rect">
+            <a:avLst/>
+          </a:prstGeom>
+          <a:noFill/>
+        </p:spPr>
+        <p:txBody>
+          <a:bodyPr wrap="square" rtlCol="0">
+            <a:spAutoFit/>
+          </a:bodyPr>
+          <a:lstStyle/>
+          <a:p>
+            <a:r>
+              <a:rPr lang="zh-CN" altLang="en-US" sz="1200" b="1" dirty="0">
+                <a:solidFill>
+                  <a:srgbClr val="FF0000"/>
+                </a:solidFill>
+              </a:rPr>
+              <a:t>备注：一个</a:t>
+            </a:r>
+            <a:r>
+              <a:rPr lang="en-US" altLang="zh-CN" sz="1200" b="1" dirty="0">
+                <a:solidFill>
+                  <a:srgbClr val="FF0000"/>
+                </a:solidFill>
+              </a:rPr>
+              <a:t>VIP</a:t>
+            </a:r>
+            <a:r>
+              <a:rPr lang="zh-CN" altLang="en-US" sz="1200" b="1" dirty="0">
+                <a:solidFill>
+                  <a:srgbClr val="FF0000"/>
+                </a:solidFill>
+              </a:rPr>
+              <a:t>一般对应多个七层的接入层设备，这里画图方便一一对应</a:t>
+            </a:r>
+          </a:p>
+        </p:txBody>
+      </p:sp>
+      <p:sp>
+        <p:nvSpPr>
+          <p:cNvPr id="3" name="文本框 2">
+            <a:extLst>
+              <a:ext uri="{FF2B5EF4-FFF2-40B4-BE49-F238E27FC236}">
+                <a16:creationId xmlns:a16="http://schemas.microsoft.com/office/drawing/2014/main" id="{6B9E3F62-3B54-46AD-A9B1-13FFBC766573}"/>
+              </a:ext>
+            </a:extLst>
+          </p:cNvPr>
+          <p:cNvSpPr txBox="1"/>
+          <p:nvPr/>
+        </p:nvSpPr>
+        <p:spPr>
+          <a:xfrm>
+            <a:off x="1463616" y="2752657"/>
+            <a:ext cx="997788" cy="276999"/>
+          </a:xfrm>
+          <a:prstGeom prst="rect">
+            <a:avLst/>
+          </a:prstGeom>
+          <a:noFill/>
+        </p:spPr>
+        <p:txBody>
+          <a:bodyPr wrap="square" rtlCol="0">
+            <a:spAutoFit/>
+          </a:bodyPr>
+          <a:lstStyle/>
+          <a:p>
+            <a:r>
+              <a:rPr lang="en-US" altLang="zh-CN" sz="1200" dirty="0"/>
+              <a:t>os30</a:t>
+            </a:r>
+            <a:r>
+              <a:rPr lang="zh-CN" altLang="en-US" sz="1200" dirty="0"/>
+              <a:t>机房</a:t>
+            </a:r>
+          </a:p>
+        </p:txBody>
+      </p:sp>
+      <p:sp>
+        <p:nvSpPr>
+          <p:cNvPr id="34" name="文本框 33">
+            <a:extLst>
+              <a:ext uri="{FF2B5EF4-FFF2-40B4-BE49-F238E27FC236}">
+                <a16:creationId xmlns:a16="http://schemas.microsoft.com/office/drawing/2014/main" id="{A3DFC812-0E04-4698-9CBF-25B801C10CF2}"/>
+              </a:ext>
+            </a:extLst>
+          </p:cNvPr>
+          <p:cNvSpPr txBox="1"/>
+          <p:nvPr/>
+        </p:nvSpPr>
+        <p:spPr>
+          <a:xfrm>
+            <a:off x="5899750" y="2767859"/>
+            <a:ext cx="997788" cy="276999"/>
+          </a:xfrm>
+          <a:prstGeom prst="rect">
+            <a:avLst/>
+          </a:prstGeom>
+          <a:noFill/>
+        </p:spPr>
+        <p:txBody>
+          <a:bodyPr wrap="square" rtlCol="0">
+            <a:spAutoFit/>
+          </a:bodyPr>
+          <a:lstStyle/>
+          <a:p>
+            <a:r>
+              <a:rPr lang="en-US" altLang="zh-CN" sz="1200" dirty="0"/>
+              <a:t>sg52</a:t>
+            </a:r>
+            <a:r>
+              <a:rPr lang="zh-CN" altLang="en-US" sz="1200" dirty="0"/>
+              <a:t>机房</a:t>
+            </a:r>
+          </a:p>
+        </p:txBody>
+      </p:sp>
+      <p:cxnSp>
+        <p:nvCxnSpPr>
+          <p:cNvPr id="19" name="直接箭头连接符 18">
+            <a:extLst>
+              <a:ext uri="{FF2B5EF4-FFF2-40B4-BE49-F238E27FC236}">
+                <a16:creationId xmlns:a16="http://schemas.microsoft.com/office/drawing/2014/main" id="{EA00BE29-4837-4472-9A0E-E69334E3A8A6}"/>
+              </a:ext>
+            </a:extLst>
+          </p:cNvPr>
+          <p:cNvCxnSpPr/>
+          <p:nvPr/>
+        </p:nvCxnSpPr>
+        <p:spPr>
+          <a:xfrm>
+            <a:off x="5993921" y="779706"/>
+            <a:ext cx="0" cy="348964"/>
+          </a:xfrm>
+          <a:prstGeom prst="straightConnector1">
+            <a:avLst/>
+          </a:prstGeom>
+          <a:ln>
+            <a:tailEnd type="triangle"/>
+          </a:ln>
+        </p:spPr>
+        <p:style>
+          <a:lnRef idx="1">
+            <a:schemeClr val="accent2"/>
+          </a:lnRef>
+          <a:fillRef idx="0">
+            <a:schemeClr val="accent2"/>
+          </a:fillRef>
+          <a:effectRef idx="0">
+            <a:schemeClr val="accent2"/>
+          </a:effectRef>
+          <a:fontRef idx="minor">
+            <a:schemeClr val="tx1"/>
+          </a:fontRef>
+        </p:style>
+      </p:cxnSp>
+      <p:cxnSp>
+        <p:nvCxnSpPr>
+          <p:cNvPr id="35" name="直接箭头连接符 34">
+            <a:extLst>
+              <a:ext uri="{FF2B5EF4-FFF2-40B4-BE49-F238E27FC236}">
+                <a16:creationId xmlns:a16="http://schemas.microsoft.com/office/drawing/2014/main" id="{27C273FC-B745-43C4-983A-7D2DA86568C7}"/>
+              </a:ext>
+            </a:extLst>
+          </p:cNvPr>
+          <p:cNvCxnSpPr>
+            <a:endCxn id="7" idx="0"/>
+          </p:cNvCxnSpPr>
+          <p:nvPr/>
+        </p:nvCxnSpPr>
+        <p:spPr>
+          <a:xfrm>
+            <a:off x="5993921" y="1439400"/>
+            <a:ext cx="1368724" cy="687057"/>
+          </a:xfrm>
+          <a:prstGeom prst="straightConnector1">
+            <a:avLst/>
+          </a:prstGeom>
+          <a:ln>
+            <a:tailEnd type="triangle"/>
+          </a:ln>
+        </p:spPr>
+        <p:style>
+          <a:lnRef idx="1">
+            <a:schemeClr val="accent2"/>
+          </a:lnRef>
+          <a:fillRef idx="0">
+            <a:schemeClr val="accent2"/>
+          </a:fillRef>
+          <a:effectRef idx="0">
+            <a:schemeClr val="accent2"/>
+          </a:effectRef>
+          <a:fontRef idx="minor">
+            <a:schemeClr val="tx1"/>
+          </a:fontRef>
+        </p:style>
+      </p:cxnSp>
+      <p:cxnSp>
+        <p:nvCxnSpPr>
+          <p:cNvPr id="37" name="直接箭头连接符 36">
+            <a:extLst>
+              <a:ext uri="{FF2B5EF4-FFF2-40B4-BE49-F238E27FC236}">
+                <a16:creationId xmlns:a16="http://schemas.microsoft.com/office/drawing/2014/main" id="{8B53FD4C-14E5-4A1E-947B-E155C880D2D0}"/>
+              </a:ext>
+            </a:extLst>
+          </p:cNvPr>
+          <p:cNvCxnSpPr>
+            <a:stCxn id="7" idx="2"/>
+            <a:endCxn id="17" idx="0"/>
+          </p:cNvCxnSpPr>
+          <p:nvPr/>
+        </p:nvCxnSpPr>
+        <p:spPr>
+          <a:xfrm flipH="1">
+            <a:off x="6897538" y="2403893"/>
+            <a:ext cx="465107" cy="683804"/>
+          </a:xfrm>
+          <a:prstGeom prst="straightConnector1">
+            <a:avLst/>
+          </a:prstGeom>
+          <a:ln>
+            <a:tailEnd type="triangle"/>
+          </a:ln>
+        </p:spPr>
+        <p:style>
+          <a:lnRef idx="1">
+            <a:schemeClr val="accent2"/>
+          </a:lnRef>
+          <a:fillRef idx="0">
+            <a:schemeClr val="accent2"/>
+          </a:fillRef>
+          <a:effectRef idx="0">
+            <a:schemeClr val="accent2"/>
+          </a:effectRef>
+          <a:fontRef idx="minor">
+            <a:schemeClr val="tx1"/>
+          </a:fontRef>
+        </p:style>
+      </p:cxnSp>
+      <p:cxnSp>
+        <p:nvCxnSpPr>
+          <p:cNvPr id="39" name="直接箭头连接符 38">
+            <a:extLst>
+              <a:ext uri="{FF2B5EF4-FFF2-40B4-BE49-F238E27FC236}">
+                <a16:creationId xmlns:a16="http://schemas.microsoft.com/office/drawing/2014/main" id="{92848573-99AD-4F50-AA87-C44039E528E0}"/>
+              </a:ext>
+            </a:extLst>
+          </p:cNvPr>
+          <p:cNvCxnSpPr>
+            <a:cxnSpLocks/>
+          </p:cNvCxnSpPr>
+          <p:nvPr/>
+        </p:nvCxnSpPr>
+        <p:spPr>
+          <a:xfrm>
+            <a:off x="6929887" y="3379898"/>
+            <a:ext cx="0" cy="304690"/>
+          </a:xfrm>
+          <a:prstGeom prst="straightConnector1">
+            <a:avLst/>
+          </a:prstGeom>
+          <a:ln>
+            <a:tailEnd type="triangle"/>
+          </a:ln>
+        </p:spPr>
+        <p:style>
+          <a:lnRef idx="1">
+            <a:schemeClr val="accent2"/>
+          </a:lnRef>
+          <a:fillRef idx="0">
+            <a:schemeClr val="accent2"/>
+          </a:fillRef>
+          <a:effectRef idx="0">
+            <a:schemeClr val="accent2"/>
+          </a:effectRef>
+          <a:fontRef idx="minor">
+            <a:schemeClr val="tx1"/>
+          </a:fontRef>
+        </p:style>
+      </p:cxnSp>
+    </p:spTree>
+    <p:extLst>
+      <p:ext uri="{BB962C8B-B14F-4D97-AF65-F5344CB8AC3E}">
+        <p14:creationId xmlns:p14="http://schemas.microsoft.com/office/powerpoint/2010/main" val="1101175525"/>
+      </p:ext>
+    </p:extLst>
+  </p:cSld>
+  <p:clrMapOvr>
+    <a:masterClrMapping/>
+  </p:clrMapOvr>
+</p:sld>
+</file>
+
 <file path=ppt/theme/theme1.xml><?xml version="1.0" encoding="utf-8"?>
 <a:theme xmlns:a="http://schemas.openxmlformats.org/drawingml/2006/main" name="Office 主题​​">
   <a:themeElements>

</xml_diff>

<commit_message>
Add flow control pic
</commit_message>
<xml_diff>
--- a/ppt/tmp_ppt.pptx
+++ b/ppt/tmp_ppt.pptx
@@ -7,6 +7,7 @@
   <p:sldIdLst>
     <p:sldId id="256" r:id="rId2"/>
     <p:sldId id="257" r:id="rId3"/>
+    <p:sldId id="258" r:id="rId4"/>
   </p:sldIdLst>
   <p:sldSz cx="12192000" cy="6858000"/>
   <p:notesSz cx="6858000" cy="9144000"/>
@@ -6063,6 +6064,2373 @@
 </p:sld>
 </file>
 
+<file path=ppt/slides/slide3.xml><?xml version="1.0" encoding="utf-8"?>
+<p:sld xmlns:a="http://schemas.openxmlformats.org/drawingml/2006/main" xmlns:r="http://schemas.openxmlformats.org/officeDocument/2006/relationships" xmlns:p="http://schemas.openxmlformats.org/presentationml/2006/main">
+  <p:cSld>
+    <p:spTree>
+      <p:nvGrpSpPr>
+        <p:cNvPr id="1" name=""/>
+        <p:cNvGrpSpPr/>
+        <p:nvPr/>
+      </p:nvGrpSpPr>
+      <p:grpSpPr>
+        <a:xfrm>
+          <a:off x="0" y="0"/>
+          <a:ext cx="0" cy="0"/>
+          <a:chOff x="0" y="0"/>
+          <a:chExt cx="0" cy="0"/>
+        </a:xfrm>
+      </p:grpSpPr>
+      <p:sp>
+        <p:nvSpPr>
+          <p:cNvPr id="18" name="矩形 17">
+            <a:extLst>
+              <a:ext uri="{FF2B5EF4-FFF2-40B4-BE49-F238E27FC236}">
+                <a16:creationId xmlns:a16="http://schemas.microsoft.com/office/drawing/2014/main" id="{77F3FE3B-C56B-4FEA-8B86-9E326E1A6FE1}"/>
+              </a:ext>
+            </a:extLst>
+          </p:cNvPr>
+          <p:cNvSpPr/>
+          <p:nvPr/>
+        </p:nvSpPr>
+        <p:spPr>
+          <a:xfrm>
+            <a:off x="2438401" y="1259459"/>
+            <a:ext cx="2051647" cy="3220528"/>
+          </a:xfrm>
+          <a:prstGeom prst="rect">
+            <a:avLst/>
+          </a:prstGeom>
+        </p:spPr>
+        <p:style>
+          <a:lnRef idx="2">
+            <a:schemeClr val="accent6"/>
+          </a:lnRef>
+          <a:fillRef idx="1">
+            <a:schemeClr val="lt1"/>
+          </a:fillRef>
+          <a:effectRef idx="0">
+            <a:schemeClr val="accent6"/>
+          </a:effectRef>
+          <a:fontRef idx="minor">
+            <a:schemeClr val="dk1"/>
+          </a:fontRef>
+        </p:style>
+        <p:txBody>
+          <a:bodyPr rtlCol="0" anchor="ctr"/>
+          <a:lstStyle/>
+          <a:p>
+            <a:pPr algn="ctr"/>
+            <a:endParaRPr lang="zh-CN" altLang="en-US"/>
+          </a:p>
+        </p:txBody>
+      </p:sp>
+      <p:sp>
+        <p:nvSpPr>
+          <p:cNvPr id="17" name="矩形 16">
+            <a:extLst>
+              <a:ext uri="{FF2B5EF4-FFF2-40B4-BE49-F238E27FC236}">
+                <a16:creationId xmlns:a16="http://schemas.microsoft.com/office/drawing/2014/main" id="{CF4CE930-781E-4017-81BB-B347C39114C4}"/>
+              </a:ext>
+            </a:extLst>
+          </p:cNvPr>
+          <p:cNvSpPr/>
+          <p:nvPr/>
+        </p:nvSpPr>
+        <p:spPr>
+          <a:xfrm>
+            <a:off x="362309" y="1259458"/>
+            <a:ext cx="1938068" cy="3220528"/>
+          </a:xfrm>
+          <a:prstGeom prst="rect">
+            <a:avLst/>
+          </a:prstGeom>
+        </p:spPr>
+        <p:style>
+          <a:lnRef idx="2">
+            <a:schemeClr val="accent6"/>
+          </a:lnRef>
+          <a:fillRef idx="1">
+            <a:schemeClr val="lt1"/>
+          </a:fillRef>
+          <a:effectRef idx="0">
+            <a:schemeClr val="accent6"/>
+          </a:effectRef>
+          <a:fontRef idx="minor">
+            <a:schemeClr val="dk1"/>
+          </a:fontRef>
+        </p:style>
+        <p:txBody>
+          <a:bodyPr rtlCol="0" anchor="ctr"/>
+          <a:lstStyle/>
+          <a:p>
+            <a:pPr algn="ctr"/>
+            <a:endParaRPr lang="zh-CN" altLang="en-US"/>
+          </a:p>
+        </p:txBody>
+      </p:sp>
+      <p:sp>
+        <p:nvSpPr>
+          <p:cNvPr id="4" name="文本框 3">
+            <a:extLst>
+              <a:ext uri="{FF2B5EF4-FFF2-40B4-BE49-F238E27FC236}">
+                <a16:creationId xmlns:a16="http://schemas.microsoft.com/office/drawing/2014/main" id="{633B73AA-7EEF-4761-B4AF-B49F1F0D73A1}"/>
+              </a:ext>
+            </a:extLst>
+          </p:cNvPr>
+          <p:cNvSpPr txBox="1"/>
+          <p:nvPr/>
+        </p:nvSpPr>
+        <p:spPr>
+          <a:xfrm>
+            <a:off x="224287" y="304800"/>
+            <a:ext cx="1627517" cy="276999"/>
+          </a:xfrm>
+          <a:prstGeom prst="rect">
+            <a:avLst/>
+          </a:prstGeom>
+          <a:noFill/>
+        </p:spPr>
+        <p:txBody>
+          <a:bodyPr wrap="square" rtlCol="0">
+            <a:spAutoFit/>
+          </a:bodyPr>
+          <a:lstStyle/>
+          <a:p>
+            <a:r>
+              <a:rPr lang="zh-CN" altLang="en-US" sz="1200" dirty="0"/>
+              <a:t>缩容前</a:t>
+            </a:r>
+          </a:p>
+        </p:txBody>
+      </p:sp>
+      <p:sp>
+        <p:nvSpPr>
+          <p:cNvPr id="5" name="矩形 4">
+            <a:extLst>
+              <a:ext uri="{FF2B5EF4-FFF2-40B4-BE49-F238E27FC236}">
+                <a16:creationId xmlns:a16="http://schemas.microsoft.com/office/drawing/2014/main" id="{1A744FDA-736D-4EC9-BD05-25EA06D4BB25}"/>
+              </a:ext>
+            </a:extLst>
+          </p:cNvPr>
+          <p:cNvSpPr/>
+          <p:nvPr/>
+        </p:nvSpPr>
+        <p:spPr>
+          <a:xfrm>
+            <a:off x="477328" y="1610740"/>
+            <a:ext cx="782129" cy="276999"/>
+          </a:xfrm>
+          <a:prstGeom prst="rect">
+            <a:avLst/>
+          </a:prstGeom>
+        </p:spPr>
+        <p:style>
+          <a:lnRef idx="2">
+            <a:schemeClr val="accent6"/>
+          </a:lnRef>
+          <a:fillRef idx="1">
+            <a:schemeClr val="lt1"/>
+          </a:fillRef>
+          <a:effectRef idx="0">
+            <a:schemeClr val="accent6"/>
+          </a:effectRef>
+          <a:fontRef idx="minor">
+            <a:schemeClr val="dk1"/>
+          </a:fontRef>
+        </p:style>
+        <p:txBody>
+          <a:bodyPr rtlCol="0" anchor="ctr"/>
+          <a:lstStyle/>
+          <a:p>
+            <a:pPr algn="ctr"/>
+            <a:r>
+              <a:rPr lang="zh-CN" altLang="en-US" sz="1200" dirty="0"/>
+              <a:t>应用</a:t>
+            </a:r>
+            <a:r>
+              <a:rPr lang="en-US" altLang="zh-CN" sz="1200" dirty="0"/>
+              <a:t>A</a:t>
+            </a:r>
+            <a:endParaRPr lang="zh-CN" altLang="en-US" sz="1200" dirty="0"/>
+          </a:p>
+        </p:txBody>
+      </p:sp>
+      <p:sp>
+        <p:nvSpPr>
+          <p:cNvPr id="6" name="矩形 5">
+            <a:extLst>
+              <a:ext uri="{FF2B5EF4-FFF2-40B4-BE49-F238E27FC236}">
+                <a16:creationId xmlns:a16="http://schemas.microsoft.com/office/drawing/2014/main" id="{E8424912-57CF-4A8D-B0B9-BA7347B51E09}"/>
+              </a:ext>
+            </a:extLst>
+          </p:cNvPr>
+          <p:cNvSpPr/>
+          <p:nvPr/>
+        </p:nvSpPr>
+        <p:spPr>
+          <a:xfrm>
+            <a:off x="1342845" y="1610740"/>
+            <a:ext cx="782129" cy="276999"/>
+          </a:xfrm>
+          <a:prstGeom prst="rect">
+            <a:avLst/>
+          </a:prstGeom>
+        </p:spPr>
+        <p:style>
+          <a:lnRef idx="2">
+            <a:schemeClr val="accent6"/>
+          </a:lnRef>
+          <a:fillRef idx="1">
+            <a:schemeClr val="lt1"/>
+          </a:fillRef>
+          <a:effectRef idx="0">
+            <a:schemeClr val="accent6"/>
+          </a:effectRef>
+          <a:fontRef idx="minor">
+            <a:schemeClr val="dk1"/>
+          </a:fontRef>
+        </p:style>
+        <p:txBody>
+          <a:bodyPr rtlCol="0" anchor="ctr"/>
+          <a:lstStyle/>
+          <a:p>
+            <a:pPr algn="ctr"/>
+            <a:r>
+              <a:rPr lang="zh-CN" altLang="en-US" sz="1200" dirty="0"/>
+              <a:t>应用</a:t>
+            </a:r>
+            <a:r>
+              <a:rPr lang="en-US" altLang="zh-CN" sz="1200" dirty="0"/>
+              <a:t>A</a:t>
+            </a:r>
+            <a:endParaRPr lang="zh-CN" altLang="en-US" sz="1200" dirty="0"/>
+          </a:p>
+        </p:txBody>
+      </p:sp>
+      <p:sp>
+        <p:nvSpPr>
+          <p:cNvPr id="7" name="矩形 6">
+            <a:extLst>
+              <a:ext uri="{FF2B5EF4-FFF2-40B4-BE49-F238E27FC236}">
+                <a16:creationId xmlns:a16="http://schemas.microsoft.com/office/drawing/2014/main" id="{4F952F6C-C292-496E-87FC-45654D88533C}"/>
+              </a:ext>
+            </a:extLst>
+          </p:cNvPr>
+          <p:cNvSpPr/>
+          <p:nvPr/>
+        </p:nvSpPr>
+        <p:spPr>
+          <a:xfrm>
+            <a:off x="477327" y="1993177"/>
+            <a:ext cx="782129" cy="276999"/>
+          </a:xfrm>
+          <a:prstGeom prst="rect">
+            <a:avLst/>
+          </a:prstGeom>
+        </p:spPr>
+        <p:style>
+          <a:lnRef idx="2">
+            <a:schemeClr val="accent6"/>
+          </a:lnRef>
+          <a:fillRef idx="1">
+            <a:schemeClr val="lt1"/>
+          </a:fillRef>
+          <a:effectRef idx="0">
+            <a:schemeClr val="accent6"/>
+          </a:effectRef>
+          <a:fontRef idx="minor">
+            <a:schemeClr val="dk1"/>
+          </a:fontRef>
+        </p:style>
+        <p:txBody>
+          <a:bodyPr rtlCol="0" anchor="ctr"/>
+          <a:lstStyle/>
+          <a:p>
+            <a:pPr algn="ctr"/>
+            <a:r>
+              <a:rPr lang="zh-CN" altLang="en-US" sz="1200" dirty="0"/>
+              <a:t>应用</a:t>
+            </a:r>
+            <a:r>
+              <a:rPr lang="en-US" altLang="zh-CN" sz="1200" dirty="0"/>
+              <a:t>A</a:t>
+            </a:r>
+            <a:endParaRPr lang="zh-CN" altLang="en-US" sz="1200" dirty="0"/>
+          </a:p>
+        </p:txBody>
+      </p:sp>
+      <p:sp>
+        <p:nvSpPr>
+          <p:cNvPr id="8" name="矩形 7">
+            <a:extLst>
+              <a:ext uri="{FF2B5EF4-FFF2-40B4-BE49-F238E27FC236}">
+                <a16:creationId xmlns:a16="http://schemas.microsoft.com/office/drawing/2014/main" id="{B97C4638-8990-4C84-A3B9-E950FE7014A1}"/>
+              </a:ext>
+            </a:extLst>
+          </p:cNvPr>
+          <p:cNvSpPr/>
+          <p:nvPr/>
+        </p:nvSpPr>
+        <p:spPr>
+          <a:xfrm>
+            <a:off x="1342845" y="2012344"/>
+            <a:ext cx="782129" cy="276999"/>
+          </a:xfrm>
+          <a:prstGeom prst="rect">
+            <a:avLst/>
+          </a:prstGeom>
+        </p:spPr>
+        <p:style>
+          <a:lnRef idx="2">
+            <a:schemeClr val="accent6"/>
+          </a:lnRef>
+          <a:fillRef idx="1">
+            <a:schemeClr val="lt1"/>
+          </a:fillRef>
+          <a:effectRef idx="0">
+            <a:schemeClr val="accent6"/>
+          </a:effectRef>
+          <a:fontRef idx="minor">
+            <a:schemeClr val="dk1"/>
+          </a:fontRef>
+        </p:style>
+        <p:txBody>
+          <a:bodyPr rtlCol="0" anchor="ctr"/>
+          <a:lstStyle/>
+          <a:p>
+            <a:pPr algn="ctr"/>
+            <a:r>
+              <a:rPr lang="zh-CN" altLang="en-US" sz="1200" dirty="0"/>
+              <a:t>应用</a:t>
+            </a:r>
+            <a:r>
+              <a:rPr lang="en-US" altLang="zh-CN" sz="1200" dirty="0"/>
+              <a:t>A</a:t>
+            </a:r>
+            <a:endParaRPr lang="zh-CN" altLang="en-US" sz="1200" dirty="0"/>
+          </a:p>
+        </p:txBody>
+      </p:sp>
+      <p:sp>
+        <p:nvSpPr>
+          <p:cNvPr id="9" name="矩形 8">
+            <a:extLst>
+              <a:ext uri="{FF2B5EF4-FFF2-40B4-BE49-F238E27FC236}">
+                <a16:creationId xmlns:a16="http://schemas.microsoft.com/office/drawing/2014/main" id="{FFFBC8AB-4BC1-4AA6-BBC2-FFBF4A22B346}"/>
+              </a:ext>
+            </a:extLst>
+          </p:cNvPr>
+          <p:cNvSpPr/>
+          <p:nvPr/>
+        </p:nvSpPr>
+        <p:spPr>
+          <a:xfrm>
+            <a:off x="477326" y="2418262"/>
+            <a:ext cx="782129" cy="276999"/>
+          </a:xfrm>
+          <a:prstGeom prst="rect">
+            <a:avLst/>
+          </a:prstGeom>
+        </p:spPr>
+        <p:style>
+          <a:lnRef idx="2">
+            <a:schemeClr val="accent6"/>
+          </a:lnRef>
+          <a:fillRef idx="1">
+            <a:schemeClr val="lt1"/>
+          </a:fillRef>
+          <a:effectRef idx="0">
+            <a:schemeClr val="accent6"/>
+          </a:effectRef>
+          <a:fontRef idx="minor">
+            <a:schemeClr val="dk1"/>
+          </a:fontRef>
+        </p:style>
+        <p:txBody>
+          <a:bodyPr rtlCol="0" anchor="ctr"/>
+          <a:lstStyle/>
+          <a:p>
+            <a:pPr algn="ctr"/>
+            <a:r>
+              <a:rPr lang="zh-CN" altLang="en-US" sz="1200" dirty="0"/>
+              <a:t>应用</a:t>
+            </a:r>
+            <a:r>
+              <a:rPr lang="en-US" altLang="zh-CN" sz="1200" dirty="0"/>
+              <a:t>A</a:t>
+            </a:r>
+            <a:endParaRPr lang="zh-CN" altLang="en-US" sz="1200" dirty="0"/>
+          </a:p>
+        </p:txBody>
+      </p:sp>
+      <p:sp>
+        <p:nvSpPr>
+          <p:cNvPr id="10" name="矩形 9">
+            <a:extLst>
+              <a:ext uri="{FF2B5EF4-FFF2-40B4-BE49-F238E27FC236}">
+                <a16:creationId xmlns:a16="http://schemas.microsoft.com/office/drawing/2014/main" id="{A9BCB5A9-2DB0-44D5-B4D7-A4C215428528}"/>
+              </a:ext>
+            </a:extLst>
+          </p:cNvPr>
+          <p:cNvSpPr/>
+          <p:nvPr/>
+        </p:nvSpPr>
+        <p:spPr>
+          <a:xfrm>
+            <a:off x="1342845" y="2418262"/>
+            <a:ext cx="782129" cy="276999"/>
+          </a:xfrm>
+          <a:prstGeom prst="rect">
+            <a:avLst/>
+          </a:prstGeom>
+        </p:spPr>
+        <p:style>
+          <a:lnRef idx="2">
+            <a:schemeClr val="accent6"/>
+          </a:lnRef>
+          <a:fillRef idx="1">
+            <a:schemeClr val="lt1"/>
+          </a:fillRef>
+          <a:effectRef idx="0">
+            <a:schemeClr val="accent6"/>
+          </a:effectRef>
+          <a:fontRef idx="minor">
+            <a:schemeClr val="dk1"/>
+          </a:fontRef>
+        </p:style>
+        <p:txBody>
+          <a:bodyPr rtlCol="0" anchor="ctr"/>
+          <a:lstStyle/>
+          <a:p>
+            <a:pPr algn="ctr"/>
+            <a:r>
+              <a:rPr lang="zh-CN" altLang="en-US" sz="1200" dirty="0"/>
+              <a:t>应用</a:t>
+            </a:r>
+            <a:r>
+              <a:rPr lang="en-US" altLang="zh-CN" sz="1200" dirty="0"/>
+              <a:t>A</a:t>
+            </a:r>
+            <a:endParaRPr lang="zh-CN" altLang="en-US" sz="1200" dirty="0"/>
+          </a:p>
+        </p:txBody>
+      </p:sp>
+      <p:sp>
+        <p:nvSpPr>
+          <p:cNvPr id="11" name="矩形 10">
+            <a:extLst>
+              <a:ext uri="{FF2B5EF4-FFF2-40B4-BE49-F238E27FC236}">
+                <a16:creationId xmlns:a16="http://schemas.microsoft.com/office/drawing/2014/main" id="{68E5D0B9-DF19-429E-AE2A-D606F12FFEB9}"/>
+              </a:ext>
+            </a:extLst>
+          </p:cNvPr>
+          <p:cNvSpPr/>
+          <p:nvPr/>
+        </p:nvSpPr>
+        <p:spPr>
+          <a:xfrm>
+            <a:off x="2567796" y="1610740"/>
+            <a:ext cx="782129" cy="276999"/>
+          </a:xfrm>
+          <a:prstGeom prst="rect">
+            <a:avLst/>
+          </a:prstGeom>
+        </p:spPr>
+        <p:style>
+          <a:lnRef idx="2">
+            <a:schemeClr val="accent6"/>
+          </a:lnRef>
+          <a:fillRef idx="1">
+            <a:schemeClr val="lt1"/>
+          </a:fillRef>
+          <a:effectRef idx="0">
+            <a:schemeClr val="accent6"/>
+          </a:effectRef>
+          <a:fontRef idx="minor">
+            <a:schemeClr val="dk1"/>
+          </a:fontRef>
+        </p:style>
+        <p:txBody>
+          <a:bodyPr rtlCol="0" anchor="ctr"/>
+          <a:lstStyle/>
+          <a:p>
+            <a:pPr algn="ctr"/>
+            <a:r>
+              <a:rPr lang="zh-CN" altLang="en-US" sz="1200" dirty="0"/>
+              <a:t>应用</a:t>
+            </a:r>
+            <a:r>
+              <a:rPr lang="en-US" altLang="zh-CN" sz="1200" dirty="0"/>
+              <a:t>A</a:t>
+            </a:r>
+            <a:endParaRPr lang="zh-CN" altLang="en-US" sz="1200" dirty="0"/>
+          </a:p>
+        </p:txBody>
+      </p:sp>
+      <p:sp>
+        <p:nvSpPr>
+          <p:cNvPr id="12" name="矩形 11">
+            <a:extLst>
+              <a:ext uri="{FF2B5EF4-FFF2-40B4-BE49-F238E27FC236}">
+                <a16:creationId xmlns:a16="http://schemas.microsoft.com/office/drawing/2014/main" id="{D507E794-C980-4952-BA4C-E3AD29086FF1}"/>
+              </a:ext>
+            </a:extLst>
+          </p:cNvPr>
+          <p:cNvSpPr/>
+          <p:nvPr/>
+        </p:nvSpPr>
+        <p:spPr>
+          <a:xfrm>
+            <a:off x="3433313" y="1610740"/>
+            <a:ext cx="782129" cy="276999"/>
+          </a:xfrm>
+          <a:prstGeom prst="rect">
+            <a:avLst/>
+          </a:prstGeom>
+        </p:spPr>
+        <p:style>
+          <a:lnRef idx="2">
+            <a:schemeClr val="accent6"/>
+          </a:lnRef>
+          <a:fillRef idx="1">
+            <a:schemeClr val="lt1"/>
+          </a:fillRef>
+          <a:effectRef idx="0">
+            <a:schemeClr val="accent6"/>
+          </a:effectRef>
+          <a:fontRef idx="minor">
+            <a:schemeClr val="dk1"/>
+          </a:fontRef>
+        </p:style>
+        <p:txBody>
+          <a:bodyPr rtlCol="0" anchor="ctr"/>
+          <a:lstStyle/>
+          <a:p>
+            <a:pPr algn="ctr"/>
+            <a:r>
+              <a:rPr lang="zh-CN" altLang="en-US" sz="1200" dirty="0"/>
+              <a:t>应用</a:t>
+            </a:r>
+            <a:r>
+              <a:rPr lang="en-US" altLang="zh-CN" sz="1200" dirty="0"/>
+              <a:t>A</a:t>
+            </a:r>
+            <a:endParaRPr lang="zh-CN" altLang="en-US" sz="1200" dirty="0"/>
+          </a:p>
+        </p:txBody>
+      </p:sp>
+      <p:sp>
+        <p:nvSpPr>
+          <p:cNvPr id="13" name="矩形 12">
+            <a:extLst>
+              <a:ext uri="{FF2B5EF4-FFF2-40B4-BE49-F238E27FC236}">
+                <a16:creationId xmlns:a16="http://schemas.microsoft.com/office/drawing/2014/main" id="{DA98675B-D93F-4256-9038-D1ED9B0564A9}"/>
+              </a:ext>
+            </a:extLst>
+          </p:cNvPr>
+          <p:cNvSpPr/>
+          <p:nvPr/>
+        </p:nvSpPr>
+        <p:spPr>
+          <a:xfrm>
+            <a:off x="2567795" y="1993177"/>
+            <a:ext cx="782129" cy="276999"/>
+          </a:xfrm>
+          <a:prstGeom prst="rect">
+            <a:avLst/>
+          </a:prstGeom>
+        </p:spPr>
+        <p:style>
+          <a:lnRef idx="2">
+            <a:schemeClr val="accent6"/>
+          </a:lnRef>
+          <a:fillRef idx="1">
+            <a:schemeClr val="lt1"/>
+          </a:fillRef>
+          <a:effectRef idx="0">
+            <a:schemeClr val="accent6"/>
+          </a:effectRef>
+          <a:fontRef idx="minor">
+            <a:schemeClr val="dk1"/>
+          </a:fontRef>
+        </p:style>
+        <p:txBody>
+          <a:bodyPr rtlCol="0" anchor="ctr"/>
+          <a:lstStyle/>
+          <a:p>
+            <a:pPr algn="ctr"/>
+            <a:r>
+              <a:rPr lang="zh-CN" altLang="en-US" sz="1200" dirty="0"/>
+              <a:t>应用</a:t>
+            </a:r>
+            <a:r>
+              <a:rPr lang="en-US" altLang="zh-CN" sz="1200" dirty="0"/>
+              <a:t>A</a:t>
+            </a:r>
+            <a:endParaRPr lang="zh-CN" altLang="en-US" sz="1200" dirty="0"/>
+          </a:p>
+        </p:txBody>
+      </p:sp>
+      <p:sp>
+        <p:nvSpPr>
+          <p:cNvPr id="14" name="矩形 13">
+            <a:extLst>
+              <a:ext uri="{FF2B5EF4-FFF2-40B4-BE49-F238E27FC236}">
+                <a16:creationId xmlns:a16="http://schemas.microsoft.com/office/drawing/2014/main" id="{0A048BB5-B003-486F-BAD0-E78FED5B2FD5}"/>
+              </a:ext>
+            </a:extLst>
+          </p:cNvPr>
+          <p:cNvSpPr/>
+          <p:nvPr/>
+        </p:nvSpPr>
+        <p:spPr>
+          <a:xfrm>
+            <a:off x="3433313" y="2012344"/>
+            <a:ext cx="782129" cy="276999"/>
+          </a:xfrm>
+          <a:prstGeom prst="rect">
+            <a:avLst/>
+          </a:prstGeom>
+        </p:spPr>
+        <p:style>
+          <a:lnRef idx="2">
+            <a:schemeClr val="accent6"/>
+          </a:lnRef>
+          <a:fillRef idx="1">
+            <a:schemeClr val="lt1"/>
+          </a:fillRef>
+          <a:effectRef idx="0">
+            <a:schemeClr val="accent6"/>
+          </a:effectRef>
+          <a:fontRef idx="minor">
+            <a:schemeClr val="dk1"/>
+          </a:fontRef>
+        </p:style>
+        <p:txBody>
+          <a:bodyPr rtlCol="0" anchor="ctr"/>
+          <a:lstStyle/>
+          <a:p>
+            <a:pPr algn="ctr"/>
+            <a:r>
+              <a:rPr lang="zh-CN" altLang="en-US" sz="1200" dirty="0"/>
+              <a:t>应用</a:t>
+            </a:r>
+            <a:r>
+              <a:rPr lang="en-US" altLang="zh-CN" sz="1200" dirty="0"/>
+              <a:t>A</a:t>
+            </a:r>
+            <a:endParaRPr lang="zh-CN" altLang="en-US" sz="1200" dirty="0"/>
+          </a:p>
+        </p:txBody>
+      </p:sp>
+      <p:sp>
+        <p:nvSpPr>
+          <p:cNvPr id="15" name="矩形 14">
+            <a:extLst>
+              <a:ext uri="{FF2B5EF4-FFF2-40B4-BE49-F238E27FC236}">
+                <a16:creationId xmlns:a16="http://schemas.microsoft.com/office/drawing/2014/main" id="{CA46A514-E298-4283-976D-44EC76C5966C}"/>
+              </a:ext>
+            </a:extLst>
+          </p:cNvPr>
+          <p:cNvSpPr/>
+          <p:nvPr/>
+        </p:nvSpPr>
+        <p:spPr>
+          <a:xfrm>
+            <a:off x="2567794" y="2418262"/>
+            <a:ext cx="782129" cy="276999"/>
+          </a:xfrm>
+          <a:prstGeom prst="rect">
+            <a:avLst/>
+          </a:prstGeom>
+        </p:spPr>
+        <p:style>
+          <a:lnRef idx="2">
+            <a:schemeClr val="accent6"/>
+          </a:lnRef>
+          <a:fillRef idx="1">
+            <a:schemeClr val="lt1"/>
+          </a:fillRef>
+          <a:effectRef idx="0">
+            <a:schemeClr val="accent6"/>
+          </a:effectRef>
+          <a:fontRef idx="minor">
+            <a:schemeClr val="dk1"/>
+          </a:fontRef>
+        </p:style>
+        <p:txBody>
+          <a:bodyPr rtlCol="0" anchor="ctr"/>
+          <a:lstStyle/>
+          <a:p>
+            <a:pPr algn="ctr"/>
+            <a:r>
+              <a:rPr lang="zh-CN" altLang="en-US" sz="1200" dirty="0"/>
+              <a:t>应用</a:t>
+            </a:r>
+            <a:r>
+              <a:rPr lang="en-US" altLang="zh-CN" sz="1200" dirty="0"/>
+              <a:t>A</a:t>
+            </a:r>
+            <a:endParaRPr lang="zh-CN" altLang="en-US" sz="1200" dirty="0"/>
+          </a:p>
+        </p:txBody>
+      </p:sp>
+      <p:sp>
+        <p:nvSpPr>
+          <p:cNvPr id="16" name="矩形 15">
+            <a:extLst>
+              <a:ext uri="{FF2B5EF4-FFF2-40B4-BE49-F238E27FC236}">
+                <a16:creationId xmlns:a16="http://schemas.microsoft.com/office/drawing/2014/main" id="{AB5C317E-1813-4E44-9B83-ED99614821E9}"/>
+              </a:ext>
+            </a:extLst>
+          </p:cNvPr>
+          <p:cNvSpPr/>
+          <p:nvPr/>
+        </p:nvSpPr>
+        <p:spPr>
+          <a:xfrm>
+            <a:off x="3433313" y="2418262"/>
+            <a:ext cx="782129" cy="276999"/>
+          </a:xfrm>
+          <a:prstGeom prst="rect">
+            <a:avLst/>
+          </a:prstGeom>
+        </p:spPr>
+        <p:style>
+          <a:lnRef idx="2">
+            <a:schemeClr val="accent6"/>
+          </a:lnRef>
+          <a:fillRef idx="1">
+            <a:schemeClr val="lt1"/>
+          </a:fillRef>
+          <a:effectRef idx="0">
+            <a:schemeClr val="accent6"/>
+          </a:effectRef>
+          <a:fontRef idx="minor">
+            <a:schemeClr val="dk1"/>
+          </a:fontRef>
+        </p:style>
+        <p:txBody>
+          <a:bodyPr rtlCol="0" anchor="ctr"/>
+          <a:lstStyle/>
+          <a:p>
+            <a:pPr algn="ctr"/>
+            <a:r>
+              <a:rPr lang="zh-CN" altLang="en-US" sz="1200" dirty="0"/>
+              <a:t>应用</a:t>
+            </a:r>
+            <a:r>
+              <a:rPr lang="en-US" altLang="zh-CN" sz="1200" dirty="0"/>
+              <a:t>A</a:t>
+            </a:r>
+            <a:endParaRPr lang="zh-CN" altLang="en-US" sz="1200" dirty="0"/>
+          </a:p>
+        </p:txBody>
+      </p:sp>
+      <p:sp>
+        <p:nvSpPr>
+          <p:cNvPr id="19" name="文本框 18">
+            <a:extLst>
+              <a:ext uri="{FF2B5EF4-FFF2-40B4-BE49-F238E27FC236}">
+                <a16:creationId xmlns:a16="http://schemas.microsoft.com/office/drawing/2014/main" id="{5793AB0B-9D59-4D0F-9D50-0C29C6854ED4}"/>
+              </a:ext>
+            </a:extLst>
+          </p:cNvPr>
+          <p:cNvSpPr txBox="1"/>
+          <p:nvPr/>
+        </p:nvSpPr>
+        <p:spPr>
+          <a:xfrm>
+            <a:off x="362309" y="1285092"/>
+            <a:ext cx="1288211" cy="276999"/>
+          </a:xfrm>
+          <a:prstGeom prst="rect">
+            <a:avLst/>
+          </a:prstGeom>
+          <a:noFill/>
+        </p:spPr>
+        <p:txBody>
+          <a:bodyPr wrap="square" rtlCol="0">
+            <a:spAutoFit/>
+          </a:bodyPr>
+          <a:lstStyle/>
+          <a:p>
+            <a:r>
+              <a:rPr lang="en-US" altLang="zh-CN" sz="1200" dirty="0"/>
+              <a:t>OS30</a:t>
+            </a:r>
+            <a:r>
+              <a:rPr lang="zh-CN" altLang="en-US" sz="1200" dirty="0"/>
+              <a:t>机房</a:t>
+            </a:r>
+          </a:p>
+        </p:txBody>
+      </p:sp>
+      <p:sp>
+        <p:nvSpPr>
+          <p:cNvPr id="20" name="文本框 19">
+            <a:extLst>
+              <a:ext uri="{FF2B5EF4-FFF2-40B4-BE49-F238E27FC236}">
+                <a16:creationId xmlns:a16="http://schemas.microsoft.com/office/drawing/2014/main" id="{467AAE60-0AA7-4EAE-AD9B-B6918488EFA9}"/>
+              </a:ext>
+            </a:extLst>
+          </p:cNvPr>
+          <p:cNvSpPr txBox="1"/>
+          <p:nvPr/>
+        </p:nvSpPr>
+        <p:spPr>
+          <a:xfrm>
+            <a:off x="2438401" y="1288206"/>
+            <a:ext cx="1288211" cy="276999"/>
+          </a:xfrm>
+          <a:prstGeom prst="rect">
+            <a:avLst/>
+          </a:prstGeom>
+          <a:noFill/>
+        </p:spPr>
+        <p:txBody>
+          <a:bodyPr wrap="square" rtlCol="0">
+            <a:spAutoFit/>
+          </a:bodyPr>
+          <a:lstStyle/>
+          <a:p>
+            <a:r>
+              <a:rPr lang="en-US" altLang="zh-CN" sz="1200" dirty="0"/>
+              <a:t>SG52</a:t>
+            </a:r>
+            <a:r>
+              <a:rPr lang="zh-CN" altLang="en-US" sz="1200" dirty="0"/>
+              <a:t>机房</a:t>
+            </a:r>
+          </a:p>
+        </p:txBody>
+      </p:sp>
+      <p:sp>
+        <p:nvSpPr>
+          <p:cNvPr id="21" name="矩形 20">
+            <a:extLst>
+              <a:ext uri="{FF2B5EF4-FFF2-40B4-BE49-F238E27FC236}">
+                <a16:creationId xmlns:a16="http://schemas.microsoft.com/office/drawing/2014/main" id="{F575300F-7EE8-43C5-9819-4BB3B9418763}"/>
+              </a:ext>
+            </a:extLst>
+          </p:cNvPr>
+          <p:cNvSpPr/>
+          <p:nvPr/>
+        </p:nvSpPr>
+        <p:spPr>
+          <a:xfrm>
+            <a:off x="1439174" y="173494"/>
+            <a:ext cx="1814422" cy="344096"/>
+          </a:xfrm>
+          <a:prstGeom prst="rect">
+            <a:avLst/>
+          </a:prstGeom>
+        </p:spPr>
+        <p:style>
+          <a:lnRef idx="2">
+            <a:schemeClr val="accent6"/>
+          </a:lnRef>
+          <a:fillRef idx="1">
+            <a:schemeClr val="lt1"/>
+          </a:fillRef>
+          <a:effectRef idx="0">
+            <a:schemeClr val="accent6"/>
+          </a:effectRef>
+          <a:fontRef idx="minor">
+            <a:schemeClr val="dk1"/>
+          </a:fontRef>
+        </p:style>
+        <p:txBody>
+          <a:bodyPr rtlCol="0" anchor="ctr"/>
+          <a:lstStyle/>
+          <a:p>
+            <a:pPr algn="ctr"/>
+            <a:r>
+              <a:rPr lang="zh-CN" altLang="en-US" sz="1200" dirty="0"/>
+              <a:t>业务请求</a:t>
+            </a:r>
+          </a:p>
+        </p:txBody>
+      </p:sp>
+      <p:sp>
+        <p:nvSpPr>
+          <p:cNvPr id="22" name="矩形 21">
+            <a:extLst>
+              <a:ext uri="{FF2B5EF4-FFF2-40B4-BE49-F238E27FC236}">
+                <a16:creationId xmlns:a16="http://schemas.microsoft.com/office/drawing/2014/main" id="{A5F8C211-D580-4D27-8CD9-9439003CCB1E}"/>
+              </a:ext>
+            </a:extLst>
+          </p:cNvPr>
+          <p:cNvSpPr/>
+          <p:nvPr/>
+        </p:nvSpPr>
+        <p:spPr>
+          <a:xfrm>
+            <a:off x="477326" y="3460390"/>
+            <a:ext cx="782129" cy="276999"/>
+          </a:xfrm>
+          <a:prstGeom prst="rect">
+            <a:avLst/>
+          </a:prstGeom>
+        </p:spPr>
+        <p:style>
+          <a:lnRef idx="2">
+            <a:schemeClr val="accent6"/>
+          </a:lnRef>
+          <a:fillRef idx="1">
+            <a:schemeClr val="lt1"/>
+          </a:fillRef>
+          <a:effectRef idx="0">
+            <a:schemeClr val="accent6"/>
+          </a:effectRef>
+          <a:fontRef idx="minor">
+            <a:schemeClr val="dk1"/>
+          </a:fontRef>
+        </p:style>
+        <p:txBody>
+          <a:bodyPr rtlCol="0" anchor="ctr"/>
+          <a:lstStyle/>
+          <a:p>
+            <a:pPr algn="ctr"/>
+            <a:r>
+              <a:rPr lang="zh-CN" altLang="en-US" sz="1200" dirty="0"/>
+              <a:t>应用</a:t>
+            </a:r>
+            <a:r>
+              <a:rPr lang="en-US" altLang="zh-CN" sz="1200" dirty="0"/>
+              <a:t>B</a:t>
+            </a:r>
+            <a:endParaRPr lang="zh-CN" altLang="en-US" sz="1200" dirty="0"/>
+          </a:p>
+        </p:txBody>
+      </p:sp>
+      <p:sp>
+        <p:nvSpPr>
+          <p:cNvPr id="23" name="矩形 22">
+            <a:extLst>
+              <a:ext uri="{FF2B5EF4-FFF2-40B4-BE49-F238E27FC236}">
+                <a16:creationId xmlns:a16="http://schemas.microsoft.com/office/drawing/2014/main" id="{0A85BF82-C15A-46BE-8D2C-74BB0A9E3086}"/>
+              </a:ext>
+            </a:extLst>
+          </p:cNvPr>
+          <p:cNvSpPr/>
+          <p:nvPr/>
+        </p:nvSpPr>
+        <p:spPr>
+          <a:xfrm>
+            <a:off x="1362969" y="3460390"/>
+            <a:ext cx="782129" cy="276999"/>
+          </a:xfrm>
+          <a:prstGeom prst="rect">
+            <a:avLst/>
+          </a:prstGeom>
+        </p:spPr>
+        <p:style>
+          <a:lnRef idx="2">
+            <a:schemeClr val="accent6"/>
+          </a:lnRef>
+          <a:fillRef idx="1">
+            <a:schemeClr val="lt1"/>
+          </a:fillRef>
+          <a:effectRef idx="0">
+            <a:schemeClr val="accent6"/>
+          </a:effectRef>
+          <a:fontRef idx="minor">
+            <a:schemeClr val="dk1"/>
+          </a:fontRef>
+        </p:style>
+        <p:txBody>
+          <a:bodyPr rtlCol="0" anchor="ctr"/>
+          <a:lstStyle/>
+          <a:p>
+            <a:pPr algn="ctr"/>
+            <a:r>
+              <a:rPr lang="zh-CN" altLang="en-US" sz="1200" dirty="0"/>
+              <a:t>应用</a:t>
+            </a:r>
+            <a:r>
+              <a:rPr lang="en-US" altLang="zh-CN" sz="1200" dirty="0"/>
+              <a:t>B</a:t>
+            </a:r>
+            <a:endParaRPr lang="zh-CN" altLang="en-US" sz="1200" dirty="0"/>
+          </a:p>
+        </p:txBody>
+      </p:sp>
+      <p:sp>
+        <p:nvSpPr>
+          <p:cNvPr id="24" name="矩形 23">
+            <a:extLst>
+              <a:ext uri="{FF2B5EF4-FFF2-40B4-BE49-F238E27FC236}">
+                <a16:creationId xmlns:a16="http://schemas.microsoft.com/office/drawing/2014/main" id="{D67FB8E8-199B-4855-A944-73E2EF9169E6}"/>
+              </a:ext>
+            </a:extLst>
+          </p:cNvPr>
+          <p:cNvSpPr/>
+          <p:nvPr/>
+        </p:nvSpPr>
+        <p:spPr>
+          <a:xfrm>
+            <a:off x="477325" y="3890510"/>
+            <a:ext cx="782129" cy="276999"/>
+          </a:xfrm>
+          <a:prstGeom prst="rect">
+            <a:avLst/>
+          </a:prstGeom>
+        </p:spPr>
+        <p:style>
+          <a:lnRef idx="2">
+            <a:schemeClr val="accent6"/>
+          </a:lnRef>
+          <a:fillRef idx="1">
+            <a:schemeClr val="lt1"/>
+          </a:fillRef>
+          <a:effectRef idx="0">
+            <a:schemeClr val="accent6"/>
+          </a:effectRef>
+          <a:fontRef idx="minor">
+            <a:schemeClr val="dk1"/>
+          </a:fontRef>
+        </p:style>
+        <p:txBody>
+          <a:bodyPr rtlCol="0" anchor="ctr"/>
+          <a:lstStyle/>
+          <a:p>
+            <a:pPr algn="ctr"/>
+            <a:r>
+              <a:rPr lang="zh-CN" altLang="en-US" sz="1200" dirty="0"/>
+              <a:t>应用</a:t>
+            </a:r>
+            <a:r>
+              <a:rPr lang="en-US" altLang="zh-CN" sz="1200" dirty="0"/>
+              <a:t>B</a:t>
+            </a:r>
+            <a:endParaRPr lang="zh-CN" altLang="en-US" sz="1200" dirty="0"/>
+          </a:p>
+        </p:txBody>
+      </p:sp>
+      <p:sp>
+        <p:nvSpPr>
+          <p:cNvPr id="25" name="矩形 24">
+            <a:extLst>
+              <a:ext uri="{FF2B5EF4-FFF2-40B4-BE49-F238E27FC236}">
+                <a16:creationId xmlns:a16="http://schemas.microsoft.com/office/drawing/2014/main" id="{33EB3DAD-90E3-41E9-9AE5-065335478548}"/>
+              </a:ext>
+            </a:extLst>
+          </p:cNvPr>
+          <p:cNvSpPr/>
+          <p:nvPr/>
+        </p:nvSpPr>
+        <p:spPr>
+          <a:xfrm>
+            <a:off x="1357216" y="3898659"/>
+            <a:ext cx="782129" cy="276999"/>
+          </a:xfrm>
+          <a:prstGeom prst="rect">
+            <a:avLst/>
+          </a:prstGeom>
+        </p:spPr>
+        <p:style>
+          <a:lnRef idx="2">
+            <a:schemeClr val="accent6"/>
+          </a:lnRef>
+          <a:fillRef idx="1">
+            <a:schemeClr val="lt1"/>
+          </a:fillRef>
+          <a:effectRef idx="0">
+            <a:schemeClr val="accent6"/>
+          </a:effectRef>
+          <a:fontRef idx="minor">
+            <a:schemeClr val="dk1"/>
+          </a:fontRef>
+        </p:style>
+        <p:txBody>
+          <a:bodyPr rtlCol="0" anchor="ctr"/>
+          <a:lstStyle/>
+          <a:p>
+            <a:pPr algn="ctr"/>
+            <a:r>
+              <a:rPr lang="zh-CN" altLang="en-US" sz="1200" dirty="0"/>
+              <a:t>应用</a:t>
+            </a:r>
+            <a:r>
+              <a:rPr lang="en-US" altLang="zh-CN" sz="1200" dirty="0"/>
+              <a:t>B</a:t>
+            </a:r>
+            <a:endParaRPr lang="zh-CN" altLang="en-US" sz="1200" dirty="0"/>
+          </a:p>
+        </p:txBody>
+      </p:sp>
+      <p:sp>
+        <p:nvSpPr>
+          <p:cNvPr id="26" name="矩形 25">
+            <a:extLst>
+              <a:ext uri="{FF2B5EF4-FFF2-40B4-BE49-F238E27FC236}">
+                <a16:creationId xmlns:a16="http://schemas.microsoft.com/office/drawing/2014/main" id="{7A62D838-E890-4EE6-922A-8113775A38DD}"/>
+              </a:ext>
+            </a:extLst>
+          </p:cNvPr>
+          <p:cNvSpPr/>
+          <p:nvPr/>
+        </p:nvSpPr>
+        <p:spPr>
+          <a:xfrm>
+            <a:off x="2573547" y="3460389"/>
+            <a:ext cx="793628" cy="276999"/>
+          </a:xfrm>
+          <a:prstGeom prst="rect">
+            <a:avLst/>
+          </a:prstGeom>
+        </p:spPr>
+        <p:style>
+          <a:lnRef idx="2">
+            <a:schemeClr val="accent6"/>
+          </a:lnRef>
+          <a:fillRef idx="1">
+            <a:schemeClr val="lt1"/>
+          </a:fillRef>
+          <a:effectRef idx="0">
+            <a:schemeClr val="accent6"/>
+          </a:effectRef>
+          <a:fontRef idx="minor">
+            <a:schemeClr val="dk1"/>
+          </a:fontRef>
+        </p:style>
+        <p:txBody>
+          <a:bodyPr rtlCol="0" anchor="ctr"/>
+          <a:lstStyle/>
+          <a:p>
+            <a:pPr algn="ctr"/>
+            <a:r>
+              <a:rPr lang="zh-CN" altLang="en-US" sz="1200" dirty="0"/>
+              <a:t>应用</a:t>
+            </a:r>
+            <a:r>
+              <a:rPr lang="en-US" altLang="zh-CN" sz="1200" dirty="0"/>
+              <a:t>B</a:t>
+            </a:r>
+            <a:endParaRPr lang="zh-CN" altLang="en-US" sz="1200" dirty="0"/>
+          </a:p>
+        </p:txBody>
+      </p:sp>
+      <p:sp>
+        <p:nvSpPr>
+          <p:cNvPr id="27" name="矩形 26">
+            <a:extLst>
+              <a:ext uri="{FF2B5EF4-FFF2-40B4-BE49-F238E27FC236}">
+                <a16:creationId xmlns:a16="http://schemas.microsoft.com/office/drawing/2014/main" id="{5DDFDF19-3A52-40C8-8CB6-2F06CD7BFEC4}"/>
+              </a:ext>
+            </a:extLst>
+          </p:cNvPr>
+          <p:cNvSpPr/>
+          <p:nvPr/>
+        </p:nvSpPr>
+        <p:spPr>
+          <a:xfrm>
+            <a:off x="3502321" y="3460389"/>
+            <a:ext cx="782129" cy="276999"/>
+          </a:xfrm>
+          <a:prstGeom prst="rect">
+            <a:avLst/>
+          </a:prstGeom>
+        </p:spPr>
+        <p:style>
+          <a:lnRef idx="2">
+            <a:schemeClr val="accent6"/>
+          </a:lnRef>
+          <a:fillRef idx="1">
+            <a:schemeClr val="lt1"/>
+          </a:fillRef>
+          <a:effectRef idx="0">
+            <a:schemeClr val="accent6"/>
+          </a:effectRef>
+          <a:fontRef idx="minor">
+            <a:schemeClr val="dk1"/>
+          </a:fontRef>
+        </p:style>
+        <p:txBody>
+          <a:bodyPr rtlCol="0" anchor="ctr"/>
+          <a:lstStyle/>
+          <a:p>
+            <a:pPr algn="ctr"/>
+            <a:r>
+              <a:rPr lang="zh-CN" altLang="en-US" sz="1200" dirty="0"/>
+              <a:t>应用</a:t>
+            </a:r>
+            <a:r>
+              <a:rPr lang="en-US" altLang="zh-CN" sz="1200" dirty="0"/>
+              <a:t>B</a:t>
+            </a:r>
+            <a:endParaRPr lang="zh-CN" altLang="en-US" sz="1200" dirty="0"/>
+          </a:p>
+        </p:txBody>
+      </p:sp>
+      <p:sp>
+        <p:nvSpPr>
+          <p:cNvPr id="28" name="矩形 27">
+            <a:extLst>
+              <a:ext uri="{FF2B5EF4-FFF2-40B4-BE49-F238E27FC236}">
+                <a16:creationId xmlns:a16="http://schemas.microsoft.com/office/drawing/2014/main" id="{7688A1B4-9CA8-49FE-A8E8-A57C72D66B7D}"/>
+              </a:ext>
+            </a:extLst>
+          </p:cNvPr>
+          <p:cNvSpPr/>
+          <p:nvPr/>
+        </p:nvSpPr>
+        <p:spPr>
+          <a:xfrm>
+            <a:off x="2556295" y="3898659"/>
+            <a:ext cx="793628" cy="276999"/>
+          </a:xfrm>
+          <a:prstGeom prst="rect">
+            <a:avLst/>
+          </a:prstGeom>
+        </p:spPr>
+        <p:style>
+          <a:lnRef idx="2">
+            <a:schemeClr val="accent6"/>
+          </a:lnRef>
+          <a:fillRef idx="1">
+            <a:schemeClr val="lt1"/>
+          </a:fillRef>
+          <a:effectRef idx="0">
+            <a:schemeClr val="accent6"/>
+          </a:effectRef>
+          <a:fontRef idx="minor">
+            <a:schemeClr val="dk1"/>
+          </a:fontRef>
+        </p:style>
+        <p:txBody>
+          <a:bodyPr rtlCol="0" anchor="ctr"/>
+          <a:lstStyle/>
+          <a:p>
+            <a:pPr algn="ctr"/>
+            <a:r>
+              <a:rPr lang="zh-CN" altLang="en-US" sz="1200" dirty="0"/>
+              <a:t>应用</a:t>
+            </a:r>
+            <a:r>
+              <a:rPr lang="en-US" altLang="zh-CN" sz="1200" dirty="0"/>
+              <a:t>B</a:t>
+            </a:r>
+            <a:endParaRPr lang="zh-CN" altLang="en-US" sz="1200" dirty="0"/>
+          </a:p>
+        </p:txBody>
+      </p:sp>
+      <p:sp>
+        <p:nvSpPr>
+          <p:cNvPr id="29" name="矩形 28">
+            <a:extLst>
+              <a:ext uri="{FF2B5EF4-FFF2-40B4-BE49-F238E27FC236}">
+                <a16:creationId xmlns:a16="http://schemas.microsoft.com/office/drawing/2014/main" id="{341FF968-E40D-43F1-BA2F-7BCFE912AEB3}"/>
+              </a:ext>
+            </a:extLst>
+          </p:cNvPr>
+          <p:cNvSpPr/>
+          <p:nvPr/>
+        </p:nvSpPr>
+        <p:spPr>
+          <a:xfrm>
+            <a:off x="3496571" y="3929332"/>
+            <a:ext cx="793628" cy="276999"/>
+          </a:xfrm>
+          <a:prstGeom prst="rect">
+            <a:avLst/>
+          </a:prstGeom>
+        </p:spPr>
+        <p:style>
+          <a:lnRef idx="2">
+            <a:schemeClr val="accent6"/>
+          </a:lnRef>
+          <a:fillRef idx="1">
+            <a:schemeClr val="lt1"/>
+          </a:fillRef>
+          <a:effectRef idx="0">
+            <a:schemeClr val="accent6"/>
+          </a:effectRef>
+          <a:fontRef idx="minor">
+            <a:schemeClr val="dk1"/>
+          </a:fontRef>
+        </p:style>
+        <p:txBody>
+          <a:bodyPr rtlCol="0" anchor="ctr"/>
+          <a:lstStyle/>
+          <a:p>
+            <a:pPr algn="ctr"/>
+            <a:r>
+              <a:rPr lang="zh-CN" altLang="en-US" sz="1200" dirty="0"/>
+              <a:t>应用</a:t>
+            </a:r>
+            <a:r>
+              <a:rPr lang="en-US" altLang="zh-CN" sz="1200" dirty="0"/>
+              <a:t>B</a:t>
+            </a:r>
+            <a:endParaRPr lang="zh-CN" altLang="en-US" sz="1200" dirty="0"/>
+          </a:p>
+        </p:txBody>
+      </p:sp>
+      <p:cxnSp>
+        <p:nvCxnSpPr>
+          <p:cNvPr id="35" name="直接箭头连接符 34">
+            <a:extLst>
+              <a:ext uri="{FF2B5EF4-FFF2-40B4-BE49-F238E27FC236}">
+                <a16:creationId xmlns:a16="http://schemas.microsoft.com/office/drawing/2014/main" id="{60A6A7D1-6D9E-4FD0-9981-0BC37A07D709}"/>
+              </a:ext>
+            </a:extLst>
+          </p:cNvPr>
+          <p:cNvCxnSpPr>
+            <a:stCxn id="21" idx="2"/>
+          </p:cNvCxnSpPr>
+          <p:nvPr/>
+        </p:nvCxnSpPr>
+        <p:spPr>
+          <a:xfrm flipH="1">
+            <a:off x="1259454" y="517590"/>
+            <a:ext cx="1086931" cy="767502"/>
+          </a:xfrm>
+          <a:prstGeom prst="straightConnector1">
+            <a:avLst/>
+          </a:prstGeom>
+          <a:ln>
+            <a:tailEnd type="triangle"/>
+          </a:ln>
+        </p:spPr>
+        <p:style>
+          <a:lnRef idx="1">
+            <a:schemeClr val="accent1"/>
+          </a:lnRef>
+          <a:fillRef idx="0">
+            <a:schemeClr val="accent1"/>
+          </a:fillRef>
+          <a:effectRef idx="0">
+            <a:schemeClr val="accent1"/>
+          </a:effectRef>
+          <a:fontRef idx="minor">
+            <a:schemeClr val="tx1"/>
+          </a:fontRef>
+        </p:style>
+      </p:cxnSp>
+      <p:cxnSp>
+        <p:nvCxnSpPr>
+          <p:cNvPr id="37" name="直接箭头连接符 36">
+            <a:extLst>
+              <a:ext uri="{FF2B5EF4-FFF2-40B4-BE49-F238E27FC236}">
+                <a16:creationId xmlns:a16="http://schemas.microsoft.com/office/drawing/2014/main" id="{4754C233-6624-4CD0-8701-813A634856C3}"/>
+              </a:ext>
+            </a:extLst>
+          </p:cNvPr>
+          <p:cNvCxnSpPr>
+            <a:stCxn id="9" idx="2"/>
+            <a:endCxn id="22" idx="0"/>
+          </p:cNvCxnSpPr>
+          <p:nvPr/>
+        </p:nvCxnSpPr>
+        <p:spPr>
+          <a:xfrm>
+            <a:off x="868391" y="2695261"/>
+            <a:ext cx="0" cy="765129"/>
+          </a:xfrm>
+          <a:prstGeom prst="straightConnector1">
+            <a:avLst/>
+          </a:prstGeom>
+          <a:ln>
+            <a:tailEnd type="triangle"/>
+          </a:ln>
+        </p:spPr>
+        <p:style>
+          <a:lnRef idx="1">
+            <a:schemeClr val="accent1"/>
+          </a:lnRef>
+          <a:fillRef idx="0">
+            <a:schemeClr val="accent1"/>
+          </a:fillRef>
+          <a:effectRef idx="0">
+            <a:schemeClr val="accent1"/>
+          </a:effectRef>
+          <a:fontRef idx="minor">
+            <a:schemeClr val="tx1"/>
+          </a:fontRef>
+        </p:style>
+      </p:cxnSp>
+      <p:sp>
+        <p:nvSpPr>
+          <p:cNvPr id="38" name="文本框 37">
+            <a:extLst>
+              <a:ext uri="{FF2B5EF4-FFF2-40B4-BE49-F238E27FC236}">
+                <a16:creationId xmlns:a16="http://schemas.microsoft.com/office/drawing/2014/main" id="{2500C3E3-7A56-4585-90C2-69A36FA1C478}"/>
+              </a:ext>
+            </a:extLst>
+          </p:cNvPr>
+          <p:cNvSpPr txBox="1"/>
+          <p:nvPr/>
+        </p:nvSpPr>
+        <p:spPr>
+          <a:xfrm>
+            <a:off x="2031522" y="767029"/>
+            <a:ext cx="1049546" cy="276999"/>
+          </a:xfrm>
+          <a:prstGeom prst="rect">
+            <a:avLst/>
+          </a:prstGeom>
+          <a:noFill/>
+        </p:spPr>
+        <p:txBody>
+          <a:bodyPr wrap="square" rtlCol="0">
+            <a:spAutoFit/>
+          </a:bodyPr>
+          <a:lstStyle/>
+          <a:p>
+            <a:r>
+              <a:rPr lang="zh-CN" altLang="en-US" sz="1200" dirty="0"/>
+              <a:t>切流到</a:t>
+            </a:r>
+            <a:r>
+              <a:rPr lang="en-US" altLang="zh-CN" sz="1200" dirty="0"/>
+              <a:t>OS30</a:t>
+            </a:r>
+            <a:endParaRPr lang="zh-CN" altLang="en-US" sz="1200" dirty="0"/>
+          </a:p>
+        </p:txBody>
+      </p:sp>
+      <p:sp>
+        <p:nvSpPr>
+          <p:cNvPr id="39" name="矩形 38">
+            <a:extLst>
+              <a:ext uri="{FF2B5EF4-FFF2-40B4-BE49-F238E27FC236}">
+                <a16:creationId xmlns:a16="http://schemas.microsoft.com/office/drawing/2014/main" id="{54CA9711-BFFD-4265-A7B9-1ADD8D342729}"/>
+              </a:ext>
+            </a:extLst>
+          </p:cNvPr>
+          <p:cNvSpPr/>
+          <p:nvPr/>
+        </p:nvSpPr>
+        <p:spPr>
+          <a:xfrm>
+            <a:off x="7701955" y="1259458"/>
+            <a:ext cx="1245078" cy="3220528"/>
+          </a:xfrm>
+          <a:prstGeom prst="rect">
+            <a:avLst/>
+          </a:prstGeom>
+        </p:spPr>
+        <p:style>
+          <a:lnRef idx="2">
+            <a:schemeClr val="accent6"/>
+          </a:lnRef>
+          <a:fillRef idx="1">
+            <a:schemeClr val="lt1"/>
+          </a:fillRef>
+          <a:effectRef idx="0">
+            <a:schemeClr val="accent6"/>
+          </a:effectRef>
+          <a:fontRef idx="minor">
+            <a:schemeClr val="dk1"/>
+          </a:fontRef>
+        </p:style>
+        <p:txBody>
+          <a:bodyPr rtlCol="0" anchor="ctr"/>
+          <a:lstStyle/>
+          <a:p>
+            <a:pPr algn="ctr"/>
+            <a:endParaRPr lang="zh-CN" altLang="en-US"/>
+          </a:p>
+        </p:txBody>
+      </p:sp>
+      <p:sp>
+        <p:nvSpPr>
+          <p:cNvPr id="40" name="矩形 39">
+            <a:extLst>
+              <a:ext uri="{FF2B5EF4-FFF2-40B4-BE49-F238E27FC236}">
+                <a16:creationId xmlns:a16="http://schemas.microsoft.com/office/drawing/2014/main" id="{55BEA10E-2712-47D8-BBE3-9A3DC8DF6EB9}"/>
+              </a:ext>
+            </a:extLst>
+          </p:cNvPr>
+          <p:cNvSpPr/>
+          <p:nvPr/>
+        </p:nvSpPr>
+        <p:spPr>
+          <a:xfrm>
+            <a:off x="5949358" y="1259458"/>
+            <a:ext cx="1183252" cy="3220528"/>
+          </a:xfrm>
+          <a:prstGeom prst="rect">
+            <a:avLst/>
+          </a:prstGeom>
+        </p:spPr>
+        <p:style>
+          <a:lnRef idx="2">
+            <a:schemeClr val="accent6"/>
+          </a:lnRef>
+          <a:fillRef idx="1">
+            <a:schemeClr val="lt1"/>
+          </a:fillRef>
+          <a:effectRef idx="0">
+            <a:schemeClr val="accent6"/>
+          </a:effectRef>
+          <a:fontRef idx="minor">
+            <a:schemeClr val="dk1"/>
+          </a:fontRef>
+        </p:style>
+        <p:txBody>
+          <a:bodyPr rtlCol="0" anchor="ctr"/>
+          <a:lstStyle/>
+          <a:p>
+            <a:pPr algn="ctr"/>
+            <a:endParaRPr lang="zh-CN" altLang="en-US"/>
+          </a:p>
+        </p:txBody>
+      </p:sp>
+      <p:sp>
+        <p:nvSpPr>
+          <p:cNvPr id="41" name="文本框 40">
+            <a:extLst>
+              <a:ext uri="{FF2B5EF4-FFF2-40B4-BE49-F238E27FC236}">
+                <a16:creationId xmlns:a16="http://schemas.microsoft.com/office/drawing/2014/main" id="{F9ECBC88-0831-4F38-8B6E-C651FFC41595}"/>
+              </a:ext>
+            </a:extLst>
+          </p:cNvPr>
+          <p:cNvSpPr txBox="1"/>
+          <p:nvPr/>
+        </p:nvSpPr>
+        <p:spPr>
+          <a:xfrm>
+            <a:off x="5487840" y="304799"/>
+            <a:ext cx="1627517" cy="276999"/>
+          </a:xfrm>
+          <a:prstGeom prst="rect">
+            <a:avLst/>
+          </a:prstGeom>
+          <a:noFill/>
+        </p:spPr>
+        <p:txBody>
+          <a:bodyPr wrap="square" rtlCol="0">
+            <a:spAutoFit/>
+          </a:bodyPr>
+          <a:lstStyle/>
+          <a:p>
+            <a:r>
+              <a:rPr lang="zh-CN" altLang="en-US" sz="1200" dirty="0"/>
+              <a:t>缩容后</a:t>
+            </a:r>
+          </a:p>
+        </p:txBody>
+      </p:sp>
+      <p:sp>
+        <p:nvSpPr>
+          <p:cNvPr id="42" name="矩形 41">
+            <a:extLst>
+              <a:ext uri="{FF2B5EF4-FFF2-40B4-BE49-F238E27FC236}">
+                <a16:creationId xmlns:a16="http://schemas.microsoft.com/office/drawing/2014/main" id="{42F41C3F-46A5-43A3-86DD-BFD2505DE2BC}"/>
+              </a:ext>
+            </a:extLst>
+          </p:cNvPr>
+          <p:cNvSpPr/>
+          <p:nvPr/>
+        </p:nvSpPr>
+        <p:spPr>
+          <a:xfrm>
+            <a:off x="6064377" y="1610740"/>
+            <a:ext cx="782129" cy="276999"/>
+          </a:xfrm>
+          <a:prstGeom prst="rect">
+            <a:avLst/>
+          </a:prstGeom>
+        </p:spPr>
+        <p:style>
+          <a:lnRef idx="2">
+            <a:schemeClr val="accent6"/>
+          </a:lnRef>
+          <a:fillRef idx="1">
+            <a:schemeClr val="lt1"/>
+          </a:fillRef>
+          <a:effectRef idx="0">
+            <a:schemeClr val="accent6"/>
+          </a:effectRef>
+          <a:fontRef idx="minor">
+            <a:schemeClr val="dk1"/>
+          </a:fontRef>
+        </p:style>
+        <p:txBody>
+          <a:bodyPr rtlCol="0" anchor="ctr"/>
+          <a:lstStyle/>
+          <a:p>
+            <a:pPr algn="ctr"/>
+            <a:r>
+              <a:rPr lang="zh-CN" altLang="en-US" sz="1200" dirty="0"/>
+              <a:t>应用</a:t>
+            </a:r>
+            <a:r>
+              <a:rPr lang="en-US" altLang="zh-CN" sz="1200" dirty="0"/>
+              <a:t>A</a:t>
+            </a:r>
+            <a:endParaRPr lang="zh-CN" altLang="en-US" sz="1200" dirty="0"/>
+          </a:p>
+        </p:txBody>
+      </p:sp>
+      <p:sp>
+        <p:nvSpPr>
+          <p:cNvPr id="44" name="矩形 43">
+            <a:extLst>
+              <a:ext uri="{FF2B5EF4-FFF2-40B4-BE49-F238E27FC236}">
+                <a16:creationId xmlns:a16="http://schemas.microsoft.com/office/drawing/2014/main" id="{414CFC0D-91BA-469A-B1B1-51E817528471}"/>
+              </a:ext>
+            </a:extLst>
+          </p:cNvPr>
+          <p:cNvSpPr/>
+          <p:nvPr/>
+        </p:nvSpPr>
+        <p:spPr>
+          <a:xfrm>
+            <a:off x="6064376" y="1993177"/>
+            <a:ext cx="782129" cy="276999"/>
+          </a:xfrm>
+          <a:prstGeom prst="rect">
+            <a:avLst/>
+          </a:prstGeom>
+        </p:spPr>
+        <p:style>
+          <a:lnRef idx="2">
+            <a:schemeClr val="accent6"/>
+          </a:lnRef>
+          <a:fillRef idx="1">
+            <a:schemeClr val="lt1"/>
+          </a:fillRef>
+          <a:effectRef idx="0">
+            <a:schemeClr val="accent6"/>
+          </a:effectRef>
+          <a:fontRef idx="minor">
+            <a:schemeClr val="dk1"/>
+          </a:fontRef>
+        </p:style>
+        <p:txBody>
+          <a:bodyPr rtlCol="0" anchor="ctr"/>
+          <a:lstStyle/>
+          <a:p>
+            <a:pPr algn="ctr"/>
+            <a:r>
+              <a:rPr lang="zh-CN" altLang="en-US" sz="1200" dirty="0"/>
+              <a:t>应用</a:t>
+            </a:r>
+            <a:r>
+              <a:rPr lang="en-US" altLang="zh-CN" sz="1200" dirty="0"/>
+              <a:t>A</a:t>
+            </a:r>
+            <a:endParaRPr lang="zh-CN" altLang="en-US" sz="1200" dirty="0"/>
+          </a:p>
+        </p:txBody>
+      </p:sp>
+      <p:sp>
+        <p:nvSpPr>
+          <p:cNvPr id="46" name="矩形 45">
+            <a:extLst>
+              <a:ext uri="{FF2B5EF4-FFF2-40B4-BE49-F238E27FC236}">
+                <a16:creationId xmlns:a16="http://schemas.microsoft.com/office/drawing/2014/main" id="{78073A16-4358-43CC-9211-5CD22C95861D}"/>
+              </a:ext>
+            </a:extLst>
+          </p:cNvPr>
+          <p:cNvSpPr/>
+          <p:nvPr/>
+        </p:nvSpPr>
+        <p:spPr>
+          <a:xfrm>
+            <a:off x="6064375" y="2418262"/>
+            <a:ext cx="782129" cy="276999"/>
+          </a:xfrm>
+          <a:prstGeom prst="rect">
+            <a:avLst/>
+          </a:prstGeom>
+        </p:spPr>
+        <p:style>
+          <a:lnRef idx="2">
+            <a:schemeClr val="accent6"/>
+          </a:lnRef>
+          <a:fillRef idx="1">
+            <a:schemeClr val="lt1"/>
+          </a:fillRef>
+          <a:effectRef idx="0">
+            <a:schemeClr val="accent6"/>
+          </a:effectRef>
+          <a:fontRef idx="minor">
+            <a:schemeClr val="dk1"/>
+          </a:fontRef>
+        </p:style>
+        <p:txBody>
+          <a:bodyPr rtlCol="0" anchor="ctr"/>
+          <a:lstStyle/>
+          <a:p>
+            <a:pPr algn="ctr"/>
+            <a:r>
+              <a:rPr lang="zh-CN" altLang="en-US" sz="1200" dirty="0"/>
+              <a:t>应用</a:t>
+            </a:r>
+            <a:r>
+              <a:rPr lang="en-US" altLang="zh-CN" sz="1200" dirty="0"/>
+              <a:t>A</a:t>
+            </a:r>
+            <a:endParaRPr lang="zh-CN" altLang="en-US" sz="1200" dirty="0"/>
+          </a:p>
+        </p:txBody>
+      </p:sp>
+      <p:sp>
+        <p:nvSpPr>
+          <p:cNvPr id="48" name="矩形 47">
+            <a:extLst>
+              <a:ext uri="{FF2B5EF4-FFF2-40B4-BE49-F238E27FC236}">
+                <a16:creationId xmlns:a16="http://schemas.microsoft.com/office/drawing/2014/main" id="{F8428F4B-9C39-48CD-8E03-4B6FD462944C}"/>
+              </a:ext>
+            </a:extLst>
+          </p:cNvPr>
+          <p:cNvSpPr/>
+          <p:nvPr/>
+        </p:nvSpPr>
+        <p:spPr>
+          <a:xfrm>
+            <a:off x="7831349" y="1610739"/>
+            <a:ext cx="782129" cy="276999"/>
+          </a:xfrm>
+          <a:prstGeom prst="rect">
+            <a:avLst/>
+          </a:prstGeom>
+        </p:spPr>
+        <p:style>
+          <a:lnRef idx="2">
+            <a:schemeClr val="accent6"/>
+          </a:lnRef>
+          <a:fillRef idx="1">
+            <a:schemeClr val="lt1"/>
+          </a:fillRef>
+          <a:effectRef idx="0">
+            <a:schemeClr val="accent6"/>
+          </a:effectRef>
+          <a:fontRef idx="minor">
+            <a:schemeClr val="dk1"/>
+          </a:fontRef>
+        </p:style>
+        <p:txBody>
+          <a:bodyPr rtlCol="0" anchor="ctr"/>
+          <a:lstStyle/>
+          <a:p>
+            <a:pPr algn="ctr"/>
+            <a:r>
+              <a:rPr lang="zh-CN" altLang="en-US" sz="1200" dirty="0"/>
+              <a:t>应用</a:t>
+            </a:r>
+            <a:r>
+              <a:rPr lang="en-US" altLang="zh-CN" sz="1200" dirty="0"/>
+              <a:t>A</a:t>
+            </a:r>
+            <a:endParaRPr lang="zh-CN" altLang="en-US" sz="1200" dirty="0"/>
+          </a:p>
+        </p:txBody>
+      </p:sp>
+      <p:sp>
+        <p:nvSpPr>
+          <p:cNvPr id="50" name="矩形 49">
+            <a:extLst>
+              <a:ext uri="{FF2B5EF4-FFF2-40B4-BE49-F238E27FC236}">
+                <a16:creationId xmlns:a16="http://schemas.microsoft.com/office/drawing/2014/main" id="{06E41AAC-4958-4DE1-B178-CFD188A44D79}"/>
+              </a:ext>
+            </a:extLst>
+          </p:cNvPr>
+          <p:cNvSpPr/>
+          <p:nvPr/>
+        </p:nvSpPr>
+        <p:spPr>
+          <a:xfrm>
+            <a:off x="7831348" y="1993176"/>
+            <a:ext cx="782129" cy="276999"/>
+          </a:xfrm>
+          <a:prstGeom prst="rect">
+            <a:avLst/>
+          </a:prstGeom>
+        </p:spPr>
+        <p:style>
+          <a:lnRef idx="2">
+            <a:schemeClr val="accent6"/>
+          </a:lnRef>
+          <a:fillRef idx="1">
+            <a:schemeClr val="lt1"/>
+          </a:fillRef>
+          <a:effectRef idx="0">
+            <a:schemeClr val="accent6"/>
+          </a:effectRef>
+          <a:fontRef idx="minor">
+            <a:schemeClr val="dk1"/>
+          </a:fontRef>
+        </p:style>
+        <p:txBody>
+          <a:bodyPr rtlCol="0" anchor="ctr"/>
+          <a:lstStyle/>
+          <a:p>
+            <a:pPr algn="ctr"/>
+            <a:r>
+              <a:rPr lang="zh-CN" altLang="en-US" sz="1200" dirty="0"/>
+              <a:t>应用</a:t>
+            </a:r>
+            <a:r>
+              <a:rPr lang="en-US" altLang="zh-CN" sz="1200" dirty="0"/>
+              <a:t>A</a:t>
+            </a:r>
+            <a:endParaRPr lang="zh-CN" altLang="en-US" sz="1200" dirty="0"/>
+          </a:p>
+        </p:txBody>
+      </p:sp>
+      <p:sp>
+        <p:nvSpPr>
+          <p:cNvPr id="52" name="矩形 51">
+            <a:extLst>
+              <a:ext uri="{FF2B5EF4-FFF2-40B4-BE49-F238E27FC236}">
+                <a16:creationId xmlns:a16="http://schemas.microsoft.com/office/drawing/2014/main" id="{FAF23017-78CF-4CA1-8908-32142FFE0E56}"/>
+              </a:ext>
+            </a:extLst>
+          </p:cNvPr>
+          <p:cNvSpPr/>
+          <p:nvPr/>
+        </p:nvSpPr>
+        <p:spPr>
+          <a:xfrm>
+            <a:off x="7831347" y="2418261"/>
+            <a:ext cx="782129" cy="276999"/>
+          </a:xfrm>
+          <a:prstGeom prst="rect">
+            <a:avLst/>
+          </a:prstGeom>
+        </p:spPr>
+        <p:style>
+          <a:lnRef idx="2">
+            <a:schemeClr val="accent6"/>
+          </a:lnRef>
+          <a:fillRef idx="1">
+            <a:schemeClr val="lt1"/>
+          </a:fillRef>
+          <a:effectRef idx="0">
+            <a:schemeClr val="accent6"/>
+          </a:effectRef>
+          <a:fontRef idx="minor">
+            <a:schemeClr val="dk1"/>
+          </a:fontRef>
+        </p:style>
+        <p:txBody>
+          <a:bodyPr rtlCol="0" anchor="ctr"/>
+          <a:lstStyle/>
+          <a:p>
+            <a:pPr algn="ctr"/>
+            <a:r>
+              <a:rPr lang="zh-CN" altLang="en-US" sz="1200" dirty="0"/>
+              <a:t>应用</a:t>
+            </a:r>
+            <a:r>
+              <a:rPr lang="en-US" altLang="zh-CN" sz="1200" dirty="0"/>
+              <a:t>A</a:t>
+            </a:r>
+            <a:endParaRPr lang="zh-CN" altLang="en-US" sz="1200" dirty="0"/>
+          </a:p>
+        </p:txBody>
+      </p:sp>
+      <p:sp>
+        <p:nvSpPr>
+          <p:cNvPr id="54" name="文本框 53">
+            <a:extLst>
+              <a:ext uri="{FF2B5EF4-FFF2-40B4-BE49-F238E27FC236}">
+                <a16:creationId xmlns:a16="http://schemas.microsoft.com/office/drawing/2014/main" id="{3A3FF7B1-4D75-467C-A9E3-E2C0C7BC38E6}"/>
+              </a:ext>
+            </a:extLst>
+          </p:cNvPr>
+          <p:cNvSpPr txBox="1"/>
+          <p:nvPr/>
+        </p:nvSpPr>
+        <p:spPr>
+          <a:xfrm>
+            <a:off x="5949358" y="1285092"/>
+            <a:ext cx="1288211" cy="276999"/>
+          </a:xfrm>
+          <a:prstGeom prst="rect">
+            <a:avLst/>
+          </a:prstGeom>
+          <a:noFill/>
+        </p:spPr>
+        <p:txBody>
+          <a:bodyPr wrap="square" rtlCol="0">
+            <a:spAutoFit/>
+          </a:bodyPr>
+          <a:lstStyle/>
+          <a:p>
+            <a:r>
+              <a:rPr lang="en-US" altLang="zh-CN" sz="1200" dirty="0"/>
+              <a:t>OS30</a:t>
+            </a:r>
+            <a:r>
+              <a:rPr lang="zh-CN" altLang="en-US" sz="1200" dirty="0"/>
+              <a:t>机房</a:t>
+            </a:r>
+          </a:p>
+        </p:txBody>
+      </p:sp>
+      <p:sp>
+        <p:nvSpPr>
+          <p:cNvPr id="55" name="文本框 54">
+            <a:extLst>
+              <a:ext uri="{FF2B5EF4-FFF2-40B4-BE49-F238E27FC236}">
+                <a16:creationId xmlns:a16="http://schemas.microsoft.com/office/drawing/2014/main" id="{6206E1D7-837E-4B27-B2E3-7E1F1EB86B5B}"/>
+              </a:ext>
+            </a:extLst>
+          </p:cNvPr>
+          <p:cNvSpPr txBox="1"/>
+          <p:nvPr/>
+        </p:nvSpPr>
+        <p:spPr>
+          <a:xfrm>
+            <a:off x="7701954" y="1288205"/>
+            <a:ext cx="1288211" cy="276999"/>
+          </a:xfrm>
+          <a:prstGeom prst="rect">
+            <a:avLst/>
+          </a:prstGeom>
+          <a:noFill/>
+        </p:spPr>
+        <p:txBody>
+          <a:bodyPr wrap="square" rtlCol="0">
+            <a:spAutoFit/>
+          </a:bodyPr>
+          <a:lstStyle/>
+          <a:p>
+            <a:r>
+              <a:rPr lang="en-US" altLang="zh-CN" sz="1200" dirty="0"/>
+              <a:t>SG52</a:t>
+            </a:r>
+            <a:r>
+              <a:rPr lang="zh-CN" altLang="en-US" sz="1200" dirty="0"/>
+              <a:t>机房</a:t>
+            </a:r>
+          </a:p>
+        </p:txBody>
+      </p:sp>
+      <p:sp>
+        <p:nvSpPr>
+          <p:cNvPr id="56" name="矩形 55">
+            <a:extLst>
+              <a:ext uri="{FF2B5EF4-FFF2-40B4-BE49-F238E27FC236}">
+                <a16:creationId xmlns:a16="http://schemas.microsoft.com/office/drawing/2014/main" id="{38C40907-C948-4345-AF71-24C2DAD8C35A}"/>
+              </a:ext>
+            </a:extLst>
+          </p:cNvPr>
+          <p:cNvSpPr/>
+          <p:nvPr/>
+        </p:nvSpPr>
+        <p:spPr>
+          <a:xfrm>
+            <a:off x="6702727" y="173493"/>
+            <a:ext cx="1814422" cy="344096"/>
+          </a:xfrm>
+          <a:prstGeom prst="rect">
+            <a:avLst/>
+          </a:prstGeom>
+        </p:spPr>
+        <p:style>
+          <a:lnRef idx="2">
+            <a:schemeClr val="accent6"/>
+          </a:lnRef>
+          <a:fillRef idx="1">
+            <a:schemeClr val="lt1"/>
+          </a:fillRef>
+          <a:effectRef idx="0">
+            <a:schemeClr val="accent6"/>
+          </a:effectRef>
+          <a:fontRef idx="minor">
+            <a:schemeClr val="dk1"/>
+          </a:fontRef>
+        </p:style>
+        <p:txBody>
+          <a:bodyPr rtlCol="0" anchor="ctr"/>
+          <a:lstStyle/>
+          <a:p>
+            <a:pPr algn="ctr"/>
+            <a:r>
+              <a:rPr lang="zh-CN" altLang="en-US" sz="1200" dirty="0"/>
+              <a:t>业务请求</a:t>
+            </a:r>
+          </a:p>
+        </p:txBody>
+      </p:sp>
+      <p:sp>
+        <p:nvSpPr>
+          <p:cNvPr id="57" name="矩形 56">
+            <a:extLst>
+              <a:ext uri="{FF2B5EF4-FFF2-40B4-BE49-F238E27FC236}">
+                <a16:creationId xmlns:a16="http://schemas.microsoft.com/office/drawing/2014/main" id="{68133B6B-D1C4-43E3-A3F5-B30B5B8BDA53}"/>
+              </a:ext>
+            </a:extLst>
+          </p:cNvPr>
+          <p:cNvSpPr/>
+          <p:nvPr/>
+        </p:nvSpPr>
+        <p:spPr>
+          <a:xfrm>
+            <a:off x="6064375" y="3460390"/>
+            <a:ext cx="782129" cy="276999"/>
+          </a:xfrm>
+          <a:prstGeom prst="rect">
+            <a:avLst/>
+          </a:prstGeom>
+        </p:spPr>
+        <p:style>
+          <a:lnRef idx="2">
+            <a:schemeClr val="accent6"/>
+          </a:lnRef>
+          <a:fillRef idx="1">
+            <a:schemeClr val="lt1"/>
+          </a:fillRef>
+          <a:effectRef idx="0">
+            <a:schemeClr val="accent6"/>
+          </a:effectRef>
+          <a:fontRef idx="minor">
+            <a:schemeClr val="dk1"/>
+          </a:fontRef>
+        </p:style>
+        <p:txBody>
+          <a:bodyPr rtlCol="0" anchor="ctr"/>
+          <a:lstStyle/>
+          <a:p>
+            <a:pPr algn="ctr"/>
+            <a:r>
+              <a:rPr lang="zh-CN" altLang="en-US" sz="1200" dirty="0"/>
+              <a:t>应用</a:t>
+            </a:r>
+            <a:r>
+              <a:rPr lang="en-US" altLang="zh-CN" sz="1200" dirty="0"/>
+              <a:t>B</a:t>
+            </a:r>
+            <a:endParaRPr lang="zh-CN" altLang="en-US" sz="1200" dirty="0"/>
+          </a:p>
+        </p:txBody>
+      </p:sp>
+      <p:sp>
+        <p:nvSpPr>
+          <p:cNvPr id="59" name="矩形 58">
+            <a:extLst>
+              <a:ext uri="{FF2B5EF4-FFF2-40B4-BE49-F238E27FC236}">
+                <a16:creationId xmlns:a16="http://schemas.microsoft.com/office/drawing/2014/main" id="{D4680896-3649-4052-8963-237790A6FD75}"/>
+              </a:ext>
+            </a:extLst>
+          </p:cNvPr>
+          <p:cNvSpPr/>
+          <p:nvPr/>
+        </p:nvSpPr>
+        <p:spPr>
+          <a:xfrm>
+            <a:off x="6064374" y="3890510"/>
+            <a:ext cx="782129" cy="276999"/>
+          </a:xfrm>
+          <a:prstGeom prst="rect">
+            <a:avLst/>
+          </a:prstGeom>
+        </p:spPr>
+        <p:style>
+          <a:lnRef idx="2">
+            <a:schemeClr val="accent6"/>
+          </a:lnRef>
+          <a:fillRef idx="1">
+            <a:schemeClr val="lt1"/>
+          </a:fillRef>
+          <a:effectRef idx="0">
+            <a:schemeClr val="accent6"/>
+          </a:effectRef>
+          <a:fontRef idx="minor">
+            <a:schemeClr val="dk1"/>
+          </a:fontRef>
+        </p:style>
+        <p:txBody>
+          <a:bodyPr rtlCol="0" anchor="ctr"/>
+          <a:lstStyle/>
+          <a:p>
+            <a:pPr algn="ctr"/>
+            <a:r>
+              <a:rPr lang="zh-CN" altLang="en-US" sz="1200" dirty="0"/>
+              <a:t>应用</a:t>
+            </a:r>
+            <a:r>
+              <a:rPr lang="en-US" altLang="zh-CN" sz="1200" dirty="0"/>
+              <a:t>B</a:t>
+            </a:r>
+            <a:endParaRPr lang="zh-CN" altLang="en-US" sz="1200" dirty="0"/>
+          </a:p>
+        </p:txBody>
+      </p:sp>
+      <p:sp>
+        <p:nvSpPr>
+          <p:cNvPr id="61" name="矩形 60">
+            <a:extLst>
+              <a:ext uri="{FF2B5EF4-FFF2-40B4-BE49-F238E27FC236}">
+                <a16:creationId xmlns:a16="http://schemas.microsoft.com/office/drawing/2014/main" id="{AF705856-56A6-40E7-8EC9-18485CB3B179}"/>
+              </a:ext>
+            </a:extLst>
+          </p:cNvPr>
+          <p:cNvSpPr/>
+          <p:nvPr/>
+        </p:nvSpPr>
+        <p:spPr>
+          <a:xfrm>
+            <a:off x="7837100" y="3460388"/>
+            <a:ext cx="793628" cy="276999"/>
+          </a:xfrm>
+          <a:prstGeom prst="rect">
+            <a:avLst/>
+          </a:prstGeom>
+        </p:spPr>
+        <p:style>
+          <a:lnRef idx="2">
+            <a:schemeClr val="accent6"/>
+          </a:lnRef>
+          <a:fillRef idx="1">
+            <a:schemeClr val="lt1"/>
+          </a:fillRef>
+          <a:effectRef idx="0">
+            <a:schemeClr val="accent6"/>
+          </a:effectRef>
+          <a:fontRef idx="minor">
+            <a:schemeClr val="dk1"/>
+          </a:fontRef>
+        </p:style>
+        <p:txBody>
+          <a:bodyPr rtlCol="0" anchor="ctr"/>
+          <a:lstStyle/>
+          <a:p>
+            <a:pPr algn="ctr"/>
+            <a:r>
+              <a:rPr lang="zh-CN" altLang="en-US" sz="1200" dirty="0"/>
+              <a:t>应用</a:t>
+            </a:r>
+            <a:r>
+              <a:rPr lang="en-US" altLang="zh-CN" sz="1200" dirty="0"/>
+              <a:t>B</a:t>
+            </a:r>
+            <a:endParaRPr lang="zh-CN" altLang="en-US" sz="1200" dirty="0"/>
+          </a:p>
+        </p:txBody>
+      </p:sp>
+      <p:sp>
+        <p:nvSpPr>
+          <p:cNvPr id="63" name="矩形 62">
+            <a:extLst>
+              <a:ext uri="{FF2B5EF4-FFF2-40B4-BE49-F238E27FC236}">
+                <a16:creationId xmlns:a16="http://schemas.microsoft.com/office/drawing/2014/main" id="{F7536BE8-C640-4BC0-9602-FABB66130978}"/>
+              </a:ext>
+            </a:extLst>
+          </p:cNvPr>
+          <p:cNvSpPr/>
+          <p:nvPr/>
+        </p:nvSpPr>
+        <p:spPr>
+          <a:xfrm>
+            <a:off x="7819848" y="3898658"/>
+            <a:ext cx="793628" cy="276999"/>
+          </a:xfrm>
+          <a:prstGeom prst="rect">
+            <a:avLst/>
+          </a:prstGeom>
+        </p:spPr>
+        <p:style>
+          <a:lnRef idx="2">
+            <a:schemeClr val="accent6"/>
+          </a:lnRef>
+          <a:fillRef idx="1">
+            <a:schemeClr val="lt1"/>
+          </a:fillRef>
+          <a:effectRef idx="0">
+            <a:schemeClr val="accent6"/>
+          </a:effectRef>
+          <a:fontRef idx="minor">
+            <a:schemeClr val="dk1"/>
+          </a:fontRef>
+        </p:style>
+        <p:txBody>
+          <a:bodyPr rtlCol="0" anchor="ctr"/>
+          <a:lstStyle/>
+          <a:p>
+            <a:pPr algn="ctr"/>
+            <a:r>
+              <a:rPr lang="zh-CN" altLang="en-US" sz="1200" dirty="0"/>
+              <a:t>应用</a:t>
+            </a:r>
+            <a:r>
+              <a:rPr lang="en-US" altLang="zh-CN" sz="1200" dirty="0"/>
+              <a:t>B</a:t>
+            </a:r>
+            <a:endParaRPr lang="zh-CN" altLang="en-US" sz="1200" dirty="0"/>
+          </a:p>
+        </p:txBody>
+      </p:sp>
+      <p:cxnSp>
+        <p:nvCxnSpPr>
+          <p:cNvPr id="65" name="直接箭头连接符 64">
+            <a:extLst>
+              <a:ext uri="{FF2B5EF4-FFF2-40B4-BE49-F238E27FC236}">
+                <a16:creationId xmlns:a16="http://schemas.microsoft.com/office/drawing/2014/main" id="{19854B25-0BEC-48F0-9E7A-A5101ED354FF}"/>
+              </a:ext>
+            </a:extLst>
+          </p:cNvPr>
+          <p:cNvCxnSpPr>
+            <a:stCxn id="56" idx="2"/>
+          </p:cNvCxnSpPr>
+          <p:nvPr/>
+        </p:nvCxnSpPr>
+        <p:spPr>
+          <a:xfrm flipH="1">
+            <a:off x="6523007" y="517589"/>
+            <a:ext cx="1086931" cy="767502"/>
+          </a:xfrm>
+          <a:prstGeom prst="straightConnector1">
+            <a:avLst/>
+          </a:prstGeom>
+          <a:ln>
+            <a:tailEnd type="triangle"/>
+          </a:ln>
+        </p:spPr>
+        <p:style>
+          <a:lnRef idx="1">
+            <a:schemeClr val="accent1"/>
+          </a:lnRef>
+          <a:fillRef idx="0">
+            <a:schemeClr val="accent1"/>
+          </a:fillRef>
+          <a:effectRef idx="0">
+            <a:schemeClr val="accent1"/>
+          </a:effectRef>
+          <a:fontRef idx="minor">
+            <a:schemeClr val="tx1"/>
+          </a:fontRef>
+        </p:style>
+      </p:cxnSp>
+      <p:cxnSp>
+        <p:nvCxnSpPr>
+          <p:cNvPr id="66" name="直接箭头连接符 65">
+            <a:extLst>
+              <a:ext uri="{FF2B5EF4-FFF2-40B4-BE49-F238E27FC236}">
+                <a16:creationId xmlns:a16="http://schemas.microsoft.com/office/drawing/2014/main" id="{A7E061EC-057A-44B8-A94A-6433B3DDF90D}"/>
+              </a:ext>
+            </a:extLst>
+          </p:cNvPr>
+          <p:cNvCxnSpPr>
+            <a:stCxn id="46" idx="2"/>
+            <a:endCxn id="57" idx="0"/>
+          </p:cNvCxnSpPr>
+          <p:nvPr/>
+        </p:nvCxnSpPr>
+        <p:spPr>
+          <a:xfrm>
+            <a:off x="6455440" y="2695261"/>
+            <a:ext cx="0" cy="765129"/>
+          </a:xfrm>
+          <a:prstGeom prst="straightConnector1">
+            <a:avLst/>
+          </a:prstGeom>
+          <a:ln>
+            <a:tailEnd type="triangle"/>
+          </a:ln>
+        </p:spPr>
+        <p:style>
+          <a:lnRef idx="1">
+            <a:schemeClr val="accent2"/>
+          </a:lnRef>
+          <a:fillRef idx="0">
+            <a:schemeClr val="accent2"/>
+          </a:fillRef>
+          <a:effectRef idx="0">
+            <a:schemeClr val="accent2"/>
+          </a:effectRef>
+          <a:fontRef idx="minor">
+            <a:schemeClr val="tx1"/>
+          </a:fontRef>
+        </p:style>
+      </p:cxnSp>
+      <p:sp>
+        <p:nvSpPr>
+          <p:cNvPr id="67" name="文本框 66">
+            <a:extLst>
+              <a:ext uri="{FF2B5EF4-FFF2-40B4-BE49-F238E27FC236}">
+                <a16:creationId xmlns:a16="http://schemas.microsoft.com/office/drawing/2014/main" id="{DF286DE0-255D-4097-9AA2-CCD59A56948C}"/>
+              </a:ext>
+            </a:extLst>
+          </p:cNvPr>
+          <p:cNvSpPr txBox="1"/>
+          <p:nvPr/>
+        </p:nvSpPr>
+        <p:spPr>
+          <a:xfrm>
+            <a:off x="7295075" y="767028"/>
+            <a:ext cx="1049546" cy="276999"/>
+          </a:xfrm>
+          <a:prstGeom prst="rect">
+            <a:avLst/>
+          </a:prstGeom>
+          <a:noFill/>
+        </p:spPr>
+        <p:txBody>
+          <a:bodyPr wrap="square" rtlCol="0">
+            <a:spAutoFit/>
+          </a:bodyPr>
+          <a:lstStyle/>
+          <a:p>
+            <a:r>
+              <a:rPr lang="zh-CN" altLang="en-US" sz="1200" dirty="0"/>
+              <a:t>切流到</a:t>
+            </a:r>
+            <a:r>
+              <a:rPr lang="en-US" altLang="zh-CN" sz="1200" dirty="0"/>
+              <a:t>OS30</a:t>
+            </a:r>
+            <a:endParaRPr lang="zh-CN" altLang="en-US" sz="1200" dirty="0"/>
+          </a:p>
+        </p:txBody>
+      </p:sp>
+      <p:sp>
+        <p:nvSpPr>
+          <p:cNvPr id="68" name="文本框 67">
+            <a:extLst>
+              <a:ext uri="{FF2B5EF4-FFF2-40B4-BE49-F238E27FC236}">
+                <a16:creationId xmlns:a16="http://schemas.microsoft.com/office/drawing/2014/main" id="{D84E7043-4980-4848-9592-C6BDFBA2FF5A}"/>
+              </a:ext>
+            </a:extLst>
+          </p:cNvPr>
+          <p:cNvSpPr txBox="1"/>
+          <p:nvPr/>
+        </p:nvSpPr>
+        <p:spPr>
+          <a:xfrm>
+            <a:off x="6455438" y="2766290"/>
+            <a:ext cx="744745" cy="646331"/>
+          </a:xfrm>
+          <a:prstGeom prst="rect">
+            <a:avLst/>
+          </a:prstGeom>
+          <a:noFill/>
+        </p:spPr>
+        <p:txBody>
+          <a:bodyPr wrap="square" rtlCol="0">
+            <a:spAutoFit/>
+          </a:bodyPr>
+          <a:lstStyle/>
+          <a:p>
+            <a:r>
+              <a:rPr lang="zh-CN" altLang="en-US" sz="1200" dirty="0"/>
+              <a:t>容量不足，限流触发</a:t>
+            </a:r>
+          </a:p>
+        </p:txBody>
+      </p:sp>
+    </p:spTree>
+    <p:extLst>
+      <p:ext uri="{BB962C8B-B14F-4D97-AF65-F5344CB8AC3E}">
+        <p14:creationId xmlns:p14="http://schemas.microsoft.com/office/powerpoint/2010/main" val="782079896"/>
+      </p:ext>
+    </p:extLst>
+  </p:cSld>
+  <p:clrMapOvr>
+    <a:masterClrMapping/>
+  </p:clrMapOvr>
+</p:sld>
+</file>
+
 <file path=ppt/theme/theme1.xml><?xml version="1.0" encoding="utf-8"?>
 <a:theme xmlns:a="http://schemas.openxmlformats.org/drawingml/2006/main" name="Office 主题​​">
   <a:themeElements>

</xml_diff>

<commit_message>
Add DB for arch
</commit_message>
<xml_diff>
--- a/ppt/tmp_ppt.pptx
+++ b/ppt/tmp_ppt.pptx
@@ -10,6 +10,7 @@
     <p:sldId id="258" r:id="rId4"/>
     <p:sldId id="259" r:id="rId5"/>
     <p:sldId id="260" r:id="rId6"/>
+    <p:sldId id="261" r:id="rId7"/>
   </p:sldIdLst>
   <p:sldSz cx="12192000" cy="6858000"/>
   <p:notesSz cx="6858000" cy="9144000"/>
@@ -263,7 +264,7 @@
           <a:p>
             <a:fld id="{454A0F4F-8F8E-4FE7-B4C3-4986872B7D08}" type="datetimeFigureOut">
               <a:rPr lang="zh-CN" altLang="en-US" smtClean="0"/>
-              <a:t>2021/4/5</a:t>
+              <a:t>2021/4/9</a:t>
             </a:fld>
             <a:endParaRPr lang="zh-CN" altLang="en-US"/>
           </a:p>
@@ -461,7 +462,7 @@
           <a:p>
             <a:fld id="{454A0F4F-8F8E-4FE7-B4C3-4986872B7D08}" type="datetimeFigureOut">
               <a:rPr lang="zh-CN" altLang="en-US" smtClean="0"/>
-              <a:t>2021/4/5</a:t>
+              <a:t>2021/4/9</a:t>
             </a:fld>
             <a:endParaRPr lang="zh-CN" altLang="en-US"/>
           </a:p>
@@ -669,7 +670,7 @@
           <a:p>
             <a:fld id="{454A0F4F-8F8E-4FE7-B4C3-4986872B7D08}" type="datetimeFigureOut">
               <a:rPr lang="zh-CN" altLang="en-US" smtClean="0"/>
-              <a:t>2021/4/5</a:t>
+              <a:t>2021/4/9</a:t>
             </a:fld>
             <a:endParaRPr lang="zh-CN" altLang="en-US"/>
           </a:p>
@@ -867,7 +868,7 @@
           <a:p>
             <a:fld id="{454A0F4F-8F8E-4FE7-B4C3-4986872B7D08}" type="datetimeFigureOut">
               <a:rPr lang="zh-CN" altLang="en-US" smtClean="0"/>
-              <a:t>2021/4/5</a:t>
+              <a:t>2021/4/9</a:t>
             </a:fld>
             <a:endParaRPr lang="zh-CN" altLang="en-US"/>
           </a:p>
@@ -1142,7 +1143,7 @@
           <a:p>
             <a:fld id="{454A0F4F-8F8E-4FE7-B4C3-4986872B7D08}" type="datetimeFigureOut">
               <a:rPr lang="zh-CN" altLang="en-US" smtClean="0"/>
-              <a:t>2021/4/5</a:t>
+              <a:t>2021/4/9</a:t>
             </a:fld>
             <a:endParaRPr lang="zh-CN" altLang="en-US"/>
           </a:p>
@@ -1407,7 +1408,7 @@
           <a:p>
             <a:fld id="{454A0F4F-8F8E-4FE7-B4C3-4986872B7D08}" type="datetimeFigureOut">
               <a:rPr lang="zh-CN" altLang="en-US" smtClean="0"/>
-              <a:t>2021/4/5</a:t>
+              <a:t>2021/4/9</a:t>
             </a:fld>
             <a:endParaRPr lang="zh-CN" altLang="en-US"/>
           </a:p>
@@ -1819,7 +1820,7 @@
           <a:p>
             <a:fld id="{454A0F4F-8F8E-4FE7-B4C3-4986872B7D08}" type="datetimeFigureOut">
               <a:rPr lang="zh-CN" altLang="en-US" smtClean="0"/>
-              <a:t>2021/4/5</a:t>
+              <a:t>2021/4/9</a:t>
             </a:fld>
             <a:endParaRPr lang="zh-CN" altLang="en-US"/>
           </a:p>
@@ -1960,7 +1961,7 @@
           <a:p>
             <a:fld id="{454A0F4F-8F8E-4FE7-B4C3-4986872B7D08}" type="datetimeFigureOut">
               <a:rPr lang="zh-CN" altLang="en-US" smtClean="0"/>
-              <a:t>2021/4/5</a:t>
+              <a:t>2021/4/9</a:t>
             </a:fld>
             <a:endParaRPr lang="zh-CN" altLang="en-US"/>
           </a:p>
@@ -2073,7 +2074,7 @@
           <a:p>
             <a:fld id="{454A0F4F-8F8E-4FE7-B4C3-4986872B7D08}" type="datetimeFigureOut">
               <a:rPr lang="zh-CN" altLang="en-US" smtClean="0"/>
-              <a:t>2021/4/5</a:t>
+              <a:t>2021/4/9</a:t>
             </a:fld>
             <a:endParaRPr lang="zh-CN" altLang="en-US"/>
           </a:p>
@@ -2384,7 +2385,7 @@
           <a:p>
             <a:fld id="{454A0F4F-8F8E-4FE7-B4C3-4986872B7D08}" type="datetimeFigureOut">
               <a:rPr lang="zh-CN" altLang="en-US" smtClean="0"/>
-              <a:t>2021/4/5</a:t>
+              <a:t>2021/4/9</a:t>
             </a:fld>
             <a:endParaRPr lang="zh-CN" altLang="en-US"/>
           </a:p>
@@ -2672,7 +2673,7 @@
           <a:p>
             <a:fld id="{454A0F4F-8F8E-4FE7-B4C3-4986872B7D08}" type="datetimeFigureOut">
               <a:rPr lang="zh-CN" altLang="en-US" smtClean="0"/>
-              <a:t>2021/4/5</a:t>
+              <a:t>2021/4/9</a:t>
             </a:fld>
             <a:endParaRPr lang="zh-CN" altLang="en-US"/>
           </a:p>
@@ -2913,7 +2914,7 @@
           <a:p>
             <a:fld id="{454A0F4F-8F8E-4FE7-B4C3-4986872B7D08}" type="datetimeFigureOut">
               <a:rPr lang="zh-CN" altLang="en-US" smtClean="0"/>
-              <a:t>2021/4/5</a:t>
+              <a:t>2021/4/9</a:t>
             </a:fld>
             <a:endParaRPr lang="zh-CN" altLang="en-US"/>
           </a:p>
@@ -8464,7 +8465,7 @@
         </p:nvSpPr>
         <p:spPr>
           <a:xfrm>
-            <a:off x="925903" y="2096266"/>
+            <a:off x="969951" y="1636036"/>
             <a:ext cx="8839200" cy="4241273"/>
           </a:xfrm>
           <a:prstGeom prst="rect">
@@ -8508,7 +8509,7 @@
         </p:nvSpPr>
         <p:spPr>
           <a:xfrm>
-            <a:off x="7257077" y="2467155"/>
+            <a:off x="7301125" y="2006925"/>
             <a:ext cx="2070339" cy="3593455"/>
           </a:xfrm>
           <a:prstGeom prst="rect">
@@ -8552,7 +8553,7 @@
         </p:nvSpPr>
         <p:spPr>
           <a:xfrm>
-            <a:off x="7312544" y="2530609"/>
+            <a:off x="7356592" y="2070379"/>
             <a:ext cx="921352" cy="276999"/>
           </a:xfrm>
           <a:prstGeom prst="rect">
@@ -8591,7 +8592,7 @@
         </p:nvSpPr>
         <p:spPr>
           <a:xfrm>
-            <a:off x="2265872" y="2467155"/>
+            <a:off x="2309920" y="2006925"/>
             <a:ext cx="2070339" cy="3594339"/>
           </a:xfrm>
           <a:prstGeom prst="rect">
@@ -8635,8 +8636,8 @@
         </p:nvSpPr>
         <p:spPr>
           <a:xfrm>
-            <a:off x="5510098" y="243534"/>
-            <a:ext cx="730370" cy="718868"/>
+            <a:off x="5510098" y="130062"/>
+            <a:ext cx="585902" cy="327054"/>
           </a:xfrm>
           <a:prstGeom prst="smileyFace">
             <a:avLst/>
@@ -8679,7 +8680,7 @@
         </p:nvSpPr>
         <p:spPr>
           <a:xfrm>
-            <a:off x="5144913" y="1068795"/>
+            <a:off x="5041396" y="549007"/>
             <a:ext cx="1460740" cy="276999"/>
           </a:xfrm>
           <a:prstGeom prst="rect">
@@ -8724,7 +8725,7 @@
         </p:nvSpPr>
         <p:spPr>
           <a:xfrm>
-            <a:off x="4648012" y="1582531"/>
+            <a:off x="4544495" y="1062743"/>
             <a:ext cx="2457369" cy="276999"/>
           </a:xfrm>
           <a:prstGeom prst="rect">
@@ -8777,7 +8778,7 @@
         </p:nvSpPr>
         <p:spPr>
           <a:xfrm>
-            <a:off x="2806388" y="2830888"/>
+            <a:off x="2850436" y="2370658"/>
             <a:ext cx="1338950" cy="278224"/>
           </a:xfrm>
           <a:prstGeom prst="rect">
@@ -8822,7 +8823,7 @@
         </p:nvSpPr>
         <p:spPr>
           <a:xfrm>
-            <a:off x="7399119" y="2830888"/>
+            <a:off x="7443167" y="2370658"/>
             <a:ext cx="1338950" cy="278224"/>
           </a:xfrm>
           <a:prstGeom prst="rect">
@@ -8867,7 +8868,7 @@
         </p:nvSpPr>
         <p:spPr>
           <a:xfrm>
-            <a:off x="2806388" y="3456750"/>
+            <a:off x="2850436" y="2996520"/>
             <a:ext cx="1338950" cy="276999"/>
           </a:xfrm>
           <a:prstGeom prst="rect">
@@ -8923,7 +8924,7 @@
         </p:nvSpPr>
         <p:spPr>
           <a:xfrm>
-            <a:off x="2806389" y="3804388"/>
+            <a:off x="2850437" y="3344158"/>
             <a:ext cx="1338950" cy="276999"/>
           </a:xfrm>
           <a:prstGeom prst="rect">
@@ -8979,7 +8980,7 @@
         </p:nvSpPr>
         <p:spPr>
           <a:xfrm>
-            <a:off x="7399118" y="3456749"/>
+            <a:off x="7443166" y="2996519"/>
             <a:ext cx="1338950" cy="276999"/>
           </a:xfrm>
           <a:prstGeom prst="rect">
@@ -9035,7 +9036,7 @@
         </p:nvSpPr>
         <p:spPr>
           <a:xfrm>
-            <a:off x="7399118" y="3837980"/>
+            <a:off x="7443166" y="3377750"/>
             <a:ext cx="1338950" cy="276999"/>
           </a:xfrm>
           <a:prstGeom prst="rect">
@@ -9091,7 +9092,7 @@
         </p:nvSpPr>
         <p:spPr>
           <a:xfrm>
-            <a:off x="4586558" y="2739609"/>
+            <a:off x="4630606" y="2279379"/>
             <a:ext cx="2518823" cy="461665"/>
           </a:xfrm>
           <a:prstGeom prst="rect">
@@ -9181,7 +9182,7 @@
         </p:nvCxnSpPr>
         <p:spPr>
           <a:xfrm flipH="1">
-            <a:off x="7105381" y="2970000"/>
+            <a:off x="7149429" y="2509770"/>
             <a:ext cx="293738" cy="442"/>
           </a:xfrm>
           <a:prstGeom prst="straightConnector1">
@@ -9223,7 +9224,7 @@
         </p:nvCxnSpPr>
         <p:spPr>
           <a:xfrm>
-            <a:off x="4145338" y="2970000"/>
+            <a:off x="4189386" y="2509770"/>
             <a:ext cx="441220" cy="442"/>
           </a:xfrm>
           <a:prstGeom prst="straightConnector1">
@@ -9265,7 +9266,7 @@
         </p:nvCxnSpPr>
         <p:spPr>
           <a:xfrm>
-            <a:off x="5875283" y="1345794"/>
+            <a:off x="5771766" y="826006"/>
             <a:ext cx="1414" cy="236737"/>
           </a:xfrm>
           <a:prstGeom prst="straightConnector1">
@@ -9307,8 +9308,8 @@
         </p:nvCxnSpPr>
         <p:spPr>
           <a:xfrm flipH="1">
-            <a:off x="3475863" y="1859530"/>
-            <a:ext cx="2400834" cy="971358"/>
+            <a:off x="3519911" y="1339742"/>
+            <a:ext cx="2253269" cy="1030916"/>
           </a:xfrm>
           <a:prstGeom prst="straightConnector1">
             <a:avLst/>
@@ -9349,7 +9350,7 @@
         </p:nvCxnSpPr>
         <p:spPr>
           <a:xfrm>
-            <a:off x="3475863" y="3109112"/>
+            <a:off x="3519911" y="2648882"/>
             <a:ext cx="3923255" cy="867368"/>
           </a:xfrm>
           <a:prstGeom prst="straightConnector1">
@@ -9388,7 +9389,7 @@
         </p:nvSpPr>
         <p:spPr>
           <a:xfrm>
-            <a:off x="2806388" y="5090802"/>
+            <a:off x="2850436" y="4630572"/>
             <a:ext cx="1338950" cy="276999"/>
           </a:xfrm>
           <a:prstGeom prst="rect">
@@ -9444,7 +9445,7 @@
         </p:nvSpPr>
         <p:spPr>
           <a:xfrm>
-            <a:off x="2803234" y="5451109"/>
+            <a:off x="2847282" y="4990879"/>
             <a:ext cx="1338950" cy="276999"/>
           </a:xfrm>
           <a:prstGeom prst="rect">
@@ -9500,7 +9501,7 @@
         </p:nvSpPr>
         <p:spPr>
           <a:xfrm>
-            <a:off x="7399118" y="5021553"/>
+            <a:off x="7443166" y="4561323"/>
             <a:ext cx="1338950" cy="276999"/>
           </a:xfrm>
           <a:prstGeom prst="rect">
@@ -9556,7 +9557,7 @@
         </p:nvSpPr>
         <p:spPr>
           <a:xfrm>
-            <a:off x="7399118" y="5381860"/>
+            <a:off x="7443166" y="4921630"/>
             <a:ext cx="1338950" cy="276999"/>
           </a:xfrm>
           <a:prstGeom prst="rect">
@@ -9612,7 +9613,7 @@
         </p:nvSpPr>
         <p:spPr>
           <a:xfrm>
-            <a:off x="4586558" y="5262894"/>
+            <a:off x="4630606" y="5017540"/>
             <a:ext cx="2518823" cy="461665"/>
           </a:xfrm>
           <a:prstGeom prst="rect">
@@ -9685,48 +9686,6 @@
           </a:p>
         </p:txBody>
       </p:sp>
-      <p:cxnSp>
-        <p:nvCxnSpPr>
-          <p:cNvPr id="31" name="直接箭头连接符 30">
-            <a:extLst>
-              <a:ext uri="{FF2B5EF4-FFF2-40B4-BE49-F238E27FC236}">
-                <a16:creationId xmlns:a16="http://schemas.microsoft.com/office/drawing/2014/main" id="{2CE97575-81EF-4E37-AEAD-FB8E2F5E083D}"/>
-              </a:ext>
-            </a:extLst>
-          </p:cNvPr>
-          <p:cNvCxnSpPr>
-            <a:stCxn id="12" idx="2"/>
-            <a:endCxn id="25" idx="3"/>
-          </p:cNvCxnSpPr>
-          <p:nvPr/>
-        </p:nvCxnSpPr>
-        <p:spPr>
-          <a:xfrm flipH="1">
-            <a:off x="4145338" y="4114979"/>
-            <a:ext cx="3923255" cy="1114323"/>
-          </a:xfrm>
-          <a:prstGeom prst="straightConnector1">
-            <a:avLst/>
-          </a:prstGeom>
-          <a:ln>
-            <a:tailEnd type="triangle"/>
-          </a:ln>
-        </p:spPr>
-        <p:style>
-          <a:lnRef idx="1">
-            <a:schemeClr val="accent1"/>
-          </a:lnRef>
-          <a:fillRef idx="0">
-            <a:schemeClr val="accent1"/>
-          </a:fillRef>
-          <a:effectRef idx="0">
-            <a:schemeClr val="accent1"/>
-          </a:effectRef>
-          <a:fontRef idx="minor">
-            <a:schemeClr val="tx1"/>
-          </a:fontRef>
-        </p:style>
-      </p:cxnSp>
       <p:sp>
         <p:nvSpPr>
           <p:cNvPr id="36" name="文本框 35">
@@ -9741,7 +9700,7 @@
         </p:nvSpPr>
         <p:spPr>
           <a:xfrm>
-            <a:off x="2342558" y="2546980"/>
+            <a:off x="2386606" y="2086750"/>
             <a:ext cx="921352" cy="276999"/>
           </a:xfrm>
           <a:prstGeom prst="rect">
@@ -9780,7 +9739,7 @@
         </p:nvSpPr>
         <p:spPr>
           <a:xfrm>
-            <a:off x="969951" y="2161401"/>
+            <a:off x="1013999" y="1701171"/>
             <a:ext cx="1605074" cy="276999"/>
           </a:xfrm>
           <a:prstGeom prst="rect">
@@ -9969,7 +9928,7 @@
         </p:nvSpPr>
         <p:spPr>
           <a:xfrm>
-            <a:off x="2803234" y="4378007"/>
+            <a:off x="2847282" y="3917777"/>
             <a:ext cx="1338950" cy="276999"/>
           </a:xfrm>
           <a:prstGeom prst="rect">
@@ -10009,7 +9968,7 @@
         </p:nvSpPr>
         <p:spPr>
           <a:xfrm>
-            <a:off x="7406567" y="4392098"/>
+            <a:off x="7450615" y="3931868"/>
             <a:ext cx="1338950" cy="276999"/>
           </a:xfrm>
           <a:prstGeom prst="rect">
@@ -10052,7 +10011,7 @@
         </p:nvCxnSpPr>
         <p:spPr>
           <a:xfrm flipH="1">
-            <a:off x="3472709" y="4081387"/>
+            <a:off x="3516757" y="3621157"/>
             <a:ext cx="3155" cy="296620"/>
           </a:xfrm>
           <a:prstGeom prst="straightConnector1">
@@ -10083,25 +10042,356 @@
           </a:fontRef>
         </p:style>
       </p:cxnSp>
+      <p:sp>
+        <p:nvSpPr>
+          <p:cNvPr id="54" name="文本框 53">
+            <a:extLst>
+              <a:ext uri="{FF2B5EF4-FFF2-40B4-BE49-F238E27FC236}">
+                <a16:creationId xmlns:a16="http://schemas.microsoft.com/office/drawing/2014/main" id="{04EC76CD-D8C1-484B-9892-0032D247886A}"/>
+              </a:ext>
+            </a:extLst>
+          </p:cNvPr>
+          <p:cNvSpPr txBox="1"/>
+          <p:nvPr/>
+        </p:nvSpPr>
+        <p:spPr>
+          <a:xfrm>
+            <a:off x="7773220" y="159150"/>
+            <a:ext cx="4256338" cy="1384995"/>
+          </a:xfrm>
+          <a:prstGeom prst="rect">
+            <a:avLst/>
+          </a:prstGeom>
+          <a:noFill/>
+        </p:spPr>
+        <p:txBody>
+          <a:bodyPr wrap="square" rtlCol="0">
+            <a:spAutoFit/>
+          </a:bodyPr>
+          <a:lstStyle/>
+          <a:p>
+            <a:r>
+              <a:rPr lang="zh-CN" altLang="en-US" sz="1200" dirty="0"/>
+              <a:t>备注：</a:t>
+            </a:r>
+            <a:endParaRPr lang="en-US" altLang="zh-CN" sz="1200" dirty="0"/>
+          </a:p>
+          <a:p>
+            <a:r>
+              <a:rPr lang="en-US" altLang="zh-CN" sz="1200" dirty="0"/>
+              <a:t>Aserver</a:t>
+            </a:r>
+            <a:r>
+              <a:rPr lang="zh-CN" altLang="en-US" sz="1200" dirty="0"/>
+              <a:t>调度识别单元不识别机房，因此</a:t>
+            </a:r>
+            <a:r>
+              <a:rPr lang="en-US" altLang="zh-CN" sz="1200" dirty="0" err="1"/>
+              <a:t>vipserver</a:t>
+            </a:r>
+            <a:r>
+              <a:rPr lang="en-US" altLang="zh-CN" sz="1200" dirty="0"/>
+              <a:t> key</a:t>
+            </a:r>
+            <a:r>
+              <a:rPr lang="zh-CN" altLang="en-US" sz="1200" dirty="0"/>
+              <a:t>多机房挂载同一个</a:t>
+            </a:r>
+            <a:r>
+              <a:rPr lang="en-US" altLang="zh-CN" sz="1200" dirty="0"/>
+              <a:t>key</a:t>
+            </a:r>
+            <a:r>
+              <a:rPr lang="zh-CN" altLang="en-US" sz="1200" dirty="0"/>
+              <a:t>上可以进行机房间的负载均衡。</a:t>
+            </a:r>
+            <a:endParaRPr lang="en-US" altLang="zh-CN" sz="1200" dirty="0"/>
+          </a:p>
+          <a:p>
+            <a:r>
+              <a:rPr lang="zh-CN" altLang="en-US" sz="1200" dirty="0"/>
+              <a:t>而</a:t>
+            </a:r>
+            <a:r>
+              <a:rPr lang="en-US" altLang="zh-CN" sz="1200" dirty="0"/>
+              <a:t>HSF</a:t>
+            </a:r>
+            <a:r>
+              <a:rPr lang="zh-CN" altLang="en-US" sz="1200" dirty="0"/>
+              <a:t>也可以以单元的粒度进行配置，配置为</a:t>
+            </a:r>
+            <a:r>
+              <a:rPr lang="en-US" altLang="zh-CN" sz="1200" dirty="0"/>
+              <a:t>center</a:t>
+            </a:r>
+            <a:r>
+              <a:rPr lang="zh-CN" altLang="en-US" sz="1200" dirty="0"/>
+              <a:t>模式，即可自主在不同机房间进行负载均衡。</a:t>
+            </a:r>
+            <a:endParaRPr lang="en-US" altLang="zh-CN" sz="1200" dirty="0"/>
+          </a:p>
+          <a:p>
+            <a:r>
+              <a:rPr lang="zh-CN" altLang="en-US" sz="1200" dirty="0"/>
+              <a:t>异步消息也是以单元为基础，同单元不同机房可能会出现跨机房的流量投递和消费</a:t>
+            </a:r>
+          </a:p>
+        </p:txBody>
+      </p:sp>
+      <p:sp>
+        <p:nvSpPr>
+          <p:cNvPr id="52" name="矩形 51">
+            <a:extLst>
+              <a:ext uri="{FF2B5EF4-FFF2-40B4-BE49-F238E27FC236}">
+                <a16:creationId xmlns:a16="http://schemas.microsoft.com/office/drawing/2014/main" id="{C00B2E5B-D0E6-446D-9252-9EC99353E5BC}"/>
+              </a:ext>
+            </a:extLst>
+          </p:cNvPr>
+          <p:cNvSpPr/>
+          <p:nvPr/>
+        </p:nvSpPr>
+        <p:spPr>
+          <a:xfrm>
+            <a:off x="3128513" y="5963728"/>
+            <a:ext cx="4508740" cy="857962"/>
+          </a:xfrm>
+          <a:prstGeom prst="rect">
+            <a:avLst/>
+          </a:prstGeom>
+        </p:spPr>
+        <p:style>
+          <a:lnRef idx="2">
+            <a:schemeClr val="accent6"/>
+          </a:lnRef>
+          <a:fillRef idx="1">
+            <a:schemeClr val="lt1"/>
+          </a:fillRef>
+          <a:effectRef idx="0">
+            <a:schemeClr val="accent6"/>
+          </a:effectRef>
+          <a:fontRef idx="minor">
+            <a:schemeClr val="dk1"/>
+          </a:fontRef>
+        </p:style>
+        <p:txBody>
+          <a:bodyPr rtlCol="0" anchor="ctr"/>
+          <a:lstStyle/>
+          <a:p>
+            <a:pPr algn="ctr"/>
+            <a:endParaRPr lang="zh-CN" altLang="en-US"/>
+          </a:p>
+        </p:txBody>
+      </p:sp>
+      <p:sp>
+        <p:nvSpPr>
+          <p:cNvPr id="55" name="矩形 54">
+            <a:extLst>
+              <a:ext uri="{FF2B5EF4-FFF2-40B4-BE49-F238E27FC236}">
+                <a16:creationId xmlns:a16="http://schemas.microsoft.com/office/drawing/2014/main" id="{EBF46A08-5A58-40AD-8870-D581FE82C666}"/>
+              </a:ext>
+            </a:extLst>
+          </p:cNvPr>
+          <p:cNvSpPr/>
+          <p:nvPr/>
+        </p:nvSpPr>
+        <p:spPr>
+          <a:xfrm>
+            <a:off x="3476205" y="6088001"/>
+            <a:ext cx="1805795" cy="247289"/>
+          </a:xfrm>
+          <a:prstGeom prst="rect">
+            <a:avLst/>
+          </a:prstGeom>
+        </p:spPr>
+        <p:style>
+          <a:lnRef idx="2">
+            <a:schemeClr val="accent6"/>
+          </a:lnRef>
+          <a:fillRef idx="1">
+            <a:schemeClr val="lt1"/>
+          </a:fillRef>
+          <a:effectRef idx="0">
+            <a:schemeClr val="accent6"/>
+          </a:effectRef>
+          <a:fontRef idx="minor">
+            <a:schemeClr val="dk1"/>
+          </a:fontRef>
+        </p:style>
+        <p:txBody>
+          <a:bodyPr rtlCol="0" anchor="ctr"/>
+          <a:lstStyle/>
+          <a:p>
+            <a:pPr algn="ctr"/>
+            <a:r>
+              <a:rPr lang="en-US" altLang="zh-CN" sz="1200" dirty="0"/>
+              <a:t>DB leader in OS30</a:t>
+            </a:r>
+          </a:p>
+        </p:txBody>
+      </p:sp>
+      <p:sp>
+        <p:nvSpPr>
+          <p:cNvPr id="56" name="矩形 55">
+            <a:extLst>
+              <a:ext uri="{FF2B5EF4-FFF2-40B4-BE49-F238E27FC236}">
+                <a16:creationId xmlns:a16="http://schemas.microsoft.com/office/drawing/2014/main" id="{6D13D2E2-EDBB-4908-8C33-E02CCA22E7B1}"/>
+              </a:ext>
+            </a:extLst>
+          </p:cNvPr>
+          <p:cNvSpPr/>
+          <p:nvPr/>
+        </p:nvSpPr>
+        <p:spPr>
+          <a:xfrm>
+            <a:off x="5604825" y="6119193"/>
+            <a:ext cx="1805795" cy="247289"/>
+          </a:xfrm>
+          <a:prstGeom prst="rect">
+            <a:avLst/>
+          </a:prstGeom>
+        </p:spPr>
+        <p:style>
+          <a:lnRef idx="2">
+            <a:schemeClr val="accent6"/>
+          </a:lnRef>
+          <a:fillRef idx="1">
+            <a:schemeClr val="lt1"/>
+          </a:fillRef>
+          <a:effectRef idx="0">
+            <a:schemeClr val="accent6"/>
+          </a:effectRef>
+          <a:fontRef idx="minor">
+            <a:schemeClr val="dk1"/>
+          </a:fontRef>
+        </p:style>
+        <p:txBody>
+          <a:bodyPr rtlCol="0" anchor="ctr"/>
+          <a:lstStyle/>
+          <a:p>
+            <a:pPr algn="ctr"/>
+            <a:r>
+              <a:rPr lang="en-US" altLang="zh-CN" sz="1200" dirty="0"/>
+              <a:t>DB follow in SG52</a:t>
+            </a:r>
+          </a:p>
+        </p:txBody>
+      </p:sp>
+      <p:sp>
+        <p:nvSpPr>
+          <p:cNvPr id="57" name="矩形 56">
+            <a:extLst>
+              <a:ext uri="{FF2B5EF4-FFF2-40B4-BE49-F238E27FC236}">
+                <a16:creationId xmlns:a16="http://schemas.microsoft.com/office/drawing/2014/main" id="{1202CBE6-68DC-4F03-80E9-DBF7F4ACEFC1}"/>
+              </a:ext>
+            </a:extLst>
+          </p:cNvPr>
+          <p:cNvSpPr/>
+          <p:nvPr/>
+        </p:nvSpPr>
+        <p:spPr>
+          <a:xfrm>
+            <a:off x="4434673" y="6490821"/>
+            <a:ext cx="1805795" cy="247289"/>
+          </a:xfrm>
+          <a:prstGeom prst="rect">
+            <a:avLst/>
+          </a:prstGeom>
+        </p:spPr>
+        <p:style>
+          <a:lnRef idx="2">
+            <a:schemeClr val="accent6"/>
+          </a:lnRef>
+          <a:fillRef idx="1">
+            <a:schemeClr val="lt1"/>
+          </a:fillRef>
+          <a:effectRef idx="0">
+            <a:schemeClr val="accent6"/>
+          </a:effectRef>
+          <a:fontRef idx="minor">
+            <a:schemeClr val="dk1"/>
+          </a:fontRef>
+        </p:style>
+        <p:txBody>
+          <a:bodyPr rtlCol="0" anchor="ctr"/>
+          <a:lstStyle/>
+          <a:p>
+            <a:pPr algn="ctr"/>
+            <a:r>
+              <a:rPr lang="en-US" altLang="zh-CN" sz="1200" dirty="0"/>
+              <a:t>DB </a:t>
+            </a:r>
+            <a:r>
+              <a:rPr lang="en-US" altLang="zh-CN" sz="1200" dirty="0" err="1"/>
+              <a:t>binlong</a:t>
+            </a:r>
+            <a:r>
+              <a:rPr lang="en-US" altLang="zh-CN" sz="1200" dirty="0"/>
+              <a:t> in SG113</a:t>
+            </a:r>
+          </a:p>
+        </p:txBody>
+      </p:sp>
       <p:cxnSp>
         <p:nvCxnSpPr>
-          <p:cNvPr id="53" name="直接箭头连接符 52">
-            <a:extLst>
-              <a:ext uri="{FF2B5EF4-FFF2-40B4-BE49-F238E27FC236}">
-                <a16:creationId xmlns:a16="http://schemas.microsoft.com/office/drawing/2014/main" id="{F8B57C84-8385-45D2-9CFC-BF38560BE028}"/>
+          <p:cNvPr id="23" name="直接箭头连接符 22">
+            <a:extLst>
+              <a:ext uri="{FF2B5EF4-FFF2-40B4-BE49-F238E27FC236}">
+                <a16:creationId xmlns:a16="http://schemas.microsoft.com/office/drawing/2014/main" id="{175BA767-8ED6-45CF-83EF-053DE1A2CEAD}"/>
               </a:ext>
             </a:extLst>
           </p:cNvPr>
           <p:cNvCxnSpPr>
-            <a:stCxn id="27" idx="1"/>
+            <a:stCxn id="12" idx="1"/>
+          </p:cNvCxnSpPr>
+          <p:nvPr/>
+        </p:nvCxnSpPr>
+        <p:spPr>
+          <a:xfrm flipH="1">
+            <a:off x="4186232" y="3516250"/>
+            <a:ext cx="3256934" cy="1613128"/>
+          </a:xfrm>
+          <a:prstGeom prst="straightConnector1">
+            <a:avLst/>
+          </a:prstGeom>
+          <a:ln>
+            <a:tailEnd type="triangle"/>
+          </a:ln>
+        </p:spPr>
+        <p:style>
+          <a:lnRef idx="1">
+            <a:schemeClr val="accent1"/>
+          </a:lnRef>
+          <a:fillRef idx="0">
+            <a:schemeClr val="accent1"/>
+          </a:fillRef>
+          <a:effectRef idx="0">
+            <a:schemeClr val="accent1"/>
+          </a:effectRef>
+          <a:fontRef idx="minor">
+            <a:schemeClr val="tx1"/>
+          </a:fontRef>
+        </p:style>
+      </p:cxnSp>
+      <p:cxnSp>
+        <p:nvCxnSpPr>
+          <p:cNvPr id="32" name="直接箭头连接符 31">
+            <a:extLst>
+              <a:ext uri="{FF2B5EF4-FFF2-40B4-BE49-F238E27FC236}">
+                <a16:creationId xmlns:a16="http://schemas.microsoft.com/office/drawing/2014/main" id="{BCC0DE57-D231-4EB0-BDE8-2BD28A58923B}"/>
+              </a:ext>
+            </a:extLst>
+          </p:cNvPr>
+          <p:cNvCxnSpPr>
+            <a:cxnSpLocks/>
+            <a:stCxn id="28" idx="1"/>
             <a:endCxn id="48" idx="3"/>
           </p:cNvCxnSpPr>
           <p:nvPr/>
         </p:nvCxnSpPr>
         <p:spPr>
           <a:xfrm flipH="1" flipV="1">
-            <a:off x="4142184" y="4516507"/>
-            <a:ext cx="3256934" cy="643546"/>
+            <a:off x="4186232" y="4056277"/>
+            <a:ext cx="3256934" cy="1003853"/>
           </a:xfrm>
           <a:prstGeom prst="straightConnector1">
             <a:avLst/>
@@ -10131,102 +10421,96 @@
           </a:fontRef>
         </p:style>
       </p:cxnSp>
-      <p:sp>
-        <p:nvSpPr>
-          <p:cNvPr id="54" name="文本框 53">
-            <a:extLst>
-              <a:ext uri="{FF2B5EF4-FFF2-40B4-BE49-F238E27FC236}">
-                <a16:creationId xmlns:a16="http://schemas.microsoft.com/office/drawing/2014/main" id="{04EC76CD-D8C1-484B-9892-0032D247886A}"/>
-              </a:ext>
-            </a:extLst>
-          </p:cNvPr>
-          <p:cNvSpPr txBox="1"/>
-          <p:nvPr/>
-        </p:nvSpPr>
-        <p:spPr>
-          <a:xfrm>
-            <a:off x="7761719" y="262740"/>
-            <a:ext cx="3108432" cy="1754326"/>
-          </a:xfrm>
-          <a:prstGeom prst="rect">
-            <a:avLst/>
-          </a:prstGeom>
-          <a:noFill/>
-        </p:spPr>
-        <p:txBody>
-          <a:bodyPr wrap="square" rtlCol="0">
-            <a:spAutoFit/>
-          </a:bodyPr>
-          <a:lstStyle/>
-          <a:p>
-            <a:r>
-              <a:rPr lang="zh-CN" altLang="en-US" sz="1200" dirty="0"/>
-              <a:t>备注：</a:t>
-            </a:r>
-            <a:endParaRPr lang="en-US" altLang="zh-CN" sz="1200" dirty="0"/>
-          </a:p>
-          <a:p>
-            <a:r>
-              <a:rPr lang="en-US" altLang="zh-CN" sz="1200" dirty="0"/>
-              <a:t>Aserver</a:t>
-            </a:r>
-            <a:r>
-              <a:rPr lang="zh-CN" altLang="en-US" sz="1200" dirty="0"/>
-              <a:t>调度识别单元不识别机房，因此</a:t>
-            </a:r>
-            <a:r>
-              <a:rPr lang="en-US" altLang="zh-CN" sz="1200" dirty="0" err="1"/>
-              <a:t>vipserver</a:t>
-            </a:r>
-            <a:r>
-              <a:rPr lang="en-US" altLang="zh-CN" sz="1200" dirty="0"/>
-              <a:t> key</a:t>
-            </a:r>
-            <a:r>
-              <a:rPr lang="zh-CN" altLang="en-US" sz="1200" dirty="0"/>
-              <a:t>多机房挂载同一个</a:t>
-            </a:r>
-            <a:r>
-              <a:rPr lang="en-US" altLang="zh-CN" sz="1200" dirty="0"/>
-              <a:t>key</a:t>
-            </a:r>
-            <a:r>
-              <a:rPr lang="zh-CN" altLang="en-US" sz="1200" dirty="0"/>
-              <a:t>上可以进行机房间的负载均衡。</a:t>
-            </a:r>
-            <a:endParaRPr lang="en-US" altLang="zh-CN" sz="1200" dirty="0"/>
-          </a:p>
-          <a:p>
-            <a:r>
-              <a:rPr lang="zh-CN" altLang="en-US" sz="1200" dirty="0"/>
-              <a:t>而</a:t>
-            </a:r>
-            <a:r>
-              <a:rPr lang="en-US" altLang="zh-CN" sz="1200" dirty="0"/>
-              <a:t>HSF</a:t>
-            </a:r>
-            <a:r>
-              <a:rPr lang="zh-CN" altLang="en-US" sz="1200" dirty="0"/>
-              <a:t>也可以以单元的粒度进行配置，配置为</a:t>
-            </a:r>
-            <a:r>
-              <a:rPr lang="en-US" altLang="zh-CN" sz="1200" dirty="0"/>
-              <a:t>center</a:t>
-            </a:r>
-            <a:r>
-              <a:rPr lang="zh-CN" altLang="en-US" sz="1200" dirty="0"/>
-              <a:t>模式，即可自主在不同机房间进行负载均衡。</a:t>
-            </a:r>
-            <a:endParaRPr lang="en-US" altLang="zh-CN" sz="1200" dirty="0"/>
-          </a:p>
-          <a:p>
-            <a:r>
-              <a:rPr lang="zh-CN" altLang="en-US" sz="1200" dirty="0"/>
-              <a:t>异步消息也是以单元为基础，同单元不同机房可能会出现跨机房的流量投递和消费</a:t>
-            </a:r>
-          </a:p>
-        </p:txBody>
-      </p:sp>
+      <p:cxnSp>
+        <p:nvCxnSpPr>
+          <p:cNvPr id="58" name="直接箭头连接符 57">
+            <a:extLst>
+              <a:ext uri="{FF2B5EF4-FFF2-40B4-BE49-F238E27FC236}">
+                <a16:creationId xmlns:a16="http://schemas.microsoft.com/office/drawing/2014/main" id="{C41AE5DC-81AF-49BE-A195-C72C86A9FEF5}"/>
+              </a:ext>
+            </a:extLst>
+          </p:cNvPr>
+          <p:cNvCxnSpPr>
+            <a:stCxn id="26" idx="2"/>
+            <a:endCxn id="52" idx="0"/>
+          </p:cNvCxnSpPr>
+          <p:nvPr/>
+        </p:nvCxnSpPr>
+        <p:spPr>
+          <a:xfrm>
+            <a:off x="3516757" y="5267878"/>
+            <a:ext cx="1866126" cy="695850"/>
+          </a:xfrm>
+          <a:prstGeom prst="straightConnector1">
+            <a:avLst/>
+          </a:prstGeom>
+          <a:ln>
+            <a:tailEnd type="triangle"/>
+          </a:ln>
+        </p:spPr>
+        <p:style>
+          <a:lnRef idx="1">
+            <a:schemeClr val="accent1"/>
+          </a:lnRef>
+          <a:fillRef idx="0">
+            <a:schemeClr val="accent1"/>
+          </a:fillRef>
+          <a:effectRef idx="0">
+            <a:schemeClr val="accent1"/>
+          </a:effectRef>
+          <a:fontRef idx="minor">
+            <a:schemeClr val="tx1"/>
+          </a:fontRef>
+        </p:style>
+      </p:cxnSp>
+      <p:cxnSp>
+        <p:nvCxnSpPr>
+          <p:cNvPr id="60" name="直接箭头连接符 59">
+            <a:extLst>
+              <a:ext uri="{FF2B5EF4-FFF2-40B4-BE49-F238E27FC236}">
+                <a16:creationId xmlns:a16="http://schemas.microsoft.com/office/drawing/2014/main" id="{25966F3D-441B-4B6F-8C35-BA32353A89EA}"/>
+              </a:ext>
+            </a:extLst>
+          </p:cNvPr>
+          <p:cNvCxnSpPr>
+            <a:stCxn id="28" idx="2"/>
+            <a:endCxn id="52" idx="0"/>
+          </p:cNvCxnSpPr>
+          <p:nvPr/>
+        </p:nvCxnSpPr>
+        <p:spPr>
+          <a:xfrm flipH="1">
+            <a:off x="5382883" y="5198629"/>
+            <a:ext cx="2729758" cy="765099"/>
+          </a:xfrm>
+          <a:prstGeom prst="straightConnector1">
+            <a:avLst/>
+          </a:prstGeom>
+          <a:ln w="9525" cap="flat" cmpd="sng" algn="ctr">
+            <a:solidFill>
+              <a:schemeClr val="accent2"/>
+            </a:solidFill>
+            <a:prstDash val="solid"/>
+            <a:round/>
+            <a:headEnd type="none" w="med" len="med"/>
+            <a:tailEnd type="arrow" w="med" len="med"/>
+          </a:ln>
+        </p:spPr>
+        <p:style>
+          <a:lnRef idx="0">
+            <a:scrgbClr r="0" g="0" b="0"/>
+          </a:lnRef>
+          <a:fillRef idx="0">
+            <a:scrgbClr r="0" g="0" b="0"/>
+          </a:fillRef>
+          <a:effectRef idx="0">
+            <a:scrgbClr r="0" g="0" b="0"/>
+          </a:effectRef>
+          <a:fontRef idx="minor">
+            <a:schemeClr val="tx1"/>
+          </a:fontRef>
+        </p:style>
+      </p:cxnSp>
     </p:spTree>
     <p:extLst>
       <p:ext uri="{BB962C8B-B14F-4D97-AF65-F5344CB8AC3E}">
@@ -10259,10 +10543,10 @@
       </p:grpSpPr>
       <p:sp>
         <p:nvSpPr>
-          <p:cNvPr id="37" name="矩形 36">
-            <a:extLst>
-              <a:ext uri="{FF2B5EF4-FFF2-40B4-BE49-F238E27FC236}">
-                <a16:creationId xmlns:a16="http://schemas.microsoft.com/office/drawing/2014/main" id="{3A9B01A6-2DD5-4E4B-938F-250950B199DD}"/>
+          <p:cNvPr id="3" name="矩形 2">
+            <a:extLst>
+              <a:ext uri="{FF2B5EF4-FFF2-40B4-BE49-F238E27FC236}">
+                <a16:creationId xmlns:a16="http://schemas.microsoft.com/office/drawing/2014/main" id="{91A34973-7ED0-4246-BE7E-D74FAB9B1CC6}"/>
               </a:ext>
             </a:extLst>
           </p:cNvPr>
@@ -10271,8 +10555,8 @@
         </p:nvSpPr>
         <p:spPr>
           <a:xfrm>
-            <a:off x="7274330" y="2444151"/>
-            <a:ext cx="2518823" cy="3593455"/>
+            <a:off x="3128513" y="5963728"/>
+            <a:ext cx="4508740" cy="857962"/>
           </a:xfrm>
           <a:prstGeom prst="rect">
             <a:avLst/>
@@ -10297,6 +10581,50 @@
           <a:lstStyle/>
           <a:p>
             <a:pPr algn="ctr"/>
+            <a:endParaRPr lang="zh-CN" altLang="en-US"/>
+          </a:p>
+        </p:txBody>
+      </p:sp>
+      <p:sp>
+        <p:nvSpPr>
+          <p:cNvPr id="37" name="矩形 36">
+            <a:extLst>
+              <a:ext uri="{FF2B5EF4-FFF2-40B4-BE49-F238E27FC236}">
+                <a16:creationId xmlns:a16="http://schemas.microsoft.com/office/drawing/2014/main" id="{3A9B01A6-2DD5-4E4B-938F-250950B199DD}"/>
+              </a:ext>
+            </a:extLst>
+          </p:cNvPr>
+          <p:cNvSpPr/>
+          <p:nvPr/>
+        </p:nvSpPr>
+        <p:spPr>
+          <a:xfrm>
+            <a:off x="7268579" y="2195750"/>
+            <a:ext cx="2518823" cy="3593455"/>
+          </a:xfrm>
+          <a:prstGeom prst="rect">
+            <a:avLst/>
+          </a:prstGeom>
+        </p:spPr>
+        <p:style>
+          <a:lnRef idx="2">
+            <a:schemeClr val="accent6"/>
+          </a:lnRef>
+          <a:fillRef idx="1">
+            <a:schemeClr val="lt1"/>
+          </a:fillRef>
+          <a:effectRef idx="0">
+            <a:schemeClr val="accent6"/>
+          </a:effectRef>
+          <a:fontRef idx="minor">
+            <a:schemeClr val="dk1"/>
+          </a:fontRef>
+        </p:style>
+        <p:txBody>
+          <a:bodyPr rtlCol="0" anchor="ctr"/>
+          <a:lstStyle/>
+          <a:p>
+            <a:pPr algn="ctr"/>
             <a:endParaRPr lang="zh-CN" altLang="en-US" dirty="0"/>
           </a:p>
         </p:txBody>
@@ -10315,7 +10643,7 @@
         </p:nvSpPr>
         <p:spPr>
           <a:xfrm>
-            <a:off x="7329797" y="2507605"/>
+            <a:off x="7324046" y="2259204"/>
             <a:ext cx="921352" cy="276999"/>
           </a:xfrm>
           <a:prstGeom prst="rect">
@@ -10354,7 +10682,7 @@
         </p:nvSpPr>
         <p:spPr>
           <a:xfrm>
-            <a:off x="2283125" y="2444151"/>
+            <a:off x="2277374" y="2195750"/>
             <a:ext cx="2070339" cy="3594339"/>
           </a:xfrm>
           <a:prstGeom prst="rect">
@@ -10558,7 +10886,7 @@
         </p:nvSpPr>
         <p:spPr>
           <a:xfrm>
-            <a:off x="2823641" y="2807884"/>
+            <a:off x="2817890" y="2559483"/>
             <a:ext cx="1338950" cy="278224"/>
           </a:xfrm>
           <a:prstGeom prst="rect">
@@ -10603,7 +10931,7 @@
         </p:nvSpPr>
         <p:spPr>
           <a:xfrm>
-            <a:off x="7416372" y="2807884"/>
+            <a:off x="7410621" y="2559483"/>
             <a:ext cx="1338950" cy="278224"/>
           </a:xfrm>
           <a:prstGeom prst="rect">
@@ -10648,7 +10976,7 @@
         </p:nvSpPr>
         <p:spPr>
           <a:xfrm>
-            <a:off x="2801426" y="4423799"/>
+            <a:off x="2795675" y="4175398"/>
             <a:ext cx="1338950" cy="276999"/>
           </a:xfrm>
           <a:prstGeom prst="rect">
@@ -10701,7 +11029,7 @@
         </p:nvSpPr>
         <p:spPr>
           <a:xfrm>
-            <a:off x="7416371" y="4483521"/>
+            <a:off x="7410620" y="4235120"/>
             <a:ext cx="1338950" cy="276999"/>
           </a:xfrm>
           <a:prstGeom prst="rect">
@@ -10755,7 +11083,7 @@
         </p:nvSpPr>
         <p:spPr>
           <a:xfrm>
-            <a:off x="4585118" y="2415271"/>
+            <a:off x="4579367" y="2166870"/>
             <a:ext cx="2518823" cy="461665"/>
           </a:xfrm>
           <a:prstGeom prst="rect">
@@ -10811,7 +11139,7 @@
         </p:nvCxnSpPr>
         <p:spPr>
           <a:xfrm flipH="1" flipV="1">
-            <a:off x="7103941" y="2646104"/>
+            <a:off x="7098190" y="2397703"/>
             <a:ext cx="312431" cy="300892"/>
           </a:xfrm>
           <a:prstGeom prst="straightConnector1">
@@ -10853,7 +11181,7 @@
         </p:nvCxnSpPr>
         <p:spPr>
           <a:xfrm flipV="1">
-            <a:off x="4162591" y="2646104"/>
+            <a:off x="4156840" y="2397703"/>
             <a:ext cx="422527" cy="300892"/>
           </a:xfrm>
           <a:prstGeom prst="straightConnector1">
@@ -10938,8 +11266,8 @@
         </p:nvCxnSpPr>
         <p:spPr>
           <a:xfrm flipH="1">
-            <a:off x="3493116" y="1859530"/>
-            <a:ext cx="2383581" cy="948354"/>
+            <a:off x="3487365" y="1859530"/>
+            <a:ext cx="2389332" cy="699953"/>
           </a:xfrm>
           <a:prstGeom prst="straightConnector1">
             <a:avLst/>
@@ -10977,7 +11305,7 @@
         </p:nvSpPr>
         <p:spPr>
           <a:xfrm>
-            <a:off x="2816192" y="5522865"/>
+            <a:off x="2810441" y="5274464"/>
             <a:ext cx="1338950" cy="276999"/>
           </a:xfrm>
           <a:prstGeom prst="rect">
@@ -11030,7 +11358,7 @@
         </p:nvSpPr>
         <p:spPr>
           <a:xfrm>
-            <a:off x="7416371" y="5487380"/>
+            <a:off x="7410620" y="5238979"/>
             <a:ext cx="1338950" cy="276999"/>
           </a:xfrm>
           <a:prstGeom prst="rect">
@@ -11083,7 +11411,7 @@
         </p:nvSpPr>
         <p:spPr>
           <a:xfrm>
-            <a:off x="2359811" y="2523976"/>
+            <a:off x="2354060" y="2275575"/>
             <a:ext cx="921352" cy="276999"/>
           </a:xfrm>
           <a:prstGeom prst="rect">
@@ -11285,7 +11613,7 @@
         </p:nvSpPr>
         <p:spPr>
           <a:xfrm>
-            <a:off x="2816192" y="5019811"/>
+            <a:off x="2810441" y="4771410"/>
             <a:ext cx="1338950" cy="276999"/>
           </a:xfrm>
           <a:prstGeom prst="rect">
@@ -11325,7 +11653,7 @@
         </p:nvSpPr>
         <p:spPr>
           <a:xfrm>
-            <a:off x="8533741" y="4985450"/>
+            <a:off x="8527990" y="4737049"/>
             <a:ext cx="1066310" cy="276999"/>
           </a:xfrm>
           <a:prstGeom prst="rect">
@@ -11368,7 +11696,7 @@
         </p:nvCxnSpPr>
         <p:spPr>
           <a:xfrm flipH="1">
-            <a:off x="3485667" y="4723191"/>
+            <a:off x="3479916" y="4474790"/>
             <a:ext cx="3155" cy="296620"/>
           </a:xfrm>
           <a:prstGeom prst="straightConnector1">
@@ -11413,7 +11741,7 @@
         </p:nvSpPr>
         <p:spPr>
           <a:xfrm>
-            <a:off x="2812481" y="3944070"/>
+            <a:off x="2806730" y="3695669"/>
             <a:ext cx="1338950" cy="276999"/>
           </a:xfrm>
           <a:prstGeom prst="rect">
@@ -11454,7 +11782,7 @@
         </p:nvSpPr>
         <p:spPr>
           <a:xfrm>
-            <a:off x="7416371" y="3944070"/>
+            <a:off x="7410620" y="3695669"/>
             <a:ext cx="1338950" cy="276999"/>
           </a:xfrm>
           <a:prstGeom prst="rect">
@@ -11495,7 +11823,7 @@
         </p:nvSpPr>
         <p:spPr>
           <a:xfrm>
-            <a:off x="4603811" y="3017284"/>
+            <a:off x="4598060" y="2768883"/>
             <a:ext cx="2518823" cy="276999"/>
           </a:xfrm>
           <a:prstGeom prst="rect">
@@ -11552,7 +11880,7 @@
         </p:nvCxnSpPr>
         <p:spPr>
           <a:xfrm>
-            <a:off x="4162591" y="2946996"/>
+            <a:off x="4156840" y="2698595"/>
             <a:ext cx="441220" cy="208788"/>
           </a:xfrm>
           <a:prstGeom prst="straightConnector1">
@@ -11594,7 +11922,7 @@
         </p:nvCxnSpPr>
         <p:spPr>
           <a:xfrm flipH="1">
-            <a:off x="7122634" y="2946996"/>
+            <a:off x="7116883" y="2698595"/>
             <a:ext cx="293738" cy="208788"/>
           </a:xfrm>
           <a:prstGeom prst="straightConnector1">
@@ -11635,7 +11963,7 @@
         </p:nvCxnSpPr>
         <p:spPr>
           <a:xfrm>
-            <a:off x="3470901" y="3086108"/>
+            <a:off x="3465150" y="2837707"/>
             <a:ext cx="4614945" cy="857962"/>
           </a:xfrm>
           <a:prstGeom prst="straightConnector1">
@@ -11677,7 +12005,7 @@
         </p:nvCxnSpPr>
         <p:spPr>
           <a:xfrm>
-            <a:off x="8085846" y="4221069"/>
+            <a:off x="8080095" y="3972668"/>
             <a:ext cx="0" cy="262452"/>
           </a:xfrm>
           <a:prstGeom prst="straightConnector1">
@@ -11719,7 +12047,7 @@
         </p:nvCxnSpPr>
         <p:spPr>
           <a:xfrm>
-            <a:off x="8085846" y="4760520"/>
+            <a:off x="8080095" y="4512119"/>
             <a:ext cx="0" cy="726860"/>
           </a:xfrm>
           <a:prstGeom prst="straightConnector1">
@@ -11761,7 +12089,7 @@
         </p:nvCxnSpPr>
         <p:spPr>
           <a:xfrm flipV="1">
-            <a:off x="3485667" y="5296810"/>
+            <a:off x="3479916" y="5048409"/>
             <a:ext cx="0" cy="226055"/>
           </a:xfrm>
           <a:prstGeom prst="straightConnector1">
@@ -11806,7 +12134,7 @@
         </p:nvSpPr>
         <p:spPr>
           <a:xfrm>
-            <a:off x="4495505" y="4260802"/>
+            <a:off x="4489754" y="4012401"/>
             <a:ext cx="2518823" cy="1569660"/>
           </a:xfrm>
           <a:prstGeom prst="rect">
@@ -11847,10 +12175,1909 @@
           </a:p>
         </p:txBody>
       </p:sp>
+      <p:sp>
+        <p:nvSpPr>
+          <p:cNvPr id="39" name="矩形 38">
+            <a:extLst>
+              <a:ext uri="{FF2B5EF4-FFF2-40B4-BE49-F238E27FC236}">
+                <a16:creationId xmlns:a16="http://schemas.microsoft.com/office/drawing/2014/main" id="{53EF9FA6-EF88-4AC1-B2F4-9E22A3393418}"/>
+              </a:ext>
+            </a:extLst>
+          </p:cNvPr>
+          <p:cNvSpPr/>
+          <p:nvPr/>
+        </p:nvSpPr>
+        <p:spPr>
+          <a:xfrm>
+            <a:off x="3476205" y="6088001"/>
+            <a:ext cx="1805795" cy="247289"/>
+          </a:xfrm>
+          <a:prstGeom prst="rect">
+            <a:avLst/>
+          </a:prstGeom>
+        </p:spPr>
+        <p:style>
+          <a:lnRef idx="2">
+            <a:schemeClr val="accent6"/>
+          </a:lnRef>
+          <a:fillRef idx="1">
+            <a:schemeClr val="lt1"/>
+          </a:fillRef>
+          <a:effectRef idx="0">
+            <a:schemeClr val="accent6"/>
+          </a:effectRef>
+          <a:fontRef idx="minor">
+            <a:schemeClr val="dk1"/>
+          </a:fontRef>
+        </p:style>
+        <p:txBody>
+          <a:bodyPr rtlCol="0" anchor="ctr"/>
+          <a:lstStyle/>
+          <a:p>
+            <a:pPr algn="ctr"/>
+            <a:r>
+              <a:rPr lang="en-US" altLang="zh-CN" sz="1200" dirty="0"/>
+              <a:t>DB leader in OS30</a:t>
+            </a:r>
+          </a:p>
+        </p:txBody>
+      </p:sp>
+      <p:sp>
+        <p:nvSpPr>
+          <p:cNvPr id="40" name="矩形 39">
+            <a:extLst>
+              <a:ext uri="{FF2B5EF4-FFF2-40B4-BE49-F238E27FC236}">
+                <a16:creationId xmlns:a16="http://schemas.microsoft.com/office/drawing/2014/main" id="{E54E41B0-3E61-4172-A2B3-2F81D92F9E69}"/>
+              </a:ext>
+            </a:extLst>
+          </p:cNvPr>
+          <p:cNvSpPr/>
+          <p:nvPr/>
+        </p:nvSpPr>
+        <p:spPr>
+          <a:xfrm>
+            <a:off x="5604825" y="6119193"/>
+            <a:ext cx="1805795" cy="247289"/>
+          </a:xfrm>
+          <a:prstGeom prst="rect">
+            <a:avLst/>
+          </a:prstGeom>
+        </p:spPr>
+        <p:style>
+          <a:lnRef idx="2">
+            <a:schemeClr val="accent6"/>
+          </a:lnRef>
+          <a:fillRef idx="1">
+            <a:schemeClr val="lt1"/>
+          </a:fillRef>
+          <a:effectRef idx="0">
+            <a:schemeClr val="accent6"/>
+          </a:effectRef>
+          <a:fontRef idx="minor">
+            <a:schemeClr val="dk1"/>
+          </a:fontRef>
+        </p:style>
+        <p:txBody>
+          <a:bodyPr rtlCol="0" anchor="ctr"/>
+          <a:lstStyle/>
+          <a:p>
+            <a:pPr algn="ctr"/>
+            <a:r>
+              <a:rPr lang="en-US" altLang="zh-CN" sz="1200" dirty="0"/>
+              <a:t>DB follow in SG52</a:t>
+            </a:r>
+          </a:p>
+        </p:txBody>
+      </p:sp>
+      <p:sp>
+        <p:nvSpPr>
+          <p:cNvPr id="45" name="矩形 44">
+            <a:extLst>
+              <a:ext uri="{FF2B5EF4-FFF2-40B4-BE49-F238E27FC236}">
+                <a16:creationId xmlns:a16="http://schemas.microsoft.com/office/drawing/2014/main" id="{8CD11FAD-27D0-4F3F-9DE2-1097216C60C4}"/>
+              </a:ext>
+            </a:extLst>
+          </p:cNvPr>
+          <p:cNvSpPr/>
+          <p:nvPr/>
+        </p:nvSpPr>
+        <p:spPr>
+          <a:xfrm>
+            <a:off x="4434673" y="6490821"/>
+            <a:ext cx="1805795" cy="247289"/>
+          </a:xfrm>
+          <a:prstGeom prst="rect">
+            <a:avLst/>
+          </a:prstGeom>
+        </p:spPr>
+        <p:style>
+          <a:lnRef idx="2">
+            <a:schemeClr val="accent6"/>
+          </a:lnRef>
+          <a:fillRef idx="1">
+            <a:schemeClr val="lt1"/>
+          </a:fillRef>
+          <a:effectRef idx="0">
+            <a:schemeClr val="accent6"/>
+          </a:effectRef>
+          <a:fontRef idx="minor">
+            <a:schemeClr val="dk1"/>
+          </a:fontRef>
+        </p:style>
+        <p:txBody>
+          <a:bodyPr rtlCol="0" anchor="ctr"/>
+          <a:lstStyle/>
+          <a:p>
+            <a:pPr algn="ctr"/>
+            <a:r>
+              <a:rPr lang="en-US" altLang="zh-CN" sz="1200" dirty="0"/>
+              <a:t>DB </a:t>
+            </a:r>
+            <a:r>
+              <a:rPr lang="en-US" altLang="zh-CN" sz="1200" dirty="0" err="1"/>
+              <a:t>binlong</a:t>
+            </a:r>
+            <a:r>
+              <a:rPr lang="en-US" altLang="zh-CN" sz="1200" dirty="0"/>
+              <a:t> in SG113</a:t>
+            </a:r>
+          </a:p>
+        </p:txBody>
+      </p:sp>
+      <p:cxnSp>
+        <p:nvCxnSpPr>
+          <p:cNvPr id="11" name="直接箭头连接符 10">
+            <a:extLst>
+              <a:ext uri="{FF2B5EF4-FFF2-40B4-BE49-F238E27FC236}">
+                <a16:creationId xmlns:a16="http://schemas.microsoft.com/office/drawing/2014/main" id="{A21BDFA9-CD15-4BEF-9746-4B9FED91E824}"/>
+              </a:ext>
+            </a:extLst>
+          </p:cNvPr>
+          <p:cNvCxnSpPr>
+            <a:endCxn id="3" idx="0"/>
+          </p:cNvCxnSpPr>
+          <p:nvPr/>
+        </p:nvCxnSpPr>
+        <p:spPr>
+          <a:xfrm flipH="1">
+            <a:off x="5382883" y="5515978"/>
+            <a:ext cx="2651185" cy="447750"/>
+          </a:xfrm>
+          <a:prstGeom prst="straightConnector1">
+            <a:avLst/>
+          </a:prstGeom>
+          <a:ln>
+            <a:tailEnd type="triangle"/>
+          </a:ln>
+        </p:spPr>
+        <p:style>
+          <a:lnRef idx="1">
+            <a:schemeClr val="accent1"/>
+          </a:lnRef>
+          <a:fillRef idx="0">
+            <a:schemeClr val="accent1"/>
+          </a:fillRef>
+          <a:effectRef idx="0">
+            <a:schemeClr val="accent1"/>
+          </a:effectRef>
+          <a:fontRef idx="minor">
+            <a:schemeClr val="tx1"/>
+          </a:fontRef>
+        </p:style>
+      </p:cxnSp>
+      <p:cxnSp>
+        <p:nvCxnSpPr>
+          <p:cNvPr id="16" name="直接箭头连接符 15">
+            <a:extLst>
+              <a:ext uri="{FF2B5EF4-FFF2-40B4-BE49-F238E27FC236}">
+                <a16:creationId xmlns:a16="http://schemas.microsoft.com/office/drawing/2014/main" id="{D35326A1-F9C7-48D8-AFB7-F3373BBA8BCB}"/>
+              </a:ext>
+            </a:extLst>
+          </p:cNvPr>
+          <p:cNvCxnSpPr>
+            <a:stCxn id="25" idx="2"/>
+            <a:endCxn id="3" idx="0"/>
+          </p:cNvCxnSpPr>
+          <p:nvPr/>
+        </p:nvCxnSpPr>
+        <p:spPr>
+          <a:xfrm>
+            <a:off x="3479916" y="5551463"/>
+            <a:ext cx="1902967" cy="412265"/>
+          </a:xfrm>
+          <a:prstGeom prst="straightConnector1">
+            <a:avLst/>
+          </a:prstGeom>
+          <a:ln w="9525" cap="flat" cmpd="sng" algn="ctr">
+            <a:solidFill>
+              <a:schemeClr val="accent2"/>
+            </a:solidFill>
+            <a:prstDash val="solid"/>
+            <a:round/>
+            <a:headEnd type="none" w="med" len="med"/>
+            <a:tailEnd type="arrow" w="med" len="med"/>
+          </a:ln>
+        </p:spPr>
+        <p:style>
+          <a:lnRef idx="0">
+            <a:scrgbClr r="0" g="0" b="0"/>
+          </a:lnRef>
+          <a:fillRef idx="0">
+            <a:scrgbClr r="0" g="0" b="0"/>
+          </a:fillRef>
+          <a:effectRef idx="0">
+            <a:scrgbClr r="0" g="0" b="0"/>
+          </a:effectRef>
+          <a:fontRef idx="minor">
+            <a:schemeClr val="tx1"/>
+          </a:fontRef>
+        </p:style>
+      </p:cxnSp>
     </p:spTree>
     <p:extLst>
       <p:ext uri="{BB962C8B-B14F-4D97-AF65-F5344CB8AC3E}">
         <p14:creationId xmlns:p14="http://schemas.microsoft.com/office/powerpoint/2010/main" val="1903048047"/>
+      </p:ext>
+    </p:extLst>
+  </p:cSld>
+  <p:clrMapOvr>
+    <a:masterClrMapping/>
+  </p:clrMapOvr>
+</p:sld>
+</file>
+
+<file path=ppt/slides/slide6.xml><?xml version="1.0" encoding="utf-8"?>
+<p:sld xmlns:a="http://schemas.openxmlformats.org/drawingml/2006/main" xmlns:r="http://schemas.openxmlformats.org/officeDocument/2006/relationships" xmlns:p="http://schemas.openxmlformats.org/presentationml/2006/main">
+  <p:cSld>
+    <p:spTree>
+      <p:nvGrpSpPr>
+        <p:cNvPr id="1" name=""/>
+        <p:cNvGrpSpPr/>
+        <p:nvPr/>
+      </p:nvGrpSpPr>
+      <p:grpSpPr>
+        <a:xfrm>
+          <a:off x="0" y="0"/>
+          <a:ext cx="0" cy="0"/>
+          <a:chOff x="0" y="0"/>
+          <a:chExt cx="0" cy="0"/>
+        </a:xfrm>
+      </p:grpSpPr>
+      <p:sp>
+        <p:nvSpPr>
+          <p:cNvPr id="4" name="笑脸 3">
+            <a:extLst>
+              <a:ext uri="{FF2B5EF4-FFF2-40B4-BE49-F238E27FC236}">
+                <a16:creationId xmlns:a16="http://schemas.microsoft.com/office/drawing/2014/main" id="{40427EF2-413F-427A-83BF-076EB83BC4B8}"/>
+              </a:ext>
+            </a:extLst>
+          </p:cNvPr>
+          <p:cNvSpPr/>
+          <p:nvPr/>
+        </p:nvSpPr>
+        <p:spPr>
+          <a:xfrm>
+            <a:off x="5198852" y="287547"/>
+            <a:ext cx="408317" cy="500332"/>
+          </a:xfrm>
+          <a:prstGeom prst="smileyFace">
+            <a:avLst/>
+          </a:prstGeom>
+        </p:spPr>
+        <p:style>
+          <a:lnRef idx="2">
+            <a:schemeClr val="accent1">
+              <a:shade val="50000"/>
+            </a:schemeClr>
+          </a:lnRef>
+          <a:fillRef idx="1">
+            <a:schemeClr val="accent1"/>
+          </a:fillRef>
+          <a:effectRef idx="0">
+            <a:schemeClr val="accent1"/>
+          </a:effectRef>
+          <a:fontRef idx="minor">
+            <a:schemeClr val="lt1"/>
+          </a:fontRef>
+        </p:style>
+        <p:txBody>
+          <a:bodyPr rtlCol="0" anchor="ctr"/>
+          <a:lstStyle/>
+          <a:p>
+            <a:pPr algn="ctr"/>
+            <a:endParaRPr lang="zh-CN" altLang="en-US"/>
+          </a:p>
+        </p:txBody>
+      </p:sp>
+      <p:sp>
+        <p:nvSpPr>
+          <p:cNvPr id="5" name="矩形 4">
+            <a:extLst>
+              <a:ext uri="{FF2B5EF4-FFF2-40B4-BE49-F238E27FC236}">
+                <a16:creationId xmlns:a16="http://schemas.microsoft.com/office/drawing/2014/main" id="{888CF1E6-EFC5-40FC-821F-AC2ECC3709EB}"/>
+              </a:ext>
+            </a:extLst>
+          </p:cNvPr>
+          <p:cNvSpPr/>
+          <p:nvPr/>
+        </p:nvSpPr>
+        <p:spPr>
+          <a:xfrm>
+            <a:off x="4566250" y="1000665"/>
+            <a:ext cx="1805795" cy="247289"/>
+          </a:xfrm>
+          <a:prstGeom prst="rect">
+            <a:avLst/>
+          </a:prstGeom>
+        </p:spPr>
+        <p:style>
+          <a:lnRef idx="2">
+            <a:schemeClr val="accent6"/>
+          </a:lnRef>
+          <a:fillRef idx="1">
+            <a:schemeClr val="lt1"/>
+          </a:fillRef>
+          <a:effectRef idx="0">
+            <a:schemeClr val="accent6"/>
+          </a:effectRef>
+          <a:fontRef idx="minor">
+            <a:schemeClr val="dk1"/>
+          </a:fontRef>
+        </p:style>
+        <p:txBody>
+          <a:bodyPr rtlCol="0" anchor="ctr"/>
+          <a:lstStyle/>
+          <a:p>
+            <a:pPr algn="ctr"/>
+            <a:r>
+              <a:rPr lang="en-US" altLang="zh-CN" sz="1200" dirty="0"/>
+              <a:t>CDN</a:t>
+            </a:r>
+            <a:r>
+              <a:rPr lang="zh-CN" altLang="en-US" sz="1200" dirty="0"/>
+              <a:t>动态加速</a:t>
+            </a:r>
+            <a:endParaRPr lang="en-US" altLang="zh-CN" sz="1200" dirty="0"/>
+          </a:p>
+        </p:txBody>
+      </p:sp>
+      <p:sp>
+        <p:nvSpPr>
+          <p:cNvPr id="6" name="矩形 5">
+            <a:extLst>
+              <a:ext uri="{FF2B5EF4-FFF2-40B4-BE49-F238E27FC236}">
+                <a16:creationId xmlns:a16="http://schemas.microsoft.com/office/drawing/2014/main" id="{FCCF6F0F-39C2-4015-8278-79244FB0FE66}"/>
+              </a:ext>
+            </a:extLst>
+          </p:cNvPr>
+          <p:cNvSpPr/>
+          <p:nvPr/>
+        </p:nvSpPr>
+        <p:spPr>
+          <a:xfrm>
+            <a:off x="1854681" y="1877684"/>
+            <a:ext cx="1805795" cy="247289"/>
+          </a:xfrm>
+          <a:prstGeom prst="rect">
+            <a:avLst/>
+          </a:prstGeom>
+        </p:spPr>
+        <p:style>
+          <a:lnRef idx="2">
+            <a:schemeClr val="accent6"/>
+          </a:lnRef>
+          <a:fillRef idx="1">
+            <a:schemeClr val="lt1"/>
+          </a:fillRef>
+          <a:effectRef idx="0">
+            <a:schemeClr val="accent6"/>
+          </a:effectRef>
+          <a:fontRef idx="minor">
+            <a:schemeClr val="dk1"/>
+          </a:fontRef>
+        </p:style>
+        <p:txBody>
+          <a:bodyPr rtlCol="0" anchor="ctr"/>
+          <a:lstStyle/>
+          <a:p>
+            <a:pPr algn="ctr"/>
+            <a:r>
+              <a:rPr lang="zh-CN" altLang="en-US" sz="1200" dirty="0"/>
+              <a:t>统一接入层</a:t>
+            </a:r>
+            <a:endParaRPr lang="en-US" altLang="zh-CN" sz="1200" dirty="0"/>
+          </a:p>
+        </p:txBody>
+      </p:sp>
+      <p:sp>
+        <p:nvSpPr>
+          <p:cNvPr id="7" name="矩形 6">
+            <a:extLst>
+              <a:ext uri="{FF2B5EF4-FFF2-40B4-BE49-F238E27FC236}">
+                <a16:creationId xmlns:a16="http://schemas.microsoft.com/office/drawing/2014/main" id="{52BC8E9A-4548-4DCA-A8E0-CB03C85E10CC}"/>
+              </a:ext>
+            </a:extLst>
+          </p:cNvPr>
+          <p:cNvSpPr/>
+          <p:nvPr/>
+        </p:nvSpPr>
+        <p:spPr>
+          <a:xfrm>
+            <a:off x="4566250" y="1877684"/>
+            <a:ext cx="1805795" cy="247289"/>
+          </a:xfrm>
+          <a:prstGeom prst="rect">
+            <a:avLst/>
+          </a:prstGeom>
+        </p:spPr>
+        <p:style>
+          <a:lnRef idx="2">
+            <a:schemeClr val="accent6"/>
+          </a:lnRef>
+          <a:fillRef idx="1">
+            <a:schemeClr val="lt1"/>
+          </a:fillRef>
+          <a:effectRef idx="0">
+            <a:schemeClr val="accent6"/>
+          </a:effectRef>
+          <a:fontRef idx="minor">
+            <a:schemeClr val="dk1"/>
+          </a:fontRef>
+        </p:style>
+        <p:txBody>
+          <a:bodyPr rtlCol="0" anchor="ctr"/>
+          <a:lstStyle/>
+          <a:p>
+            <a:pPr algn="ctr"/>
+            <a:r>
+              <a:rPr lang="zh-CN" altLang="en-US" sz="1200" dirty="0"/>
+              <a:t>统一接入层</a:t>
+            </a:r>
+            <a:endParaRPr lang="en-US" altLang="zh-CN" sz="1200" dirty="0"/>
+          </a:p>
+        </p:txBody>
+      </p:sp>
+      <p:sp>
+        <p:nvSpPr>
+          <p:cNvPr id="8" name="矩形 7">
+            <a:extLst>
+              <a:ext uri="{FF2B5EF4-FFF2-40B4-BE49-F238E27FC236}">
+                <a16:creationId xmlns:a16="http://schemas.microsoft.com/office/drawing/2014/main" id="{337CB4FE-1F7F-4D37-AF0F-557238EB6DC0}"/>
+              </a:ext>
+            </a:extLst>
+          </p:cNvPr>
+          <p:cNvSpPr/>
+          <p:nvPr/>
+        </p:nvSpPr>
+        <p:spPr>
+          <a:xfrm>
+            <a:off x="7372710" y="1877684"/>
+            <a:ext cx="1805795" cy="247289"/>
+          </a:xfrm>
+          <a:prstGeom prst="rect">
+            <a:avLst/>
+          </a:prstGeom>
+        </p:spPr>
+        <p:style>
+          <a:lnRef idx="2">
+            <a:schemeClr val="accent6"/>
+          </a:lnRef>
+          <a:fillRef idx="1">
+            <a:schemeClr val="lt1"/>
+          </a:fillRef>
+          <a:effectRef idx="0">
+            <a:schemeClr val="accent6"/>
+          </a:effectRef>
+          <a:fontRef idx="minor">
+            <a:schemeClr val="dk1"/>
+          </a:fontRef>
+        </p:style>
+        <p:txBody>
+          <a:bodyPr rtlCol="0" anchor="ctr"/>
+          <a:lstStyle/>
+          <a:p>
+            <a:pPr algn="ctr"/>
+            <a:r>
+              <a:rPr lang="zh-CN" altLang="en-US" sz="1200" dirty="0"/>
+              <a:t>统一接入层</a:t>
+            </a:r>
+            <a:endParaRPr lang="en-US" altLang="zh-CN" sz="1200" dirty="0"/>
+          </a:p>
+        </p:txBody>
+      </p:sp>
+      <p:sp>
+        <p:nvSpPr>
+          <p:cNvPr id="10" name="矩形 9">
+            <a:extLst>
+              <a:ext uri="{FF2B5EF4-FFF2-40B4-BE49-F238E27FC236}">
+                <a16:creationId xmlns:a16="http://schemas.microsoft.com/office/drawing/2014/main" id="{9C5C031D-591D-4D21-94A7-0DF465ADD412}"/>
+              </a:ext>
+            </a:extLst>
+          </p:cNvPr>
+          <p:cNvSpPr/>
+          <p:nvPr/>
+        </p:nvSpPr>
+        <p:spPr>
+          <a:xfrm>
+            <a:off x="1854680" y="3349925"/>
+            <a:ext cx="1805795" cy="247289"/>
+          </a:xfrm>
+          <a:prstGeom prst="rect">
+            <a:avLst/>
+          </a:prstGeom>
+        </p:spPr>
+        <p:style>
+          <a:lnRef idx="2">
+            <a:schemeClr val="accent6"/>
+          </a:lnRef>
+          <a:fillRef idx="1">
+            <a:schemeClr val="lt1"/>
+          </a:fillRef>
+          <a:effectRef idx="0">
+            <a:schemeClr val="accent6"/>
+          </a:effectRef>
+          <a:fontRef idx="minor">
+            <a:schemeClr val="dk1"/>
+          </a:fontRef>
+        </p:style>
+        <p:txBody>
+          <a:bodyPr rtlCol="0" anchor="ctr"/>
+          <a:lstStyle/>
+          <a:p>
+            <a:pPr algn="ctr"/>
+            <a:r>
+              <a:rPr lang="zh-CN" altLang="en-US" sz="1200" dirty="0"/>
+              <a:t>导购搜索</a:t>
+            </a:r>
+            <a:endParaRPr lang="en-US" altLang="zh-CN" sz="1200" dirty="0"/>
+          </a:p>
+        </p:txBody>
+      </p:sp>
+      <p:sp>
+        <p:nvSpPr>
+          <p:cNvPr id="11" name="矩形 10">
+            <a:extLst>
+              <a:ext uri="{FF2B5EF4-FFF2-40B4-BE49-F238E27FC236}">
+                <a16:creationId xmlns:a16="http://schemas.microsoft.com/office/drawing/2014/main" id="{7B352EDC-FABA-4EC7-88E5-C5A95F0FB73C}"/>
+              </a:ext>
+            </a:extLst>
+          </p:cNvPr>
+          <p:cNvSpPr/>
+          <p:nvPr/>
+        </p:nvSpPr>
+        <p:spPr>
+          <a:xfrm>
+            <a:off x="4566248" y="3413185"/>
+            <a:ext cx="1805795" cy="247289"/>
+          </a:xfrm>
+          <a:prstGeom prst="rect">
+            <a:avLst/>
+          </a:prstGeom>
+        </p:spPr>
+        <p:style>
+          <a:lnRef idx="2">
+            <a:schemeClr val="accent6"/>
+          </a:lnRef>
+          <a:fillRef idx="1">
+            <a:schemeClr val="lt1"/>
+          </a:fillRef>
+          <a:effectRef idx="0">
+            <a:schemeClr val="accent6"/>
+          </a:effectRef>
+          <a:fontRef idx="minor">
+            <a:schemeClr val="dk1"/>
+          </a:fontRef>
+        </p:style>
+        <p:txBody>
+          <a:bodyPr rtlCol="0" anchor="ctr"/>
+          <a:lstStyle/>
+          <a:p>
+            <a:pPr algn="ctr"/>
+            <a:r>
+              <a:rPr lang="zh-CN" altLang="en-US" sz="1200" dirty="0"/>
+              <a:t>导购搜索</a:t>
+            </a:r>
+            <a:endParaRPr lang="en-US" altLang="zh-CN" sz="1200" dirty="0"/>
+          </a:p>
+        </p:txBody>
+      </p:sp>
+      <p:sp>
+        <p:nvSpPr>
+          <p:cNvPr id="12" name="矩形 11">
+            <a:extLst>
+              <a:ext uri="{FF2B5EF4-FFF2-40B4-BE49-F238E27FC236}">
+                <a16:creationId xmlns:a16="http://schemas.microsoft.com/office/drawing/2014/main" id="{CA000967-222C-4E18-B68A-70BB49C21CE4}"/>
+              </a:ext>
+            </a:extLst>
+          </p:cNvPr>
+          <p:cNvSpPr/>
+          <p:nvPr/>
+        </p:nvSpPr>
+        <p:spPr>
+          <a:xfrm>
+            <a:off x="7372708" y="3429000"/>
+            <a:ext cx="1805795" cy="247289"/>
+          </a:xfrm>
+          <a:prstGeom prst="rect">
+            <a:avLst/>
+          </a:prstGeom>
+        </p:spPr>
+        <p:style>
+          <a:lnRef idx="2">
+            <a:schemeClr val="accent6"/>
+          </a:lnRef>
+          <a:fillRef idx="1">
+            <a:schemeClr val="lt1"/>
+          </a:fillRef>
+          <a:effectRef idx="0">
+            <a:schemeClr val="accent6"/>
+          </a:effectRef>
+          <a:fontRef idx="minor">
+            <a:schemeClr val="dk1"/>
+          </a:fontRef>
+        </p:style>
+        <p:txBody>
+          <a:bodyPr rtlCol="0" anchor="ctr"/>
+          <a:lstStyle/>
+          <a:p>
+            <a:pPr algn="ctr"/>
+            <a:r>
+              <a:rPr lang="zh-CN" altLang="en-US" sz="1200" dirty="0"/>
+              <a:t>导购搜索</a:t>
+            </a:r>
+            <a:endParaRPr lang="en-US" altLang="zh-CN" sz="1200" dirty="0"/>
+          </a:p>
+        </p:txBody>
+      </p:sp>
+      <p:sp>
+        <p:nvSpPr>
+          <p:cNvPr id="13" name="矩形 12">
+            <a:extLst>
+              <a:ext uri="{FF2B5EF4-FFF2-40B4-BE49-F238E27FC236}">
+                <a16:creationId xmlns:a16="http://schemas.microsoft.com/office/drawing/2014/main" id="{F1F5843F-54E4-4C2D-BC87-071EA98EF4B6}"/>
+              </a:ext>
+            </a:extLst>
+          </p:cNvPr>
+          <p:cNvSpPr/>
+          <p:nvPr/>
+        </p:nvSpPr>
+        <p:spPr>
+          <a:xfrm>
+            <a:off x="1854680" y="3850257"/>
+            <a:ext cx="1805795" cy="247289"/>
+          </a:xfrm>
+          <a:prstGeom prst="rect">
+            <a:avLst/>
+          </a:prstGeom>
+        </p:spPr>
+        <p:style>
+          <a:lnRef idx="2">
+            <a:schemeClr val="accent6"/>
+          </a:lnRef>
+          <a:fillRef idx="1">
+            <a:schemeClr val="lt1"/>
+          </a:fillRef>
+          <a:effectRef idx="0">
+            <a:schemeClr val="accent6"/>
+          </a:effectRef>
+          <a:fontRef idx="minor">
+            <a:schemeClr val="dk1"/>
+          </a:fontRef>
+        </p:style>
+        <p:txBody>
+          <a:bodyPr rtlCol="0" anchor="ctr"/>
+          <a:lstStyle/>
+          <a:p>
+            <a:pPr algn="ctr"/>
+            <a:r>
+              <a:rPr lang="zh-CN" altLang="en-US" sz="1200" dirty="0"/>
+              <a:t>交易</a:t>
+            </a:r>
+            <a:endParaRPr lang="en-US" altLang="zh-CN" sz="1200" dirty="0"/>
+          </a:p>
+        </p:txBody>
+      </p:sp>
+      <p:sp>
+        <p:nvSpPr>
+          <p:cNvPr id="14" name="矩形 13">
+            <a:extLst>
+              <a:ext uri="{FF2B5EF4-FFF2-40B4-BE49-F238E27FC236}">
+                <a16:creationId xmlns:a16="http://schemas.microsoft.com/office/drawing/2014/main" id="{ADF6FC50-461A-4F79-904B-3B53BE1AB9CB}"/>
+              </a:ext>
+            </a:extLst>
+          </p:cNvPr>
+          <p:cNvSpPr/>
+          <p:nvPr/>
+        </p:nvSpPr>
+        <p:spPr>
+          <a:xfrm>
+            <a:off x="4566249" y="3919267"/>
+            <a:ext cx="1805795" cy="247289"/>
+          </a:xfrm>
+          <a:prstGeom prst="rect">
+            <a:avLst/>
+          </a:prstGeom>
+        </p:spPr>
+        <p:style>
+          <a:lnRef idx="2">
+            <a:schemeClr val="accent6"/>
+          </a:lnRef>
+          <a:fillRef idx="1">
+            <a:schemeClr val="lt1"/>
+          </a:fillRef>
+          <a:effectRef idx="0">
+            <a:schemeClr val="accent6"/>
+          </a:effectRef>
+          <a:fontRef idx="minor">
+            <a:schemeClr val="dk1"/>
+          </a:fontRef>
+        </p:style>
+        <p:txBody>
+          <a:bodyPr rtlCol="0" anchor="ctr"/>
+          <a:lstStyle/>
+          <a:p>
+            <a:pPr algn="ctr"/>
+            <a:r>
+              <a:rPr lang="zh-CN" altLang="en-US" sz="1200" dirty="0"/>
+              <a:t>交易</a:t>
+            </a:r>
+            <a:endParaRPr lang="en-US" altLang="zh-CN" sz="1200" dirty="0"/>
+          </a:p>
+        </p:txBody>
+      </p:sp>
+      <p:sp>
+        <p:nvSpPr>
+          <p:cNvPr id="15" name="矩形 14">
+            <a:extLst>
+              <a:ext uri="{FF2B5EF4-FFF2-40B4-BE49-F238E27FC236}">
+                <a16:creationId xmlns:a16="http://schemas.microsoft.com/office/drawing/2014/main" id="{D7AF5165-5237-49FD-89EE-254BEF8337FE}"/>
+              </a:ext>
+            </a:extLst>
+          </p:cNvPr>
+          <p:cNvSpPr/>
+          <p:nvPr/>
+        </p:nvSpPr>
+        <p:spPr>
+          <a:xfrm>
+            <a:off x="7372709" y="3919266"/>
+            <a:ext cx="1805795" cy="247289"/>
+          </a:xfrm>
+          <a:prstGeom prst="rect">
+            <a:avLst/>
+          </a:prstGeom>
+        </p:spPr>
+        <p:style>
+          <a:lnRef idx="2">
+            <a:schemeClr val="accent6"/>
+          </a:lnRef>
+          <a:fillRef idx="1">
+            <a:schemeClr val="lt1"/>
+          </a:fillRef>
+          <a:effectRef idx="0">
+            <a:schemeClr val="accent6"/>
+          </a:effectRef>
+          <a:fontRef idx="minor">
+            <a:schemeClr val="dk1"/>
+          </a:fontRef>
+        </p:style>
+        <p:txBody>
+          <a:bodyPr rtlCol="0" anchor="ctr"/>
+          <a:lstStyle/>
+          <a:p>
+            <a:pPr algn="ctr"/>
+            <a:r>
+              <a:rPr lang="zh-CN" altLang="en-US" sz="1200" dirty="0"/>
+              <a:t>交易</a:t>
+            </a:r>
+            <a:endParaRPr lang="en-US" altLang="zh-CN" sz="1200" dirty="0"/>
+          </a:p>
+        </p:txBody>
+      </p:sp>
+      <p:sp>
+        <p:nvSpPr>
+          <p:cNvPr id="16" name="矩形 15">
+            <a:extLst>
+              <a:ext uri="{FF2B5EF4-FFF2-40B4-BE49-F238E27FC236}">
+                <a16:creationId xmlns:a16="http://schemas.microsoft.com/office/drawing/2014/main" id="{332C73EB-8450-4E85-9EF3-1EC159162152}"/>
+              </a:ext>
+            </a:extLst>
+          </p:cNvPr>
+          <p:cNvSpPr/>
+          <p:nvPr/>
+        </p:nvSpPr>
+        <p:spPr>
+          <a:xfrm>
+            <a:off x="7372706" y="2373705"/>
+            <a:ext cx="1805795" cy="247289"/>
+          </a:xfrm>
+          <a:prstGeom prst="rect">
+            <a:avLst/>
+          </a:prstGeom>
+        </p:spPr>
+        <p:style>
+          <a:lnRef idx="2">
+            <a:schemeClr val="accent6"/>
+          </a:lnRef>
+          <a:fillRef idx="1">
+            <a:schemeClr val="lt1"/>
+          </a:fillRef>
+          <a:effectRef idx="0">
+            <a:schemeClr val="accent6"/>
+          </a:effectRef>
+          <a:fontRef idx="minor">
+            <a:schemeClr val="dk1"/>
+          </a:fontRef>
+        </p:style>
+        <p:txBody>
+          <a:bodyPr rtlCol="0" anchor="ctr"/>
+          <a:lstStyle/>
+          <a:p>
+            <a:pPr algn="ctr"/>
+            <a:r>
+              <a:rPr lang="zh-CN" altLang="en-US" sz="1200" dirty="0"/>
+              <a:t>区域化路由层</a:t>
+            </a:r>
+            <a:endParaRPr lang="en-US" altLang="zh-CN" sz="1200" dirty="0"/>
+          </a:p>
+        </p:txBody>
+      </p:sp>
+      <p:sp>
+        <p:nvSpPr>
+          <p:cNvPr id="17" name="矩形 16">
+            <a:extLst>
+              <a:ext uri="{FF2B5EF4-FFF2-40B4-BE49-F238E27FC236}">
+                <a16:creationId xmlns:a16="http://schemas.microsoft.com/office/drawing/2014/main" id="{A7B21C8C-ABBE-4460-9643-57921AB429E1}"/>
+              </a:ext>
+            </a:extLst>
+          </p:cNvPr>
+          <p:cNvSpPr/>
+          <p:nvPr/>
+        </p:nvSpPr>
+        <p:spPr>
+          <a:xfrm>
+            <a:off x="4566246" y="2373706"/>
+            <a:ext cx="1805795" cy="247289"/>
+          </a:xfrm>
+          <a:prstGeom prst="rect">
+            <a:avLst/>
+          </a:prstGeom>
+        </p:spPr>
+        <p:style>
+          <a:lnRef idx="2">
+            <a:schemeClr val="accent6"/>
+          </a:lnRef>
+          <a:fillRef idx="1">
+            <a:schemeClr val="lt1"/>
+          </a:fillRef>
+          <a:effectRef idx="0">
+            <a:schemeClr val="accent6"/>
+          </a:effectRef>
+          <a:fontRef idx="minor">
+            <a:schemeClr val="dk1"/>
+          </a:fontRef>
+        </p:style>
+        <p:txBody>
+          <a:bodyPr rtlCol="0" anchor="ctr"/>
+          <a:lstStyle/>
+          <a:p>
+            <a:pPr algn="ctr"/>
+            <a:r>
+              <a:rPr lang="zh-CN" altLang="en-US" sz="1200" dirty="0"/>
+              <a:t>区域化路由层</a:t>
+            </a:r>
+            <a:endParaRPr lang="en-US" altLang="zh-CN" sz="1200" dirty="0"/>
+          </a:p>
+        </p:txBody>
+      </p:sp>
+      <p:sp>
+        <p:nvSpPr>
+          <p:cNvPr id="18" name="矩形 17">
+            <a:extLst>
+              <a:ext uri="{FF2B5EF4-FFF2-40B4-BE49-F238E27FC236}">
+                <a16:creationId xmlns:a16="http://schemas.microsoft.com/office/drawing/2014/main" id="{FCA19D50-3429-45B4-9A7F-D46246116082}"/>
+              </a:ext>
+            </a:extLst>
+          </p:cNvPr>
+          <p:cNvSpPr/>
+          <p:nvPr/>
+        </p:nvSpPr>
+        <p:spPr>
+          <a:xfrm>
+            <a:off x="1854680" y="2378016"/>
+            <a:ext cx="1805795" cy="247289"/>
+          </a:xfrm>
+          <a:prstGeom prst="rect">
+            <a:avLst/>
+          </a:prstGeom>
+        </p:spPr>
+        <p:style>
+          <a:lnRef idx="2">
+            <a:schemeClr val="accent6"/>
+          </a:lnRef>
+          <a:fillRef idx="1">
+            <a:schemeClr val="lt1"/>
+          </a:fillRef>
+          <a:effectRef idx="0">
+            <a:schemeClr val="accent6"/>
+          </a:effectRef>
+          <a:fontRef idx="minor">
+            <a:schemeClr val="dk1"/>
+          </a:fontRef>
+        </p:style>
+        <p:txBody>
+          <a:bodyPr rtlCol="0" anchor="ctr"/>
+          <a:lstStyle/>
+          <a:p>
+            <a:pPr algn="ctr"/>
+            <a:r>
+              <a:rPr lang="zh-CN" altLang="en-US" sz="1200" dirty="0"/>
+              <a:t>区域化路由层</a:t>
+            </a:r>
+            <a:endParaRPr lang="en-US" altLang="zh-CN" sz="1200" dirty="0"/>
+          </a:p>
+        </p:txBody>
+      </p:sp>
+      <p:sp>
+        <p:nvSpPr>
+          <p:cNvPr id="19" name="矩形 18">
+            <a:extLst>
+              <a:ext uri="{FF2B5EF4-FFF2-40B4-BE49-F238E27FC236}">
+                <a16:creationId xmlns:a16="http://schemas.microsoft.com/office/drawing/2014/main" id="{076222BF-81AC-49D4-9886-813209AE90D0}"/>
+              </a:ext>
+            </a:extLst>
+          </p:cNvPr>
+          <p:cNvSpPr/>
+          <p:nvPr/>
+        </p:nvSpPr>
+        <p:spPr>
+          <a:xfrm>
+            <a:off x="1846053" y="2790647"/>
+            <a:ext cx="1805795" cy="247289"/>
+          </a:xfrm>
+          <a:prstGeom prst="rect">
+            <a:avLst/>
+          </a:prstGeom>
+        </p:spPr>
+        <p:style>
+          <a:lnRef idx="2">
+            <a:schemeClr val="accent6"/>
+          </a:lnRef>
+          <a:fillRef idx="1">
+            <a:schemeClr val="lt1"/>
+          </a:fillRef>
+          <a:effectRef idx="0">
+            <a:schemeClr val="accent6"/>
+          </a:effectRef>
+          <a:fontRef idx="minor">
+            <a:schemeClr val="dk1"/>
+          </a:fontRef>
+        </p:style>
+        <p:txBody>
+          <a:bodyPr rtlCol="0" anchor="ctr"/>
+          <a:lstStyle/>
+          <a:p>
+            <a:pPr algn="ctr"/>
+            <a:r>
+              <a:rPr lang="zh-CN" altLang="en-US" sz="1200" dirty="0"/>
+              <a:t>服务发现</a:t>
+            </a:r>
+            <a:r>
+              <a:rPr lang="en-US" altLang="zh-CN" sz="1200" dirty="0"/>
+              <a:t>HSF</a:t>
+            </a:r>
+          </a:p>
+        </p:txBody>
+      </p:sp>
+      <p:sp>
+        <p:nvSpPr>
+          <p:cNvPr id="20" name="矩形 19">
+            <a:extLst>
+              <a:ext uri="{FF2B5EF4-FFF2-40B4-BE49-F238E27FC236}">
+                <a16:creationId xmlns:a16="http://schemas.microsoft.com/office/drawing/2014/main" id="{4F29CF1F-5675-4A13-B3B8-2C12B8D9AE75}"/>
+              </a:ext>
+            </a:extLst>
+          </p:cNvPr>
+          <p:cNvSpPr/>
+          <p:nvPr/>
+        </p:nvSpPr>
+        <p:spPr>
+          <a:xfrm>
+            <a:off x="4566248" y="2790647"/>
+            <a:ext cx="1805795" cy="247289"/>
+          </a:xfrm>
+          <a:prstGeom prst="rect">
+            <a:avLst/>
+          </a:prstGeom>
+        </p:spPr>
+        <p:style>
+          <a:lnRef idx="2">
+            <a:schemeClr val="accent6"/>
+          </a:lnRef>
+          <a:fillRef idx="1">
+            <a:schemeClr val="lt1"/>
+          </a:fillRef>
+          <a:effectRef idx="0">
+            <a:schemeClr val="accent6"/>
+          </a:effectRef>
+          <a:fontRef idx="minor">
+            <a:schemeClr val="dk1"/>
+          </a:fontRef>
+        </p:style>
+        <p:txBody>
+          <a:bodyPr rtlCol="0" anchor="ctr"/>
+          <a:lstStyle/>
+          <a:p>
+            <a:pPr algn="ctr"/>
+            <a:r>
+              <a:rPr lang="zh-CN" altLang="en-US" sz="1200" dirty="0"/>
+              <a:t>服务发现</a:t>
+            </a:r>
+            <a:r>
+              <a:rPr lang="en-US" altLang="zh-CN" sz="1200" dirty="0"/>
+              <a:t>HSF</a:t>
+            </a:r>
+          </a:p>
+        </p:txBody>
+      </p:sp>
+      <p:sp>
+        <p:nvSpPr>
+          <p:cNvPr id="21" name="矩形 20">
+            <a:extLst>
+              <a:ext uri="{FF2B5EF4-FFF2-40B4-BE49-F238E27FC236}">
+                <a16:creationId xmlns:a16="http://schemas.microsoft.com/office/drawing/2014/main" id="{0F9FC9F7-ECC6-4E5F-BC54-6DA2A219A012}"/>
+              </a:ext>
+            </a:extLst>
+          </p:cNvPr>
+          <p:cNvSpPr/>
+          <p:nvPr/>
+        </p:nvSpPr>
+        <p:spPr>
+          <a:xfrm>
+            <a:off x="7372708" y="2790647"/>
+            <a:ext cx="1805795" cy="247289"/>
+          </a:xfrm>
+          <a:prstGeom prst="rect">
+            <a:avLst/>
+          </a:prstGeom>
+        </p:spPr>
+        <p:style>
+          <a:lnRef idx="2">
+            <a:schemeClr val="accent6"/>
+          </a:lnRef>
+          <a:fillRef idx="1">
+            <a:schemeClr val="lt1"/>
+          </a:fillRef>
+          <a:effectRef idx="0">
+            <a:schemeClr val="accent6"/>
+          </a:effectRef>
+          <a:fontRef idx="minor">
+            <a:schemeClr val="dk1"/>
+          </a:fontRef>
+        </p:style>
+        <p:txBody>
+          <a:bodyPr rtlCol="0" anchor="ctr"/>
+          <a:lstStyle/>
+          <a:p>
+            <a:pPr algn="ctr"/>
+            <a:r>
+              <a:rPr lang="zh-CN" altLang="en-US" sz="1200" dirty="0"/>
+              <a:t>服务发现</a:t>
+            </a:r>
+            <a:r>
+              <a:rPr lang="en-US" altLang="zh-CN" sz="1200" dirty="0"/>
+              <a:t>HSF</a:t>
+            </a:r>
+          </a:p>
+        </p:txBody>
+      </p:sp>
+      <p:sp>
+        <p:nvSpPr>
+          <p:cNvPr id="22" name="矩形 21">
+            <a:extLst>
+              <a:ext uri="{FF2B5EF4-FFF2-40B4-BE49-F238E27FC236}">
+                <a16:creationId xmlns:a16="http://schemas.microsoft.com/office/drawing/2014/main" id="{B1D8BAD4-0889-4A51-B726-CD39B0859CDF}"/>
+              </a:ext>
+            </a:extLst>
+          </p:cNvPr>
+          <p:cNvSpPr/>
+          <p:nvPr/>
+        </p:nvSpPr>
+        <p:spPr>
+          <a:xfrm>
+            <a:off x="1846052" y="4350589"/>
+            <a:ext cx="1805795" cy="247289"/>
+          </a:xfrm>
+          <a:prstGeom prst="rect">
+            <a:avLst/>
+          </a:prstGeom>
+        </p:spPr>
+        <p:style>
+          <a:lnRef idx="2">
+            <a:schemeClr val="accent6"/>
+          </a:lnRef>
+          <a:fillRef idx="1">
+            <a:schemeClr val="lt1"/>
+          </a:fillRef>
+          <a:effectRef idx="0">
+            <a:schemeClr val="accent6"/>
+          </a:effectRef>
+          <a:fontRef idx="minor">
+            <a:schemeClr val="dk1"/>
+          </a:fontRef>
+        </p:style>
+        <p:txBody>
+          <a:bodyPr rtlCol="0" anchor="ctr"/>
+          <a:lstStyle/>
+          <a:p>
+            <a:pPr algn="ctr"/>
+            <a:r>
+              <a:rPr lang="zh-CN" altLang="en-US" sz="1200" dirty="0"/>
+              <a:t>支付</a:t>
+            </a:r>
+            <a:endParaRPr lang="en-US" altLang="zh-CN" sz="1200" dirty="0"/>
+          </a:p>
+        </p:txBody>
+      </p:sp>
+      <p:sp>
+        <p:nvSpPr>
+          <p:cNvPr id="23" name="矩形 22">
+            <a:extLst>
+              <a:ext uri="{FF2B5EF4-FFF2-40B4-BE49-F238E27FC236}">
+                <a16:creationId xmlns:a16="http://schemas.microsoft.com/office/drawing/2014/main" id="{0925603C-935A-4A5E-8C73-19C1F5F63A61}"/>
+              </a:ext>
+            </a:extLst>
+          </p:cNvPr>
+          <p:cNvSpPr/>
+          <p:nvPr/>
+        </p:nvSpPr>
+        <p:spPr>
+          <a:xfrm>
+            <a:off x="4566247" y="4405222"/>
+            <a:ext cx="1805795" cy="247289"/>
+          </a:xfrm>
+          <a:prstGeom prst="rect">
+            <a:avLst/>
+          </a:prstGeom>
+        </p:spPr>
+        <p:style>
+          <a:lnRef idx="2">
+            <a:schemeClr val="accent6"/>
+          </a:lnRef>
+          <a:fillRef idx="1">
+            <a:schemeClr val="lt1"/>
+          </a:fillRef>
+          <a:effectRef idx="0">
+            <a:schemeClr val="accent6"/>
+          </a:effectRef>
+          <a:fontRef idx="minor">
+            <a:schemeClr val="dk1"/>
+          </a:fontRef>
+        </p:style>
+        <p:txBody>
+          <a:bodyPr rtlCol="0" anchor="ctr"/>
+          <a:lstStyle/>
+          <a:p>
+            <a:pPr algn="ctr"/>
+            <a:r>
+              <a:rPr lang="zh-CN" altLang="en-US" sz="1200" dirty="0"/>
+              <a:t>支付</a:t>
+            </a:r>
+            <a:endParaRPr lang="en-US" altLang="zh-CN" sz="1200" dirty="0"/>
+          </a:p>
+        </p:txBody>
+      </p:sp>
+      <p:sp>
+        <p:nvSpPr>
+          <p:cNvPr id="24" name="矩形 23">
+            <a:extLst>
+              <a:ext uri="{FF2B5EF4-FFF2-40B4-BE49-F238E27FC236}">
+                <a16:creationId xmlns:a16="http://schemas.microsoft.com/office/drawing/2014/main" id="{1A74085B-3997-4B01-B095-2681654BC850}"/>
+              </a:ext>
+            </a:extLst>
+          </p:cNvPr>
+          <p:cNvSpPr/>
+          <p:nvPr/>
+        </p:nvSpPr>
+        <p:spPr>
+          <a:xfrm>
+            <a:off x="7372708" y="4405221"/>
+            <a:ext cx="1805795" cy="247289"/>
+          </a:xfrm>
+          <a:prstGeom prst="rect">
+            <a:avLst/>
+          </a:prstGeom>
+        </p:spPr>
+        <p:style>
+          <a:lnRef idx="2">
+            <a:schemeClr val="accent6"/>
+          </a:lnRef>
+          <a:fillRef idx="1">
+            <a:schemeClr val="lt1"/>
+          </a:fillRef>
+          <a:effectRef idx="0">
+            <a:schemeClr val="accent6"/>
+          </a:effectRef>
+          <a:fontRef idx="minor">
+            <a:schemeClr val="dk1"/>
+          </a:fontRef>
+        </p:style>
+        <p:txBody>
+          <a:bodyPr rtlCol="0" anchor="ctr"/>
+          <a:lstStyle/>
+          <a:p>
+            <a:pPr algn="ctr"/>
+            <a:r>
+              <a:rPr lang="zh-CN" altLang="en-US" sz="1200" dirty="0"/>
+              <a:t>支付</a:t>
+            </a:r>
+            <a:endParaRPr lang="en-US" altLang="zh-CN" sz="1200" dirty="0"/>
+          </a:p>
+        </p:txBody>
+      </p:sp>
+      <p:sp>
+        <p:nvSpPr>
+          <p:cNvPr id="25" name="矩形 24">
+            <a:extLst>
+              <a:ext uri="{FF2B5EF4-FFF2-40B4-BE49-F238E27FC236}">
+                <a16:creationId xmlns:a16="http://schemas.microsoft.com/office/drawing/2014/main" id="{DD32D54F-5CF8-4D2A-880C-5AB85BC9538D}"/>
+              </a:ext>
+            </a:extLst>
+          </p:cNvPr>
+          <p:cNvSpPr/>
+          <p:nvPr/>
+        </p:nvSpPr>
+        <p:spPr>
+          <a:xfrm>
+            <a:off x="4566247" y="4904115"/>
+            <a:ext cx="1805795" cy="247289"/>
+          </a:xfrm>
+          <a:prstGeom prst="rect">
+            <a:avLst/>
+          </a:prstGeom>
+        </p:spPr>
+        <p:style>
+          <a:lnRef idx="2">
+            <a:schemeClr val="accent6"/>
+          </a:lnRef>
+          <a:fillRef idx="1">
+            <a:schemeClr val="lt1"/>
+          </a:fillRef>
+          <a:effectRef idx="0">
+            <a:schemeClr val="accent6"/>
+          </a:effectRef>
+          <a:fontRef idx="minor">
+            <a:schemeClr val="dk1"/>
+          </a:fontRef>
+        </p:style>
+        <p:txBody>
+          <a:bodyPr rtlCol="0" anchor="ctr"/>
+          <a:lstStyle/>
+          <a:p>
+            <a:pPr algn="ctr"/>
+            <a:r>
+              <a:rPr lang="zh-CN" altLang="en-US" sz="1200" dirty="0"/>
+              <a:t>库存</a:t>
+            </a:r>
+            <a:r>
+              <a:rPr lang="en-US" altLang="zh-CN" sz="1200" dirty="0"/>
+              <a:t>/</a:t>
+            </a:r>
+            <a:r>
+              <a:rPr lang="zh-CN" altLang="en-US" sz="1200" dirty="0"/>
+              <a:t>优惠</a:t>
+            </a:r>
+            <a:endParaRPr lang="en-US" altLang="zh-CN" sz="1200" dirty="0"/>
+          </a:p>
+        </p:txBody>
+      </p:sp>
+      <p:sp>
+        <p:nvSpPr>
+          <p:cNvPr id="26" name="矩形 25">
+            <a:extLst>
+              <a:ext uri="{FF2B5EF4-FFF2-40B4-BE49-F238E27FC236}">
+                <a16:creationId xmlns:a16="http://schemas.microsoft.com/office/drawing/2014/main" id="{57F0070C-38B1-44D0-B528-F83379A542EA}"/>
+              </a:ext>
+            </a:extLst>
+          </p:cNvPr>
+          <p:cNvSpPr/>
+          <p:nvPr/>
+        </p:nvSpPr>
+        <p:spPr>
+          <a:xfrm>
+            <a:off x="1854680" y="4850921"/>
+            <a:ext cx="1805795" cy="247289"/>
+          </a:xfrm>
+          <a:prstGeom prst="rect">
+            <a:avLst/>
+          </a:prstGeom>
+        </p:spPr>
+        <p:style>
+          <a:lnRef idx="2">
+            <a:schemeClr val="accent6"/>
+          </a:lnRef>
+          <a:fillRef idx="1">
+            <a:schemeClr val="lt1"/>
+          </a:fillRef>
+          <a:effectRef idx="0">
+            <a:schemeClr val="accent6"/>
+          </a:effectRef>
+          <a:fontRef idx="minor">
+            <a:schemeClr val="dk1"/>
+          </a:fontRef>
+        </p:style>
+        <p:txBody>
+          <a:bodyPr rtlCol="0" anchor="ctr"/>
+          <a:lstStyle/>
+          <a:p>
+            <a:pPr algn="ctr"/>
+            <a:r>
+              <a:rPr lang="zh-CN" altLang="en-US" sz="1200" dirty="0"/>
+              <a:t>库存</a:t>
+            </a:r>
+            <a:r>
+              <a:rPr lang="en-US" altLang="zh-CN" sz="1200" dirty="0"/>
+              <a:t>/</a:t>
+            </a:r>
+            <a:r>
+              <a:rPr lang="zh-CN" altLang="en-US" sz="1200" dirty="0"/>
+              <a:t>优惠</a:t>
+            </a:r>
+            <a:endParaRPr lang="en-US" altLang="zh-CN" sz="1200" dirty="0"/>
+          </a:p>
+        </p:txBody>
+      </p:sp>
+      <p:sp>
+        <p:nvSpPr>
+          <p:cNvPr id="27" name="矩形 26">
+            <a:extLst>
+              <a:ext uri="{FF2B5EF4-FFF2-40B4-BE49-F238E27FC236}">
+                <a16:creationId xmlns:a16="http://schemas.microsoft.com/office/drawing/2014/main" id="{FCA2FF62-BB44-4F83-A07C-D3DDDF4B7E8F}"/>
+              </a:ext>
+            </a:extLst>
+          </p:cNvPr>
+          <p:cNvSpPr/>
+          <p:nvPr/>
+        </p:nvSpPr>
+        <p:spPr>
+          <a:xfrm>
+            <a:off x="7372707" y="4924240"/>
+            <a:ext cx="1805795" cy="247289"/>
+          </a:xfrm>
+          <a:prstGeom prst="rect">
+            <a:avLst/>
+          </a:prstGeom>
+        </p:spPr>
+        <p:style>
+          <a:lnRef idx="2">
+            <a:schemeClr val="accent6"/>
+          </a:lnRef>
+          <a:fillRef idx="1">
+            <a:schemeClr val="lt1"/>
+          </a:fillRef>
+          <a:effectRef idx="0">
+            <a:schemeClr val="accent6"/>
+          </a:effectRef>
+          <a:fontRef idx="minor">
+            <a:schemeClr val="dk1"/>
+          </a:fontRef>
+        </p:style>
+        <p:txBody>
+          <a:bodyPr rtlCol="0" anchor="ctr"/>
+          <a:lstStyle/>
+          <a:p>
+            <a:pPr algn="ctr"/>
+            <a:r>
+              <a:rPr lang="zh-CN" altLang="en-US" sz="1200" dirty="0"/>
+              <a:t>库存</a:t>
+            </a:r>
+            <a:r>
+              <a:rPr lang="en-US" altLang="zh-CN" sz="1200" dirty="0"/>
+              <a:t>/</a:t>
+            </a:r>
+            <a:r>
+              <a:rPr lang="zh-CN" altLang="en-US" sz="1200" dirty="0"/>
+              <a:t>优惠</a:t>
+            </a:r>
+            <a:endParaRPr lang="en-US" altLang="zh-CN" sz="1200" dirty="0"/>
+          </a:p>
+        </p:txBody>
+      </p:sp>
+      <p:cxnSp>
+        <p:nvCxnSpPr>
+          <p:cNvPr id="29" name="直接箭头连接符 28">
+            <a:extLst>
+              <a:ext uri="{FF2B5EF4-FFF2-40B4-BE49-F238E27FC236}">
+                <a16:creationId xmlns:a16="http://schemas.microsoft.com/office/drawing/2014/main" id="{1B788F3E-93CA-44B3-AD39-0C5FF27094CE}"/>
+              </a:ext>
+            </a:extLst>
+          </p:cNvPr>
+          <p:cNvCxnSpPr>
+            <a:stCxn id="18" idx="3"/>
+            <a:endCxn id="17" idx="1"/>
+          </p:cNvCxnSpPr>
+          <p:nvPr/>
+        </p:nvCxnSpPr>
+        <p:spPr>
+          <a:xfrm flipV="1">
+            <a:off x="3660475" y="2497351"/>
+            <a:ext cx="905771" cy="4310"/>
+          </a:xfrm>
+          <a:prstGeom prst="straightConnector1">
+            <a:avLst/>
+          </a:prstGeom>
+          <a:ln>
+            <a:headEnd type="triangle"/>
+            <a:tailEnd type="triangle"/>
+          </a:ln>
+        </p:spPr>
+        <p:style>
+          <a:lnRef idx="1">
+            <a:schemeClr val="accent1"/>
+          </a:lnRef>
+          <a:fillRef idx="0">
+            <a:schemeClr val="accent1"/>
+          </a:fillRef>
+          <a:effectRef idx="0">
+            <a:schemeClr val="accent1"/>
+          </a:effectRef>
+          <a:fontRef idx="minor">
+            <a:schemeClr val="tx1"/>
+          </a:fontRef>
+        </p:style>
+      </p:cxnSp>
+      <p:cxnSp>
+        <p:nvCxnSpPr>
+          <p:cNvPr id="32" name="直接箭头连接符 31">
+            <a:extLst>
+              <a:ext uri="{FF2B5EF4-FFF2-40B4-BE49-F238E27FC236}">
+                <a16:creationId xmlns:a16="http://schemas.microsoft.com/office/drawing/2014/main" id="{FA0D47EE-7ECE-4814-B95C-27593C6FE73E}"/>
+              </a:ext>
+            </a:extLst>
+          </p:cNvPr>
+          <p:cNvCxnSpPr>
+            <a:stCxn id="17" idx="3"/>
+            <a:endCxn id="16" idx="1"/>
+          </p:cNvCxnSpPr>
+          <p:nvPr/>
+        </p:nvCxnSpPr>
+        <p:spPr>
+          <a:xfrm flipV="1">
+            <a:off x="6372041" y="2497350"/>
+            <a:ext cx="1000665" cy="1"/>
+          </a:xfrm>
+          <a:prstGeom prst="straightConnector1">
+            <a:avLst/>
+          </a:prstGeom>
+          <a:ln>
+            <a:headEnd type="triangle"/>
+            <a:tailEnd type="triangle"/>
+          </a:ln>
+        </p:spPr>
+        <p:style>
+          <a:lnRef idx="1">
+            <a:schemeClr val="accent1"/>
+          </a:lnRef>
+          <a:fillRef idx="0">
+            <a:schemeClr val="accent1"/>
+          </a:fillRef>
+          <a:effectRef idx="0">
+            <a:schemeClr val="accent1"/>
+          </a:effectRef>
+          <a:fontRef idx="minor">
+            <a:schemeClr val="tx1"/>
+          </a:fontRef>
+        </p:style>
+      </p:cxnSp>
+      <p:cxnSp>
+        <p:nvCxnSpPr>
+          <p:cNvPr id="35" name="直接箭头连接符 34">
+            <a:extLst>
+              <a:ext uri="{FF2B5EF4-FFF2-40B4-BE49-F238E27FC236}">
+                <a16:creationId xmlns:a16="http://schemas.microsoft.com/office/drawing/2014/main" id="{673EF0AC-F003-4175-8F9D-524A7A1F2486}"/>
+              </a:ext>
+            </a:extLst>
+          </p:cNvPr>
+          <p:cNvCxnSpPr>
+            <a:stCxn id="19" idx="3"/>
+            <a:endCxn id="20" idx="1"/>
+          </p:cNvCxnSpPr>
+          <p:nvPr/>
+        </p:nvCxnSpPr>
+        <p:spPr>
+          <a:xfrm>
+            <a:off x="3651848" y="2914292"/>
+            <a:ext cx="914400" cy="0"/>
+          </a:xfrm>
+          <a:prstGeom prst="straightConnector1">
+            <a:avLst/>
+          </a:prstGeom>
+          <a:ln>
+            <a:headEnd type="triangle"/>
+            <a:tailEnd type="triangle"/>
+          </a:ln>
+        </p:spPr>
+        <p:style>
+          <a:lnRef idx="1">
+            <a:schemeClr val="accent1"/>
+          </a:lnRef>
+          <a:fillRef idx="0">
+            <a:schemeClr val="accent1"/>
+          </a:fillRef>
+          <a:effectRef idx="0">
+            <a:schemeClr val="accent1"/>
+          </a:effectRef>
+          <a:fontRef idx="minor">
+            <a:schemeClr val="tx1"/>
+          </a:fontRef>
+        </p:style>
+      </p:cxnSp>
+      <p:cxnSp>
+        <p:nvCxnSpPr>
+          <p:cNvPr id="37" name="直接箭头连接符 36">
+            <a:extLst>
+              <a:ext uri="{FF2B5EF4-FFF2-40B4-BE49-F238E27FC236}">
+                <a16:creationId xmlns:a16="http://schemas.microsoft.com/office/drawing/2014/main" id="{84903C84-5ED5-4BA8-82E9-1BDB6F878057}"/>
+              </a:ext>
+            </a:extLst>
+          </p:cNvPr>
+          <p:cNvCxnSpPr>
+            <a:stCxn id="20" idx="3"/>
+            <a:endCxn id="21" idx="1"/>
+          </p:cNvCxnSpPr>
+          <p:nvPr/>
+        </p:nvCxnSpPr>
+        <p:spPr>
+          <a:xfrm>
+            <a:off x="6372043" y="2914292"/>
+            <a:ext cx="1000665" cy="0"/>
+          </a:xfrm>
+          <a:prstGeom prst="straightConnector1">
+            <a:avLst/>
+          </a:prstGeom>
+          <a:ln>
+            <a:headEnd type="triangle"/>
+            <a:tailEnd type="triangle"/>
+          </a:ln>
+        </p:spPr>
+        <p:style>
+          <a:lnRef idx="1">
+            <a:schemeClr val="accent1"/>
+          </a:lnRef>
+          <a:fillRef idx="0">
+            <a:schemeClr val="accent1"/>
+          </a:fillRef>
+          <a:effectRef idx="0">
+            <a:schemeClr val="accent1"/>
+          </a:effectRef>
+          <a:fontRef idx="minor">
+            <a:schemeClr val="tx1"/>
+          </a:fontRef>
+        </p:style>
+      </p:cxnSp>
+      <p:sp>
+        <p:nvSpPr>
+          <p:cNvPr id="38" name="文本框 37">
+            <a:extLst>
+              <a:ext uri="{FF2B5EF4-FFF2-40B4-BE49-F238E27FC236}">
+                <a16:creationId xmlns:a16="http://schemas.microsoft.com/office/drawing/2014/main" id="{0D0F0DD3-839C-49AC-9F74-FE8027A0BC99}"/>
+              </a:ext>
+            </a:extLst>
+          </p:cNvPr>
+          <p:cNvSpPr txBox="1"/>
+          <p:nvPr/>
+        </p:nvSpPr>
+        <p:spPr>
+          <a:xfrm>
+            <a:off x="3603679" y="2187524"/>
+            <a:ext cx="1275274" cy="276999"/>
+          </a:xfrm>
+          <a:prstGeom prst="rect">
+            <a:avLst/>
+          </a:prstGeom>
+          <a:noFill/>
+        </p:spPr>
+        <p:txBody>
+          <a:bodyPr wrap="square" rtlCol="0">
+            <a:spAutoFit/>
+          </a:bodyPr>
+          <a:lstStyle/>
+          <a:p>
+            <a:r>
+              <a:rPr lang="en-US" altLang="zh-CN" sz="1200" dirty="0"/>
+              <a:t>Vipserver key</a:t>
+            </a:r>
+            <a:endParaRPr lang="zh-CN" altLang="en-US" sz="1200" dirty="0"/>
+          </a:p>
+        </p:txBody>
+      </p:sp>
+      <p:sp>
+        <p:nvSpPr>
+          <p:cNvPr id="39" name="文本框 38">
+            <a:extLst>
+              <a:ext uri="{FF2B5EF4-FFF2-40B4-BE49-F238E27FC236}">
+                <a16:creationId xmlns:a16="http://schemas.microsoft.com/office/drawing/2014/main" id="{2BB03C6C-C78E-453D-AFCE-F8C760A0A68F}"/>
+              </a:ext>
+            </a:extLst>
+          </p:cNvPr>
+          <p:cNvSpPr txBox="1"/>
+          <p:nvPr/>
+        </p:nvSpPr>
+        <p:spPr>
+          <a:xfrm>
+            <a:off x="6334656" y="2184880"/>
+            <a:ext cx="1275274" cy="276999"/>
+          </a:xfrm>
+          <a:prstGeom prst="rect">
+            <a:avLst/>
+          </a:prstGeom>
+          <a:noFill/>
+        </p:spPr>
+        <p:txBody>
+          <a:bodyPr wrap="square" rtlCol="0">
+            <a:spAutoFit/>
+          </a:bodyPr>
+          <a:lstStyle/>
+          <a:p>
+            <a:r>
+              <a:rPr lang="en-US" altLang="zh-CN" sz="1200" dirty="0"/>
+              <a:t>Vipserver key</a:t>
+            </a:r>
+            <a:endParaRPr lang="zh-CN" altLang="en-US" sz="1200" dirty="0"/>
+          </a:p>
+        </p:txBody>
+      </p:sp>
+      <p:sp>
+        <p:nvSpPr>
+          <p:cNvPr id="40" name="文本框 39">
+            <a:extLst>
+              <a:ext uri="{FF2B5EF4-FFF2-40B4-BE49-F238E27FC236}">
+                <a16:creationId xmlns:a16="http://schemas.microsoft.com/office/drawing/2014/main" id="{7C798688-89A9-4B86-A96F-014639DCA6D9}"/>
+              </a:ext>
+            </a:extLst>
+          </p:cNvPr>
+          <p:cNvSpPr txBox="1"/>
+          <p:nvPr/>
+        </p:nvSpPr>
+        <p:spPr>
+          <a:xfrm>
+            <a:off x="3692104" y="2650705"/>
+            <a:ext cx="1275274" cy="276999"/>
+          </a:xfrm>
+          <a:prstGeom prst="rect">
+            <a:avLst/>
+          </a:prstGeom>
+          <a:noFill/>
+        </p:spPr>
+        <p:txBody>
+          <a:bodyPr wrap="square" rtlCol="0">
+            <a:spAutoFit/>
+          </a:bodyPr>
+          <a:lstStyle/>
+          <a:p>
+            <a:r>
+              <a:rPr lang="en-US" altLang="zh-CN" sz="1200" dirty="0"/>
+              <a:t>skywalker</a:t>
+            </a:r>
+            <a:endParaRPr lang="zh-CN" altLang="en-US" sz="1200" dirty="0"/>
+          </a:p>
+        </p:txBody>
+      </p:sp>
+      <p:sp>
+        <p:nvSpPr>
+          <p:cNvPr id="41" name="文本框 40">
+            <a:extLst>
+              <a:ext uri="{FF2B5EF4-FFF2-40B4-BE49-F238E27FC236}">
+                <a16:creationId xmlns:a16="http://schemas.microsoft.com/office/drawing/2014/main" id="{651EC07F-9FA5-4C45-A41C-8011CB1644BB}"/>
+              </a:ext>
+            </a:extLst>
+          </p:cNvPr>
+          <p:cNvSpPr txBox="1"/>
+          <p:nvPr/>
+        </p:nvSpPr>
+        <p:spPr>
+          <a:xfrm>
+            <a:off x="6510775" y="2659827"/>
+            <a:ext cx="1275274" cy="276999"/>
+          </a:xfrm>
+          <a:prstGeom prst="rect">
+            <a:avLst/>
+          </a:prstGeom>
+          <a:noFill/>
+        </p:spPr>
+        <p:txBody>
+          <a:bodyPr wrap="square" rtlCol="0">
+            <a:spAutoFit/>
+          </a:bodyPr>
+          <a:lstStyle/>
+          <a:p>
+            <a:r>
+              <a:rPr lang="en-US" altLang="zh-CN" sz="1200" dirty="0"/>
+              <a:t>skywalker</a:t>
+            </a:r>
+            <a:endParaRPr lang="zh-CN" altLang="en-US" sz="1200" dirty="0"/>
+          </a:p>
+        </p:txBody>
+      </p:sp>
+      <p:sp>
+        <p:nvSpPr>
+          <p:cNvPr id="42" name="文本框 41">
+            <a:extLst>
+              <a:ext uri="{FF2B5EF4-FFF2-40B4-BE49-F238E27FC236}">
+                <a16:creationId xmlns:a16="http://schemas.microsoft.com/office/drawing/2014/main" id="{D677E56E-C810-4D10-BCE8-7780D6CC5A98}"/>
+              </a:ext>
+            </a:extLst>
+          </p:cNvPr>
+          <p:cNvSpPr txBox="1"/>
+          <p:nvPr/>
+        </p:nvSpPr>
+        <p:spPr>
+          <a:xfrm>
+            <a:off x="5739442" y="345057"/>
+            <a:ext cx="1368724" cy="276999"/>
+          </a:xfrm>
+          <a:prstGeom prst="rect">
+            <a:avLst/>
+          </a:prstGeom>
+          <a:noFill/>
+        </p:spPr>
+        <p:txBody>
+          <a:bodyPr wrap="square" rtlCol="0">
+            <a:spAutoFit/>
+          </a:bodyPr>
+          <a:lstStyle/>
+          <a:p>
+            <a:r>
+              <a:rPr lang="zh-CN" altLang="en-US" sz="1200" dirty="0"/>
+              <a:t>德国用户</a:t>
+            </a:r>
+          </a:p>
+        </p:txBody>
+      </p:sp>
+      <p:sp>
+        <p:nvSpPr>
+          <p:cNvPr id="44" name="矩形 43">
+            <a:extLst>
+              <a:ext uri="{FF2B5EF4-FFF2-40B4-BE49-F238E27FC236}">
+                <a16:creationId xmlns:a16="http://schemas.microsoft.com/office/drawing/2014/main" id="{E1908696-A776-4508-A849-27C3CDB272D6}"/>
+              </a:ext>
+            </a:extLst>
+          </p:cNvPr>
+          <p:cNvSpPr/>
+          <p:nvPr/>
+        </p:nvSpPr>
+        <p:spPr>
+          <a:xfrm>
+            <a:off x="1854680" y="5335910"/>
+            <a:ext cx="1805795" cy="247289"/>
+          </a:xfrm>
+          <a:prstGeom prst="rect">
+            <a:avLst/>
+          </a:prstGeom>
+        </p:spPr>
+        <p:style>
+          <a:lnRef idx="2">
+            <a:schemeClr val="accent6"/>
+          </a:lnRef>
+          <a:fillRef idx="1">
+            <a:schemeClr val="lt1"/>
+          </a:fillRef>
+          <a:effectRef idx="0">
+            <a:schemeClr val="accent6"/>
+          </a:effectRef>
+          <a:fontRef idx="minor">
+            <a:schemeClr val="dk1"/>
+          </a:fontRef>
+        </p:style>
+        <p:txBody>
+          <a:bodyPr rtlCol="0" anchor="ctr"/>
+          <a:lstStyle/>
+          <a:p>
+            <a:pPr algn="ctr"/>
+            <a:r>
+              <a:rPr lang="en-US" altLang="zh-CN" sz="1200" dirty="0"/>
+              <a:t>DB</a:t>
+            </a:r>
+          </a:p>
+        </p:txBody>
+      </p:sp>
+      <p:sp>
+        <p:nvSpPr>
+          <p:cNvPr id="45" name="矩形 44">
+            <a:extLst>
+              <a:ext uri="{FF2B5EF4-FFF2-40B4-BE49-F238E27FC236}">
+                <a16:creationId xmlns:a16="http://schemas.microsoft.com/office/drawing/2014/main" id="{C448BB5E-285D-434B-9C29-7BF57B6EE922}"/>
+              </a:ext>
+            </a:extLst>
+          </p:cNvPr>
+          <p:cNvSpPr/>
+          <p:nvPr/>
+        </p:nvSpPr>
+        <p:spPr>
+          <a:xfrm>
+            <a:off x="4566246" y="5335910"/>
+            <a:ext cx="1805795" cy="247289"/>
+          </a:xfrm>
+          <a:prstGeom prst="rect">
+            <a:avLst/>
+          </a:prstGeom>
+        </p:spPr>
+        <p:style>
+          <a:lnRef idx="2">
+            <a:schemeClr val="accent6"/>
+          </a:lnRef>
+          <a:fillRef idx="1">
+            <a:schemeClr val="lt1"/>
+          </a:fillRef>
+          <a:effectRef idx="0">
+            <a:schemeClr val="accent6"/>
+          </a:effectRef>
+          <a:fontRef idx="minor">
+            <a:schemeClr val="dk1"/>
+          </a:fontRef>
+        </p:style>
+        <p:txBody>
+          <a:bodyPr rtlCol="0" anchor="ctr"/>
+          <a:lstStyle/>
+          <a:p>
+            <a:pPr algn="ctr"/>
+            <a:r>
+              <a:rPr lang="en-US" altLang="zh-CN" sz="1200" dirty="0"/>
+              <a:t>DB</a:t>
+            </a:r>
+          </a:p>
+        </p:txBody>
+      </p:sp>
+      <p:sp>
+        <p:nvSpPr>
+          <p:cNvPr id="46" name="矩形 45">
+            <a:extLst>
+              <a:ext uri="{FF2B5EF4-FFF2-40B4-BE49-F238E27FC236}">
+                <a16:creationId xmlns:a16="http://schemas.microsoft.com/office/drawing/2014/main" id="{E7F5AD7B-182E-4BEF-A7F2-7018191AD38F}"/>
+              </a:ext>
+            </a:extLst>
+          </p:cNvPr>
+          <p:cNvSpPr/>
+          <p:nvPr/>
+        </p:nvSpPr>
+        <p:spPr>
+          <a:xfrm>
+            <a:off x="7372705" y="5381442"/>
+            <a:ext cx="1805795" cy="247289"/>
+          </a:xfrm>
+          <a:prstGeom prst="rect">
+            <a:avLst/>
+          </a:prstGeom>
+        </p:spPr>
+        <p:style>
+          <a:lnRef idx="2">
+            <a:schemeClr val="accent6"/>
+          </a:lnRef>
+          <a:fillRef idx="1">
+            <a:schemeClr val="lt1"/>
+          </a:fillRef>
+          <a:effectRef idx="0">
+            <a:schemeClr val="accent6"/>
+          </a:effectRef>
+          <a:fontRef idx="minor">
+            <a:schemeClr val="dk1"/>
+          </a:fontRef>
+        </p:style>
+        <p:txBody>
+          <a:bodyPr rtlCol="0" anchor="ctr"/>
+          <a:lstStyle/>
+          <a:p>
+            <a:pPr algn="ctr"/>
+            <a:r>
+              <a:rPr lang="en-US" altLang="zh-CN" sz="1200" dirty="0"/>
+              <a:t>DB</a:t>
+            </a:r>
+          </a:p>
+        </p:txBody>
+      </p:sp>
+    </p:spTree>
+    <p:extLst>
+      <p:ext uri="{BB962C8B-B14F-4D97-AF65-F5344CB8AC3E}">
+        <p14:creationId xmlns:p14="http://schemas.microsoft.com/office/powerpoint/2010/main" val="3366575372"/>
       </p:ext>
     </p:extLst>
   </p:cSld>

</xml_diff>

<commit_message>
Change the new pic with db and fix some error
</commit_message>
<xml_diff>
--- a/ppt/tmp_ppt.pptx
+++ b/ppt/tmp_ppt.pptx
@@ -266,7 +266,7 @@
           <a:p>
             <a:fld id="{454A0F4F-8F8E-4FE7-B4C3-4986872B7D08}" type="datetimeFigureOut">
               <a:rPr lang="zh-CN" altLang="en-US" smtClean="0"/>
-              <a:t>2021/4/10</a:t>
+              <a:t>2021/4/11</a:t>
             </a:fld>
             <a:endParaRPr lang="zh-CN" altLang="en-US"/>
           </a:p>
@@ -464,7 +464,7 @@
           <a:p>
             <a:fld id="{454A0F4F-8F8E-4FE7-B4C3-4986872B7D08}" type="datetimeFigureOut">
               <a:rPr lang="zh-CN" altLang="en-US" smtClean="0"/>
-              <a:t>2021/4/10</a:t>
+              <a:t>2021/4/11</a:t>
             </a:fld>
             <a:endParaRPr lang="zh-CN" altLang="en-US"/>
           </a:p>
@@ -672,7 +672,7 @@
           <a:p>
             <a:fld id="{454A0F4F-8F8E-4FE7-B4C3-4986872B7D08}" type="datetimeFigureOut">
               <a:rPr lang="zh-CN" altLang="en-US" smtClean="0"/>
-              <a:t>2021/4/10</a:t>
+              <a:t>2021/4/11</a:t>
             </a:fld>
             <a:endParaRPr lang="zh-CN" altLang="en-US"/>
           </a:p>
@@ -870,7 +870,7 @@
           <a:p>
             <a:fld id="{454A0F4F-8F8E-4FE7-B4C3-4986872B7D08}" type="datetimeFigureOut">
               <a:rPr lang="zh-CN" altLang="en-US" smtClean="0"/>
-              <a:t>2021/4/10</a:t>
+              <a:t>2021/4/11</a:t>
             </a:fld>
             <a:endParaRPr lang="zh-CN" altLang="en-US"/>
           </a:p>
@@ -1145,7 +1145,7 @@
           <a:p>
             <a:fld id="{454A0F4F-8F8E-4FE7-B4C3-4986872B7D08}" type="datetimeFigureOut">
               <a:rPr lang="zh-CN" altLang="en-US" smtClean="0"/>
-              <a:t>2021/4/10</a:t>
+              <a:t>2021/4/11</a:t>
             </a:fld>
             <a:endParaRPr lang="zh-CN" altLang="en-US"/>
           </a:p>
@@ -1410,7 +1410,7 @@
           <a:p>
             <a:fld id="{454A0F4F-8F8E-4FE7-B4C3-4986872B7D08}" type="datetimeFigureOut">
               <a:rPr lang="zh-CN" altLang="en-US" smtClean="0"/>
-              <a:t>2021/4/10</a:t>
+              <a:t>2021/4/11</a:t>
             </a:fld>
             <a:endParaRPr lang="zh-CN" altLang="en-US"/>
           </a:p>
@@ -1822,7 +1822,7 @@
           <a:p>
             <a:fld id="{454A0F4F-8F8E-4FE7-B4C3-4986872B7D08}" type="datetimeFigureOut">
               <a:rPr lang="zh-CN" altLang="en-US" smtClean="0"/>
-              <a:t>2021/4/10</a:t>
+              <a:t>2021/4/11</a:t>
             </a:fld>
             <a:endParaRPr lang="zh-CN" altLang="en-US"/>
           </a:p>
@@ -1963,7 +1963,7 @@
           <a:p>
             <a:fld id="{454A0F4F-8F8E-4FE7-B4C3-4986872B7D08}" type="datetimeFigureOut">
               <a:rPr lang="zh-CN" altLang="en-US" smtClean="0"/>
-              <a:t>2021/4/10</a:t>
+              <a:t>2021/4/11</a:t>
             </a:fld>
             <a:endParaRPr lang="zh-CN" altLang="en-US"/>
           </a:p>
@@ -2076,7 +2076,7 @@
           <a:p>
             <a:fld id="{454A0F4F-8F8E-4FE7-B4C3-4986872B7D08}" type="datetimeFigureOut">
               <a:rPr lang="zh-CN" altLang="en-US" smtClean="0"/>
-              <a:t>2021/4/10</a:t>
+              <a:t>2021/4/11</a:t>
             </a:fld>
             <a:endParaRPr lang="zh-CN" altLang="en-US"/>
           </a:p>
@@ -2387,7 +2387,7 @@
           <a:p>
             <a:fld id="{454A0F4F-8F8E-4FE7-B4C3-4986872B7D08}" type="datetimeFigureOut">
               <a:rPr lang="zh-CN" altLang="en-US" smtClean="0"/>
-              <a:t>2021/4/10</a:t>
+              <a:t>2021/4/11</a:t>
             </a:fld>
             <a:endParaRPr lang="zh-CN" altLang="en-US"/>
           </a:p>
@@ -2675,7 +2675,7 @@
           <a:p>
             <a:fld id="{454A0F4F-8F8E-4FE7-B4C3-4986872B7D08}" type="datetimeFigureOut">
               <a:rPr lang="zh-CN" altLang="en-US" smtClean="0"/>
-              <a:t>2021/4/10</a:t>
+              <a:t>2021/4/11</a:t>
             </a:fld>
             <a:endParaRPr lang="zh-CN" altLang="en-US"/>
           </a:p>
@@ -2916,7 +2916,7 @@
           <a:p>
             <a:fld id="{454A0F4F-8F8E-4FE7-B4C3-4986872B7D08}" type="datetimeFigureOut">
               <a:rPr lang="zh-CN" altLang="en-US" smtClean="0"/>
-              <a:t>2021/4/10</a:t>
+              <a:t>2021/4/11</a:t>
             </a:fld>
             <a:endParaRPr lang="zh-CN" altLang="en-US"/>
           </a:p>
@@ -13110,12 +13110,8 @@
               <a:t>调度识别单元不识别机房，因此</a:t>
             </a:r>
             <a:r>
-              <a:rPr lang="en-US" altLang="zh-CN" sz="1200" dirty="0" err="1"/>
-              <a:t>vipserver</a:t>
-            </a:r>
-            <a:r>
-              <a:rPr lang="en-US" altLang="zh-CN" sz="1200" dirty="0"/>
-              <a:t> key</a:t>
+              <a:rPr lang="en-US" altLang="zh-CN" sz="1200" dirty="0"/>
+              <a:t>vipserver key</a:t>
             </a:r>
             <a:r>
               <a:rPr lang="zh-CN" altLang="en-US" sz="1200" dirty="0"/>
@@ -13342,15 +13338,7 @@
             <a:pPr algn="ctr"/>
             <a:r>
               <a:rPr lang="en-US" altLang="zh-CN" sz="1200" dirty="0"/>
-              <a:t>DB </a:t>
-            </a:r>
-            <a:r>
-              <a:rPr lang="en-US" altLang="zh-CN" sz="1200" dirty="0" err="1"/>
-              <a:t>binlong</a:t>
-            </a:r>
-            <a:r>
-              <a:rPr lang="en-US" altLang="zh-CN" sz="1200" dirty="0"/>
-              <a:t> in SG113</a:t>
+              <a:t>DB log in SG113</a:t>
             </a:r>
           </a:p>
         </p:txBody>
@@ -15335,15 +15323,7 @@
             <a:pPr algn="ctr"/>
             <a:r>
               <a:rPr lang="en-US" altLang="zh-CN" sz="1200" dirty="0"/>
-              <a:t>DB </a:t>
-            </a:r>
-            <a:r>
-              <a:rPr lang="en-US" altLang="zh-CN" sz="1200" dirty="0" err="1"/>
-              <a:t>binlong</a:t>
-            </a:r>
-            <a:r>
-              <a:rPr lang="en-US" altLang="zh-CN" sz="1200" dirty="0"/>
-              <a:t> in SG113</a:t>
+              <a:t>DB log in SG113</a:t>
             </a:r>
           </a:p>
         </p:txBody>

</xml_diff>